<commit_message>
Ready for event implementation
</commit_message>
<xml_diff>
--- a/Doc/V5 design doc.pptx
+++ b/Doc/V5 design doc.pptx
@@ -5,7 +5,7 @@
     <p:sldMasterId id="2147483648" r:id="rId1"/>
   </p:sldMasterIdLst>
   <p:notesMasterIdLst>
-    <p:notesMasterId r:id="rId12"/>
+    <p:notesMasterId r:id="rId13"/>
   </p:notesMasterIdLst>
   <p:sldIdLst>
     <p:sldId id="256" r:id="rId2"/>
@@ -18,6 +18,7 @@
     <p:sldId id="264" r:id="rId9"/>
     <p:sldId id="265" r:id="rId10"/>
     <p:sldId id="266" r:id="rId11"/>
+    <p:sldId id="268" r:id="rId12"/>
   </p:sldIdLst>
   <p:sldSz cx="9144000" cy="6858000" type="screen4x3"/>
   <p:notesSz cx="6858000" cy="9144000"/>
@@ -201,7 +202,8 @@
           <a:p>
             <a:fld id="{360BB726-B4AA-437F-9776-1FB3CA074112}" type="datetimeFigureOut">
               <a:rPr lang="en-US" smtClean="0"/>
-              <a:t>4/9/2019</a:t>
+              <a:pPr/>
+              <a:t>4/11/2019</a:t>
             </a:fld>
             <a:endParaRPr lang="en-US"/>
           </a:p>
@@ -362,6 +364,7 @@
           <a:p>
             <a:fld id="{EBC37C12-5E07-45B0-A7E9-9BAA4E2BC36D}" type="slidenum">
               <a:rPr lang="en-US" smtClean="0"/>
+              <a:pPr/>
               <a:t>‹#›</a:t>
             </a:fld>
             <a:endParaRPr lang="en-US"/>
@@ -648,7 +651,7 @@
             <a:fld id="{1D8BD707-D9CF-40AE-B4C6-C98DA3205C09}" type="datetimeFigureOut">
               <a:rPr lang="en-US" smtClean="0"/>
               <a:pPr/>
-              <a:t>4/9/2019</a:t>
+              <a:t>4/11/2019</a:t>
             </a:fld>
             <a:endParaRPr lang="en-US"/>
           </a:p>
@@ -815,7 +818,7 @@
             <a:fld id="{1D8BD707-D9CF-40AE-B4C6-C98DA3205C09}" type="datetimeFigureOut">
               <a:rPr lang="en-US" smtClean="0"/>
               <a:pPr/>
-              <a:t>4/9/2019</a:t>
+              <a:t>4/11/2019</a:t>
             </a:fld>
             <a:endParaRPr lang="en-US"/>
           </a:p>
@@ -992,7 +995,7 @@
             <a:fld id="{1D8BD707-D9CF-40AE-B4C6-C98DA3205C09}" type="datetimeFigureOut">
               <a:rPr lang="en-US" smtClean="0"/>
               <a:pPr/>
-              <a:t>4/9/2019</a:t>
+              <a:t>4/11/2019</a:t>
             </a:fld>
             <a:endParaRPr lang="en-US"/>
           </a:p>
@@ -1159,7 +1162,7 @@
             <a:fld id="{1D8BD707-D9CF-40AE-B4C6-C98DA3205C09}" type="datetimeFigureOut">
               <a:rPr lang="en-US" smtClean="0"/>
               <a:pPr/>
-              <a:t>4/9/2019</a:t>
+              <a:t>4/11/2019</a:t>
             </a:fld>
             <a:endParaRPr lang="en-US"/>
           </a:p>
@@ -1402,7 +1405,7 @@
             <a:fld id="{1D8BD707-D9CF-40AE-B4C6-C98DA3205C09}" type="datetimeFigureOut">
               <a:rPr lang="en-US" smtClean="0"/>
               <a:pPr/>
-              <a:t>4/9/2019</a:t>
+              <a:t>4/11/2019</a:t>
             </a:fld>
             <a:endParaRPr lang="en-US"/>
           </a:p>
@@ -1687,7 +1690,7 @@
             <a:fld id="{1D8BD707-D9CF-40AE-B4C6-C98DA3205C09}" type="datetimeFigureOut">
               <a:rPr lang="en-US" smtClean="0"/>
               <a:pPr/>
-              <a:t>4/9/2019</a:t>
+              <a:t>4/11/2019</a:t>
             </a:fld>
             <a:endParaRPr lang="en-US"/>
           </a:p>
@@ -2106,7 +2109,7 @@
             <a:fld id="{1D8BD707-D9CF-40AE-B4C6-C98DA3205C09}" type="datetimeFigureOut">
               <a:rPr lang="en-US" smtClean="0"/>
               <a:pPr/>
-              <a:t>4/9/2019</a:t>
+              <a:t>4/11/2019</a:t>
             </a:fld>
             <a:endParaRPr lang="en-US"/>
           </a:p>
@@ -2221,7 +2224,7 @@
             <a:fld id="{1D8BD707-D9CF-40AE-B4C6-C98DA3205C09}" type="datetimeFigureOut">
               <a:rPr lang="en-US" smtClean="0"/>
               <a:pPr/>
-              <a:t>4/9/2019</a:t>
+              <a:t>4/11/2019</a:t>
             </a:fld>
             <a:endParaRPr lang="en-US"/>
           </a:p>
@@ -2313,7 +2316,7 @@
             <a:fld id="{1D8BD707-D9CF-40AE-B4C6-C98DA3205C09}" type="datetimeFigureOut">
               <a:rPr lang="en-US" smtClean="0"/>
               <a:pPr/>
-              <a:t>4/9/2019</a:t>
+              <a:t>4/11/2019</a:t>
             </a:fld>
             <a:endParaRPr lang="en-US"/>
           </a:p>
@@ -2587,7 +2590,7 @@
             <a:fld id="{1D8BD707-D9CF-40AE-B4C6-C98DA3205C09}" type="datetimeFigureOut">
               <a:rPr lang="en-US" smtClean="0"/>
               <a:pPr/>
-              <a:t>4/9/2019</a:t>
+              <a:t>4/11/2019</a:t>
             </a:fld>
             <a:endParaRPr lang="en-US"/>
           </a:p>
@@ -2837,7 +2840,7 @@
             <a:fld id="{1D8BD707-D9CF-40AE-B4C6-C98DA3205C09}" type="datetimeFigureOut">
               <a:rPr lang="en-US" smtClean="0"/>
               <a:pPr/>
-              <a:t>4/9/2019</a:t>
+              <a:t>4/11/2019</a:t>
             </a:fld>
             <a:endParaRPr lang="en-US"/>
           </a:p>
@@ -3047,7 +3050,7 @@
             <a:fld id="{1D8BD707-D9CF-40AE-B4C6-C98DA3205C09}" type="datetimeFigureOut">
               <a:rPr lang="en-US" smtClean="0"/>
               <a:pPr/>
-              <a:t>4/9/2019</a:t>
+              <a:t>4/11/2019</a:t>
             </a:fld>
             <a:endParaRPr lang="en-US"/>
           </a:p>
@@ -6393,6 +6396,1351 @@
 </p:sld>
 </file>
 
+<file path=ppt/slides/slide11.xml><?xml version="1.0" encoding="utf-8"?>
+<p:sld xmlns:a="http://schemas.openxmlformats.org/drawingml/2006/main" xmlns:r="http://schemas.openxmlformats.org/officeDocument/2006/relationships" xmlns:p="http://schemas.openxmlformats.org/presentationml/2006/main">
+  <p:cSld>
+    <p:spTree>
+      <p:nvGrpSpPr>
+        <p:cNvPr id="1" name=""/>
+        <p:cNvGrpSpPr/>
+        <p:nvPr/>
+      </p:nvGrpSpPr>
+      <p:grpSpPr>
+        <a:xfrm>
+          <a:off x="0" y="0"/>
+          <a:ext cx="0" cy="0"/>
+          <a:chOff x="0" y="0"/>
+          <a:chExt cx="0" cy="0"/>
+        </a:xfrm>
+      </p:grpSpPr>
+      <p:sp>
+        <p:nvSpPr>
+          <p:cNvPr id="230" name="Rectangle 229"/>
+          <p:cNvSpPr/>
+          <p:nvPr/>
+        </p:nvSpPr>
+        <p:spPr>
+          <a:xfrm>
+            <a:off x="1447800" y="3962400"/>
+            <a:ext cx="1066800" cy="1066800"/>
+          </a:xfrm>
+          <a:prstGeom prst="rect">
+            <a:avLst/>
+          </a:prstGeom>
+        </p:spPr>
+        <p:style>
+          <a:lnRef idx="2">
+            <a:schemeClr val="accent1">
+              <a:shade val="50000"/>
+            </a:schemeClr>
+          </a:lnRef>
+          <a:fillRef idx="1">
+            <a:schemeClr val="accent1"/>
+          </a:fillRef>
+          <a:effectRef idx="0">
+            <a:schemeClr val="accent1"/>
+          </a:effectRef>
+          <a:fontRef idx="minor">
+            <a:schemeClr val="lt1"/>
+          </a:fontRef>
+        </p:style>
+        <p:txBody>
+          <a:bodyPr rtlCol="0" anchor="ctr"/>
+          <a:lstStyle/>
+          <a:p>
+            <a:pPr algn="ctr"/>
+            <a:endParaRPr lang="en-US" dirty="0"/>
+          </a:p>
+        </p:txBody>
+      </p:sp>
+      <p:sp>
+        <p:nvSpPr>
+          <p:cNvPr id="231" name="Rectangle 230"/>
+          <p:cNvSpPr/>
+          <p:nvPr/>
+        </p:nvSpPr>
+        <p:spPr>
+          <a:xfrm>
+            <a:off x="3733800" y="3962400"/>
+            <a:ext cx="1066800" cy="1066800"/>
+          </a:xfrm>
+          <a:prstGeom prst="rect">
+            <a:avLst/>
+          </a:prstGeom>
+          <a:solidFill>
+            <a:schemeClr val="accent6">
+              <a:lumMod val="40000"/>
+              <a:lumOff val="60000"/>
+            </a:schemeClr>
+          </a:solidFill>
+        </p:spPr>
+        <p:style>
+          <a:lnRef idx="2">
+            <a:schemeClr val="accent1">
+              <a:shade val="50000"/>
+            </a:schemeClr>
+          </a:lnRef>
+          <a:fillRef idx="1">
+            <a:schemeClr val="accent1"/>
+          </a:fillRef>
+          <a:effectRef idx="0">
+            <a:schemeClr val="accent1"/>
+          </a:effectRef>
+          <a:fontRef idx="minor">
+            <a:schemeClr val="lt1"/>
+          </a:fontRef>
+        </p:style>
+        <p:txBody>
+          <a:bodyPr rtlCol="0" anchor="ctr"/>
+          <a:lstStyle/>
+          <a:p>
+            <a:pPr algn="ctr"/>
+            <a:r>
+              <a:rPr lang="en-US" dirty="0" smtClean="0"/>
+              <a:t>9</a:t>
+            </a:r>
+            <a:endParaRPr lang="en-US" dirty="0"/>
+          </a:p>
+        </p:txBody>
+      </p:sp>
+      <p:sp>
+        <p:nvSpPr>
+          <p:cNvPr id="232" name="Rectangle 231"/>
+          <p:cNvSpPr/>
+          <p:nvPr/>
+        </p:nvSpPr>
+        <p:spPr>
+          <a:xfrm>
+            <a:off x="2514600" y="3962400"/>
+            <a:ext cx="1219200" cy="1066800"/>
+          </a:xfrm>
+          <a:prstGeom prst="rect">
+            <a:avLst/>
+          </a:prstGeom>
+          <a:solidFill>
+            <a:srgbClr val="002060"/>
+          </a:solidFill>
+        </p:spPr>
+        <p:style>
+          <a:lnRef idx="2">
+            <a:schemeClr val="accent1">
+              <a:shade val="50000"/>
+            </a:schemeClr>
+          </a:lnRef>
+          <a:fillRef idx="1">
+            <a:schemeClr val="accent1"/>
+          </a:fillRef>
+          <a:effectRef idx="0">
+            <a:schemeClr val="accent1"/>
+          </a:effectRef>
+          <a:fontRef idx="minor">
+            <a:schemeClr val="lt1"/>
+          </a:fontRef>
+        </p:style>
+        <p:txBody>
+          <a:bodyPr rtlCol="0" anchor="ctr"/>
+          <a:lstStyle/>
+          <a:p>
+            <a:pPr algn="ctr"/>
+            <a:endParaRPr lang="en-US" dirty="0"/>
+          </a:p>
+        </p:txBody>
+      </p:sp>
+      <p:sp>
+        <p:nvSpPr>
+          <p:cNvPr id="4" name="TextBox 3"/>
+          <p:cNvSpPr txBox="1"/>
+          <p:nvPr/>
+        </p:nvSpPr>
+        <p:spPr>
+          <a:xfrm>
+            <a:off x="685800" y="609600"/>
+            <a:ext cx="184731" cy="369332"/>
+          </a:xfrm>
+          <a:prstGeom prst="rect">
+            <a:avLst/>
+          </a:prstGeom>
+          <a:noFill/>
+        </p:spPr>
+        <p:txBody>
+          <a:bodyPr wrap="none" rtlCol="0">
+            <a:spAutoFit/>
+          </a:bodyPr>
+          <a:lstStyle/>
+          <a:p>
+            <a:endParaRPr lang="en-US" dirty="0"/>
+          </a:p>
+        </p:txBody>
+      </p:sp>
+      <p:sp>
+        <p:nvSpPr>
+          <p:cNvPr id="5" name="TextBox 4"/>
+          <p:cNvSpPr txBox="1"/>
+          <p:nvPr/>
+        </p:nvSpPr>
+        <p:spPr>
+          <a:xfrm>
+            <a:off x="457200" y="381000"/>
+            <a:ext cx="1011880" cy="523220"/>
+          </a:xfrm>
+          <a:prstGeom prst="rect">
+            <a:avLst/>
+          </a:prstGeom>
+          <a:noFill/>
+        </p:spPr>
+        <p:txBody>
+          <a:bodyPr wrap="none" rtlCol="0">
+            <a:spAutoFit/>
+          </a:bodyPr>
+          <a:lstStyle/>
+          <a:p>
+            <a:r>
+              <a:rPr lang="en-US" altLang="zh-CN" sz="2800" b="1" dirty="0" smtClean="0"/>
+              <a:t>Event</a:t>
+            </a:r>
+            <a:endParaRPr lang="en-US" sz="2800" b="1" dirty="0"/>
+          </a:p>
+        </p:txBody>
+      </p:sp>
+      <p:grpSp>
+        <p:nvGrpSpPr>
+          <p:cNvPr id="62" name="Group 61"/>
+          <p:cNvGrpSpPr/>
+          <p:nvPr/>
+        </p:nvGrpSpPr>
+        <p:grpSpPr>
+          <a:xfrm>
+            <a:off x="3352800" y="457200"/>
+            <a:ext cx="685800" cy="685800"/>
+            <a:chOff x="3512346" y="1346193"/>
+            <a:chExt cx="1440649" cy="1371613"/>
+          </a:xfrm>
+        </p:grpSpPr>
+        <p:sp>
+          <p:nvSpPr>
+            <p:cNvPr id="63" name="Oval 62"/>
+            <p:cNvSpPr/>
+            <p:nvPr/>
+          </p:nvSpPr>
+          <p:spPr>
+            <a:xfrm>
+              <a:off x="3512346" y="1346193"/>
+              <a:ext cx="1440649" cy="1371613"/>
+            </a:xfrm>
+            <a:prstGeom prst="ellipse">
+              <a:avLst/>
+            </a:prstGeom>
+          </p:spPr>
+          <p:style>
+            <a:lnRef idx="2">
+              <a:schemeClr val="lt1">
+                <a:hueOff val="0"/>
+                <a:satOff val="0"/>
+                <a:lumOff val="0"/>
+                <a:alphaOff val="0"/>
+              </a:schemeClr>
+            </a:lnRef>
+            <a:fillRef idx="1">
+              <a:schemeClr val="accent1">
+                <a:hueOff val="0"/>
+                <a:satOff val="0"/>
+                <a:lumOff val="0"/>
+                <a:alphaOff val="0"/>
+              </a:schemeClr>
+            </a:fillRef>
+            <a:effectRef idx="0">
+              <a:schemeClr val="accent1">
+                <a:hueOff val="0"/>
+                <a:satOff val="0"/>
+                <a:lumOff val="0"/>
+                <a:alphaOff val="0"/>
+              </a:schemeClr>
+            </a:effectRef>
+            <a:fontRef idx="minor">
+              <a:schemeClr val="lt1"/>
+            </a:fontRef>
+          </p:style>
+        </p:sp>
+        <p:sp>
+          <p:nvSpPr>
+            <p:cNvPr id="64" name="Oval 4"/>
+            <p:cNvSpPr/>
+            <p:nvPr/>
+          </p:nvSpPr>
+          <p:spPr>
+            <a:xfrm>
+              <a:off x="3723324" y="1547061"/>
+              <a:ext cx="1018693" cy="969877"/>
+            </a:xfrm>
+            <a:prstGeom prst="rect">
+              <a:avLst/>
+            </a:prstGeom>
+          </p:spPr>
+          <p:style>
+            <a:lnRef idx="0">
+              <a:scrgbClr r="0" g="0" b="0"/>
+            </a:lnRef>
+            <a:fillRef idx="0">
+              <a:scrgbClr r="0" g="0" b="0"/>
+            </a:fillRef>
+            <a:effectRef idx="0">
+              <a:scrgbClr r="0" g="0" b="0"/>
+            </a:effectRef>
+            <a:fontRef idx="minor">
+              <a:schemeClr val="lt1"/>
+            </a:fontRef>
+          </p:style>
+          <p:txBody>
+            <a:bodyPr spcFirstLastPara="0" vert="horz" wrap="square" lIns="25400" tIns="25400" rIns="25400" bIns="25400" numCol="1" spcCol="1270" anchor="ctr" anchorCtr="0">
+              <a:noAutofit/>
+            </a:bodyPr>
+            <a:lstStyle/>
+            <a:p>
+              <a:pPr lvl="0" algn="ctr" defTabSz="889000">
+                <a:lnSpc>
+                  <a:spcPct val="90000"/>
+                </a:lnSpc>
+                <a:spcBef>
+                  <a:spcPct val="0"/>
+                </a:spcBef>
+                <a:spcAft>
+                  <a:spcPct val="35000"/>
+                </a:spcAft>
+              </a:pPr>
+              <a:r>
+                <a:rPr lang="en-US" sz="1200" b="1" kern="1200" dirty="0" smtClean="0"/>
+                <a:t>Result</a:t>
+              </a:r>
+              <a:endParaRPr lang="en-US" sz="1200" b="1" kern="1200" dirty="0"/>
+            </a:p>
+          </p:txBody>
+        </p:sp>
+      </p:grpSp>
+      <p:sp>
+        <p:nvSpPr>
+          <p:cNvPr id="69" name="Rectangle 68"/>
+          <p:cNvSpPr/>
+          <p:nvPr/>
+        </p:nvSpPr>
+        <p:spPr>
+          <a:xfrm>
+            <a:off x="3810000" y="1752600"/>
+            <a:ext cx="990600" cy="228600"/>
+          </a:xfrm>
+          <a:prstGeom prst="rect">
+            <a:avLst/>
+          </a:prstGeom>
+          <a:solidFill>
+            <a:srgbClr val="FFFF00"/>
+          </a:solidFill>
+        </p:spPr>
+        <p:style>
+          <a:lnRef idx="2">
+            <a:schemeClr val="accent1">
+              <a:shade val="50000"/>
+            </a:schemeClr>
+          </a:lnRef>
+          <a:fillRef idx="1">
+            <a:schemeClr val="accent1"/>
+          </a:fillRef>
+          <a:effectRef idx="0">
+            <a:schemeClr val="accent1"/>
+          </a:effectRef>
+          <a:fontRef idx="minor">
+            <a:schemeClr val="lt1"/>
+          </a:fontRef>
+        </p:style>
+        <p:txBody>
+          <a:bodyPr rtlCol="0" anchor="ctr"/>
+          <a:lstStyle/>
+          <a:p>
+            <a:pPr algn="ctr"/>
+            <a:r>
+              <a:rPr lang="en-US" sz="1000" dirty="0" smtClean="0">
+                <a:solidFill>
+                  <a:schemeClr val="tx1"/>
+                </a:solidFill>
+              </a:rPr>
+              <a:t>Completed</a:t>
+            </a:r>
+            <a:endParaRPr lang="en-US" sz="1000" dirty="0">
+              <a:solidFill>
+                <a:schemeClr val="tx1"/>
+              </a:solidFill>
+            </a:endParaRPr>
+          </a:p>
+        </p:txBody>
+      </p:sp>
+      <p:cxnSp>
+        <p:nvCxnSpPr>
+          <p:cNvPr id="75" name="Straight Arrow Connector 74"/>
+          <p:cNvCxnSpPr>
+            <a:stCxn id="63" idx="4"/>
+            <a:endCxn id="69" idx="0"/>
+          </p:cNvCxnSpPr>
+          <p:nvPr/>
+        </p:nvCxnSpPr>
+        <p:spPr>
+          <a:xfrm>
+            <a:off x="3695700" y="1143000"/>
+            <a:ext cx="609600" cy="609600"/>
+          </a:xfrm>
+          <a:prstGeom prst="straightConnector1">
+            <a:avLst/>
+          </a:prstGeom>
+          <a:ln>
+            <a:tailEnd type="arrow"/>
+          </a:ln>
+        </p:spPr>
+        <p:style>
+          <a:lnRef idx="1">
+            <a:schemeClr val="accent1"/>
+          </a:lnRef>
+          <a:fillRef idx="0">
+            <a:schemeClr val="accent1"/>
+          </a:fillRef>
+          <a:effectRef idx="0">
+            <a:schemeClr val="accent1"/>
+          </a:effectRef>
+          <a:fontRef idx="minor">
+            <a:schemeClr val="tx1"/>
+          </a:fontRef>
+        </p:style>
+      </p:cxnSp>
+      <p:sp>
+        <p:nvSpPr>
+          <p:cNvPr id="78" name="Rectangle 77"/>
+          <p:cNvSpPr/>
+          <p:nvPr/>
+        </p:nvSpPr>
+        <p:spPr>
+          <a:xfrm>
+            <a:off x="2667000" y="1752600"/>
+            <a:ext cx="990600" cy="228600"/>
+          </a:xfrm>
+          <a:prstGeom prst="rect">
+            <a:avLst/>
+          </a:prstGeom>
+          <a:solidFill>
+            <a:srgbClr val="FFFF00"/>
+          </a:solidFill>
+        </p:spPr>
+        <p:style>
+          <a:lnRef idx="2">
+            <a:schemeClr val="accent1">
+              <a:shade val="50000"/>
+            </a:schemeClr>
+          </a:lnRef>
+          <a:fillRef idx="1">
+            <a:schemeClr val="accent1"/>
+          </a:fillRef>
+          <a:effectRef idx="0">
+            <a:schemeClr val="accent1"/>
+          </a:effectRef>
+          <a:fontRef idx="minor">
+            <a:schemeClr val="lt1"/>
+          </a:fontRef>
+        </p:style>
+        <p:txBody>
+          <a:bodyPr rtlCol="0" anchor="ctr"/>
+          <a:lstStyle/>
+          <a:p>
+            <a:pPr algn="ctr"/>
+            <a:r>
+              <a:rPr lang="en-US" sz="1000" dirty="0" smtClean="0">
+                <a:solidFill>
+                  <a:schemeClr val="tx1"/>
+                </a:solidFill>
+              </a:rPr>
+              <a:t>Invalid</a:t>
+            </a:r>
+            <a:endParaRPr lang="en-US" sz="1000" dirty="0">
+              <a:solidFill>
+                <a:schemeClr val="tx1"/>
+              </a:solidFill>
+            </a:endParaRPr>
+          </a:p>
+        </p:txBody>
+      </p:sp>
+      <p:cxnSp>
+        <p:nvCxnSpPr>
+          <p:cNvPr id="79" name="Straight Arrow Connector 78"/>
+          <p:cNvCxnSpPr>
+            <a:stCxn id="63" idx="4"/>
+            <a:endCxn id="78" idx="0"/>
+          </p:cNvCxnSpPr>
+          <p:nvPr/>
+        </p:nvCxnSpPr>
+        <p:spPr>
+          <a:xfrm flipH="1">
+            <a:off x="3162300" y="1143000"/>
+            <a:ext cx="533400" cy="609600"/>
+          </a:xfrm>
+          <a:prstGeom prst="straightConnector1">
+            <a:avLst/>
+          </a:prstGeom>
+          <a:ln>
+            <a:tailEnd type="arrow"/>
+          </a:ln>
+        </p:spPr>
+        <p:style>
+          <a:lnRef idx="1">
+            <a:schemeClr val="accent1"/>
+          </a:lnRef>
+          <a:fillRef idx="0">
+            <a:schemeClr val="accent1"/>
+          </a:fillRef>
+          <a:effectRef idx="0">
+            <a:schemeClr val="accent1"/>
+          </a:effectRef>
+          <a:fontRef idx="minor">
+            <a:schemeClr val="tx1"/>
+          </a:fontRef>
+        </p:style>
+      </p:cxnSp>
+      <p:sp>
+        <p:nvSpPr>
+          <p:cNvPr id="93" name="Rectangle 92"/>
+          <p:cNvSpPr/>
+          <p:nvPr/>
+        </p:nvSpPr>
+        <p:spPr>
+          <a:xfrm>
+            <a:off x="1447800" y="2286000"/>
+            <a:ext cx="1066800" cy="1066800"/>
+          </a:xfrm>
+          <a:prstGeom prst="rect">
+            <a:avLst/>
+          </a:prstGeom>
+        </p:spPr>
+        <p:style>
+          <a:lnRef idx="2">
+            <a:schemeClr val="accent1">
+              <a:shade val="50000"/>
+            </a:schemeClr>
+          </a:lnRef>
+          <a:fillRef idx="1">
+            <a:schemeClr val="accent1"/>
+          </a:fillRef>
+          <a:effectRef idx="0">
+            <a:schemeClr val="accent1"/>
+          </a:effectRef>
+          <a:fontRef idx="minor">
+            <a:schemeClr val="lt1"/>
+          </a:fontRef>
+        </p:style>
+        <p:txBody>
+          <a:bodyPr rtlCol="0" anchor="ctr"/>
+          <a:lstStyle/>
+          <a:p>
+            <a:pPr algn="ctr"/>
+            <a:endParaRPr lang="en-US" dirty="0"/>
+          </a:p>
+        </p:txBody>
+      </p:sp>
+      <p:sp>
+        <p:nvSpPr>
+          <p:cNvPr id="95" name="Rectangle 94"/>
+          <p:cNvSpPr/>
+          <p:nvPr/>
+        </p:nvSpPr>
+        <p:spPr>
+          <a:xfrm>
+            <a:off x="3733800" y="2286000"/>
+            <a:ext cx="1066800" cy="1066800"/>
+          </a:xfrm>
+          <a:prstGeom prst="rect">
+            <a:avLst/>
+          </a:prstGeom>
+          <a:solidFill>
+            <a:schemeClr val="accent6">
+              <a:lumMod val="40000"/>
+              <a:lumOff val="60000"/>
+            </a:schemeClr>
+          </a:solidFill>
+        </p:spPr>
+        <p:style>
+          <a:lnRef idx="2">
+            <a:schemeClr val="accent1">
+              <a:shade val="50000"/>
+            </a:schemeClr>
+          </a:lnRef>
+          <a:fillRef idx="1">
+            <a:schemeClr val="accent1"/>
+          </a:fillRef>
+          <a:effectRef idx="0">
+            <a:schemeClr val="accent1"/>
+          </a:effectRef>
+          <a:fontRef idx="minor">
+            <a:schemeClr val="lt1"/>
+          </a:fontRef>
+        </p:style>
+        <p:txBody>
+          <a:bodyPr rtlCol="0" anchor="ctr"/>
+          <a:lstStyle/>
+          <a:p>
+            <a:pPr algn="ctr"/>
+            <a:r>
+              <a:rPr lang="en-US" dirty="0" smtClean="0"/>
+              <a:t>9</a:t>
+            </a:r>
+            <a:endParaRPr lang="en-US" dirty="0"/>
+          </a:p>
+        </p:txBody>
+      </p:sp>
+      <p:cxnSp>
+        <p:nvCxnSpPr>
+          <p:cNvPr id="97" name="Straight Connector 96"/>
+          <p:cNvCxnSpPr>
+            <a:stCxn id="99" idx="1"/>
+            <a:endCxn id="93" idx="3"/>
+          </p:cNvCxnSpPr>
+          <p:nvPr/>
+        </p:nvCxnSpPr>
+        <p:spPr>
+          <a:xfrm>
+            <a:off x="2514600" y="2819400"/>
+            <a:ext cx="0" cy="0"/>
+          </a:xfrm>
+          <a:prstGeom prst="line">
+            <a:avLst/>
+          </a:prstGeom>
+        </p:spPr>
+        <p:style>
+          <a:lnRef idx="1">
+            <a:schemeClr val="accent1"/>
+          </a:lnRef>
+          <a:fillRef idx="0">
+            <a:schemeClr val="accent1"/>
+          </a:fillRef>
+          <a:effectRef idx="0">
+            <a:schemeClr val="accent1"/>
+          </a:effectRef>
+          <a:fontRef idx="minor">
+            <a:schemeClr val="tx1"/>
+          </a:fontRef>
+        </p:style>
+      </p:cxnSp>
+      <p:sp>
+        <p:nvSpPr>
+          <p:cNvPr id="99" name="Rectangle 98"/>
+          <p:cNvSpPr/>
+          <p:nvPr/>
+        </p:nvSpPr>
+        <p:spPr>
+          <a:xfrm>
+            <a:off x="2514600" y="2286000"/>
+            <a:ext cx="1219200" cy="1066800"/>
+          </a:xfrm>
+          <a:prstGeom prst="rect">
+            <a:avLst/>
+          </a:prstGeom>
+          <a:solidFill>
+            <a:srgbClr val="002060"/>
+          </a:solidFill>
+        </p:spPr>
+        <p:style>
+          <a:lnRef idx="2">
+            <a:schemeClr val="accent1">
+              <a:shade val="50000"/>
+            </a:schemeClr>
+          </a:lnRef>
+          <a:fillRef idx="1">
+            <a:schemeClr val="accent1"/>
+          </a:fillRef>
+          <a:effectRef idx="0">
+            <a:schemeClr val="accent1"/>
+          </a:effectRef>
+          <a:fontRef idx="minor">
+            <a:schemeClr val="lt1"/>
+          </a:fontRef>
+        </p:style>
+        <p:txBody>
+          <a:bodyPr rtlCol="0" anchor="ctr"/>
+          <a:lstStyle/>
+          <a:p>
+            <a:pPr algn="ctr"/>
+            <a:endParaRPr lang="en-US" dirty="0"/>
+          </a:p>
+        </p:txBody>
+      </p:sp>
+      <p:sp>
+        <p:nvSpPr>
+          <p:cNvPr id="136" name="Rectangle 135"/>
+          <p:cNvSpPr/>
+          <p:nvPr/>
+        </p:nvSpPr>
+        <p:spPr>
+          <a:xfrm>
+            <a:off x="3810000" y="4191000"/>
+            <a:ext cx="914400" cy="228600"/>
+          </a:xfrm>
+          <a:prstGeom prst="rect">
+            <a:avLst/>
+          </a:prstGeom>
+          <a:solidFill>
+            <a:srgbClr val="00B050"/>
+          </a:solidFill>
+        </p:spPr>
+        <p:style>
+          <a:lnRef idx="2">
+            <a:schemeClr val="accent1">
+              <a:shade val="50000"/>
+            </a:schemeClr>
+          </a:lnRef>
+          <a:fillRef idx="1">
+            <a:schemeClr val="accent1"/>
+          </a:fillRef>
+          <a:effectRef idx="0">
+            <a:schemeClr val="accent1"/>
+          </a:effectRef>
+          <a:fontRef idx="minor">
+            <a:schemeClr val="lt1"/>
+          </a:fontRef>
+        </p:style>
+        <p:txBody>
+          <a:bodyPr rtlCol="0" anchor="ctr"/>
+          <a:lstStyle/>
+          <a:p>
+            <a:pPr algn="ctr"/>
+            <a:r>
+              <a:rPr lang="en-US" sz="1000" dirty="0" err="1" smtClean="0">
+                <a:solidFill>
+                  <a:schemeClr val="tx1"/>
+                </a:solidFill>
+              </a:rPr>
+              <a:t>OnCompleted</a:t>
+            </a:r>
+            <a:endParaRPr lang="en-US" sz="1000" dirty="0">
+              <a:solidFill>
+                <a:schemeClr val="tx1"/>
+              </a:solidFill>
+            </a:endParaRPr>
+          </a:p>
+        </p:txBody>
+      </p:sp>
+      <p:sp>
+        <p:nvSpPr>
+          <p:cNvPr id="137" name="Rectangle 136"/>
+          <p:cNvSpPr/>
+          <p:nvPr/>
+        </p:nvSpPr>
+        <p:spPr>
+          <a:xfrm>
+            <a:off x="3810000" y="4572000"/>
+            <a:ext cx="914400" cy="228600"/>
+          </a:xfrm>
+          <a:prstGeom prst="rect">
+            <a:avLst/>
+          </a:prstGeom>
+          <a:solidFill>
+            <a:srgbClr val="FFFF00"/>
+          </a:solidFill>
+        </p:spPr>
+        <p:style>
+          <a:lnRef idx="2">
+            <a:schemeClr val="accent1">
+              <a:shade val="50000"/>
+            </a:schemeClr>
+          </a:lnRef>
+          <a:fillRef idx="1">
+            <a:schemeClr val="accent1"/>
+          </a:fillRef>
+          <a:effectRef idx="0">
+            <a:schemeClr val="accent1"/>
+          </a:effectRef>
+          <a:fontRef idx="minor">
+            <a:schemeClr val="lt1"/>
+          </a:fontRef>
+        </p:style>
+        <p:txBody>
+          <a:bodyPr rtlCol="0" anchor="ctr"/>
+          <a:lstStyle/>
+          <a:p>
+            <a:pPr algn="ctr"/>
+            <a:r>
+              <a:rPr lang="en-US" sz="1000" dirty="0" smtClean="0">
+                <a:solidFill>
+                  <a:schemeClr val="tx1"/>
+                </a:solidFill>
+              </a:rPr>
+              <a:t>Updated</a:t>
+            </a:r>
+            <a:endParaRPr lang="en-US" sz="1000" dirty="0">
+              <a:solidFill>
+                <a:schemeClr val="tx1"/>
+              </a:solidFill>
+            </a:endParaRPr>
+          </a:p>
+        </p:txBody>
+      </p:sp>
+      <p:sp>
+        <p:nvSpPr>
+          <p:cNvPr id="138" name="Rectangle 137"/>
+          <p:cNvSpPr/>
+          <p:nvPr/>
+        </p:nvSpPr>
+        <p:spPr>
+          <a:xfrm>
+            <a:off x="2667000" y="4572000"/>
+            <a:ext cx="914400" cy="228600"/>
+          </a:xfrm>
+          <a:prstGeom prst="rect">
+            <a:avLst/>
+          </a:prstGeom>
+          <a:solidFill>
+            <a:srgbClr val="00B050"/>
+          </a:solidFill>
+        </p:spPr>
+        <p:style>
+          <a:lnRef idx="2">
+            <a:schemeClr val="accent1">
+              <a:shade val="50000"/>
+            </a:schemeClr>
+          </a:lnRef>
+          <a:fillRef idx="1">
+            <a:schemeClr val="accent1"/>
+          </a:fillRef>
+          <a:effectRef idx="0">
+            <a:schemeClr val="accent1"/>
+          </a:effectRef>
+          <a:fontRef idx="minor">
+            <a:schemeClr val="lt1"/>
+          </a:fontRef>
+        </p:style>
+        <p:txBody>
+          <a:bodyPr rtlCol="0" anchor="ctr"/>
+          <a:lstStyle/>
+          <a:p>
+            <a:pPr algn="ctr"/>
+            <a:r>
+              <a:rPr lang="en-US" sz="1000" dirty="0" err="1" smtClean="0">
+                <a:solidFill>
+                  <a:schemeClr val="tx1"/>
+                </a:solidFill>
+              </a:rPr>
+              <a:t>OnUpdated</a:t>
+            </a:r>
+            <a:endParaRPr lang="en-US" sz="1000" dirty="0">
+              <a:solidFill>
+                <a:schemeClr val="tx1"/>
+              </a:solidFill>
+            </a:endParaRPr>
+          </a:p>
+        </p:txBody>
+      </p:sp>
+      <p:sp>
+        <p:nvSpPr>
+          <p:cNvPr id="141" name="Rectangle 140"/>
+          <p:cNvSpPr/>
+          <p:nvPr/>
+        </p:nvSpPr>
+        <p:spPr>
+          <a:xfrm>
+            <a:off x="2667000" y="4191000"/>
+            <a:ext cx="914400" cy="228600"/>
+          </a:xfrm>
+          <a:prstGeom prst="rect">
+            <a:avLst/>
+          </a:prstGeom>
+          <a:solidFill>
+            <a:srgbClr val="FFFF00"/>
+          </a:solidFill>
+        </p:spPr>
+        <p:style>
+          <a:lnRef idx="2">
+            <a:schemeClr val="accent1">
+              <a:shade val="50000"/>
+            </a:schemeClr>
+          </a:lnRef>
+          <a:fillRef idx="1">
+            <a:schemeClr val="accent1"/>
+          </a:fillRef>
+          <a:effectRef idx="0">
+            <a:schemeClr val="accent1"/>
+          </a:effectRef>
+          <a:fontRef idx="minor">
+            <a:schemeClr val="lt1"/>
+          </a:fontRef>
+        </p:style>
+        <p:txBody>
+          <a:bodyPr rtlCol="0" anchor="ctr"/>
+          <a:lstStyle/>
+          <a:p>
+            <a:pPr algn="ctr"/>
+            <a:r>
+              <a:rPr lang="en-US" sz="1000" dirty="0" smtClean="0">
+                <a:solidFill>
+                  <a:schemeClr val="tx1"/>
+                </a:solidFill>
+              </a:rPr>
+              <a:t>Updated</a:t>
+            </a:r>
+            <a:endParaRPr lang="en-US" sz="1000" dirty="0">
+              <a:solidFill>
+                <a:schemeClr val="tx1"/>
+              </a:solidFill>
+            </a:endParaRPr>
+          </a:p>
+        </p:txBody>
+      </p:sp>
+      <p:sp>
+        <p:nvSpPr>
+          <p:cNvPr id="142" name="Rectangle 141"/>
+          <p:cNvSpPr/>
+          <p:nvPr/>
+        </p:nvSpPr>
+        <p:spPr>
+          <a:xfrm>
+            <a:off x="1524000" y="4191000"/>
+            <a:ext cx="914400" cy="228600"/>
+          </a:xfrm>
+          <a:prstGeom prst="rect">
+            <a:avLst/>
+          </a:prstGeom>
+          <a:solidFill>
+            <a:srgbClr val="00B050"/>
+          </a:solidFill>
+        </p:spPr>
+        <p:style>
+          <a:lnRef idx="2">
+            <a:schemeClr val="accent1">
+              <a:shade val="50000"/>
+            </a:schemeClr>
+          </a:lnRef>
+          <a:fillRef idx="1">
+            <a:schemeClr val="accent1"/>
+          </a:fillRef>
+          <a:effectRef idx="0">
+            <a:schemeClr val="accent1"/>
+          </a:effectRef>
+          <a:fontRef idx="minor">
+            <a:schemeClr val="lt1"/>
+          </a:fontRef>
+        </p:style>
+        <p:txBody>
+          <a:bodyPr rtlCol="0" anchor="ctr"/>
+          <a:lstStyle/>
+          <a:p>
+            <a:pPr algn="ctr"/>
+            <a:r>
+              <a:rPr lang="en-US" sz="1000" dirty="0" err="1" smtClean="0">
+                <a:solidFill>
+                  <a:schemeClr val="tx1"/>
+                </a:solidFill>
+              </a:rPr>
+              <a:t>OnUpdated</a:t>
+            </a:r>
+            <a:endParaRPr lang="en-US" sz="1000" dirty="0">
+              <a:solidFill>
+                <a:schemeClr val="tx1"/>
+              </a:solidFill>
+            </a:endParaRPr>
+          </a:p>
+        </p:txBody>
+      </p:sp>
+      <p:cxnSp>
+        <p:nvCxnSpPr>
+          <p:cNvPr id="148" name="Straight Arrow Connector 147"/>
+          <p:cNvCxnSpPr/>
+          <p:nvPr/>
+        </p:nvCxnSpPr>
+        <p:spPr>
+          <a:xfrm>
+            <a:off x="5715000" y="1905000"/>
+            <a:ext cx="1295401" cy="710033"/>
+          </a:xfrm>
+          <a:prstGeom prst="straightConnector1">
+            <a:avLst/>
+          </a:prstGeom>
+          <a:ln>
+            <a:tailEnd type="arrow"/>
+          </a:ln>
+        </p:spPr>
+        <p:style>
+          <a:lnRef idx="1">
+            <a:schemeClr val="accent1"/>
+          </a:lnRef>
+          <a:fillRef idx="0">
+            <a:schemeClr val="accent1"/>
+          </a:fillRef>
+          <a:effectRef idx="0">
+            <a:schemeClr val="accent1"/>
+          </a:effectRef>
+          <a:fontRef idx="minor">
+            <a:schemeClr val="tx1"/>
+          </a:fontRef>
+        </p:style>
+      </p:cxnSp>
+      <p:cxnSp>
+        <p:nvCxnSpPr>
+          <p:cNvPr id="149" name="Straight Arrow Connector 148"/>
+          <p:cNvCxnSpPr>
+            <a:stCxn id="78" idx="2"/>
+            <a:endCxn id="193" idx="0"/>
+          </p:cNvCxnSpPr>
+          <p:nvPr/>
+        </p:nvCxnSpPr>
+        <p:spPr>
+          <a:xfrm flipH="1">
+            <a:off x="3124200" y="1981200"/>
+            <a:ext cx="38100" cy="533400"/>
+          </a:xfrm>
+          <a:prstGeom prst="straightConnector1">
+            <a:avLst/>
+          </a:prstGeom>
+          <a:ln>
+            <a:tailEnd type="arrow"/>
+          </a:ln>
+        </p:spPr>
+        <p:style>
+          <a:lnRef idx="1">
+            <a:schemeClr val="accent1"/>
+          </a:lnRef>
+          <a:fillRef idx="0">
+            <a:schemeClr val="accent1"/>
+          </a:fillRef>
+          <a:effectRef idx="0">
+            <a:schemeClr val="accent1"/>
+          </a:effectRef>
+          <a:fontRef idx="minor">
+            <a:schemeClr val="tx1"/>
+          </a:fontRef>
+        </p:style>
+      </p:cxnSp>
+      <p:cxnSp>
+        <p:nvCxnSpPr>
+          <p:cNvPr id="150" name="Straight Arrow Connector 149"/>
+          <p:cNvCxnSpPr>
+            <a:stCxn id="69" idx="2"/>
+            <a:endCxn id="136" idx="0"/>
+          </p:cNvCxnSpPr>
+          <p:nvPr/>
+        </p:nvCxnSpPr>
+        <p:spPr>
+          <a:xfrm flipH="1">
+            <a:off x="4267200" y="1981200"/>
+            <a:ext cx="38100" cy="2209800"/>
+          </a:xfrm>
+          <a:prstGeom prst="straightConnector1">
+            <a:avLst/>
+          </a:prstGeom>
+          <a:ln>
+            <a:tailEnd type="arrow"/>
+          </a:ln>
+        </p:spPr>
+        <p:style>
+          <a:lnRef idx="1">
+            <a:schemeClr val="accent1"/>
+          </a:lnRef>
+          <a:fillRef idx="0">
+            <a:schemeClr val="accent1"/>
+          </a:fillRef>
+          <a:effectRef idx="0">
+            <a:schemeClr val="accent1"/>
+          </a:effectRef>
+          <a:fontRef idx="minor">
+            <a:schemeClr val="tx1"/>
+          </a:fontRef>
+        </p:style>
+      </p:cxnSp>
+      <p:cxnSp>
+        <p:nvCxnSpPr>
+          <p:cNvPr id="151" name="Straight Arrow Connector 150"/>
+          <p:cNvCxnSpPr>
+            <a:stCxn id="138" idx="0"/>
+            <a:endCxn id="141" idx="2"/>
+          </p:cNvCxnSpPr>
+          <p:nvPr/>
+        </p:nvCxnSpPr>
+        <p:spPr>
+          <a:xfrm flipV="1">
+            <a:off x="3124200" y="4419600"/>
+            <a:ext cx="0" cy="152400"/>
+          </a:xfrm>
+          <a:prstGeom prst="straightConnector1">
+            <a:avLst/>
+          </a:prstGeom>
+          <a:ln>
+            <a:tailEnd type="arrow"/>
+          </a:ln>
+        </p:spPr>
+        <p:style>
+          <a:lnRef idx="1">
+            <a:schemeClr val="accent1"/>
+          </a:lnRef>
+          <a:fillRef idx="0">
+            <a:schemeClr val="accent1"/>
+          </a:fillRef>
+          <a:effectRef idx="0">
+            <a:schemeClr val="accent1"/>
+          </a:effectRef>
+          <a:fontRef idx="minor">
+            <a:schemeClr val="tx1"/>
+          </a:fontRef>
+        </p:style>
+      </p:cxnSp>
+      <p:cxnSp>
+        <p:nvCxnSpPr>
+          <p:cNvPr id="152" name="Straight Arrow Connector 151"/>
+          <p:cNvCxnSpPr>
+            <a:stCxn id="137" idx="1"/>
+            <a:endCxn id="138" idx="3"/>
+          </p:cNvCxnSpPr>
+          <p:nvPr/>
+        </p:nvCxnSpPr>
+        <p:spPr>
+          <a:xfrm flipH="1">
+            <a:off x="3581400" y="4686300"/>
+            <a:ext cx="228600" cy="0"/>
+          </a:xfrm>
+          <a:prstGeom prst="straightConnector1">
+            <a:avLst/>
+          </a:prstGeom>
+          <a:ln>
+            <a:tailEnd type="arrow"/>
+          </a:ln>
+        </p:spPr>
+        <p:style>
+          <a:lnRef idx="1">
+            <a:schemeClr val="accent1"/>
+          </a:lnRef>
+          <a:fillRef idx="0">
+            <a:schemeClr val="accent1"/>
+          </a:fillRef>
+          <a:effectRef idx="0">
+            <a:schemeClr val="accent1"/>
+          </a:effectRef>
+          <a:fontRef idx="minor">
+            <a:schemeClr val="tx1"/>
+          </a:fontRef>
+        </p:style>
+      </p:cxnSp>
+      <p:cxnSp>
+        <p:nvCxnSpPr>
+          <p:cNvPr id="153" name="Straight Arrow Connector 152"/>
+          <p:cNvCxnSpPr>
+            <a:stCxn id="136" idx="2"/>
+            <a:endCxn id="137" idx="0"/>
+          </p:cNvCxnSpPr>
+          <p:nvPr/>
+        </p:nvCxnSpPr>
+        <p:spPr>
+          <a:xfrm>
+            <a:off x="4267200" y="4419600"/>
+            <a:ext cx="0" cy="152400"/>
+          </a:xfrm>
+          <a:prstGeom prst="straightConnector1">
+            <a:avLst/>
+          </a:prstGeom>
+          <a:ln>
+            <a:tailEnd type="arrow"/>
+          </a:ln>
+        </p:spPr>
+        <p:style>
+          <a:lnRef idx="1">
+            <a:schemeClr val="accent1"/>
+          </a:lnRef>
+          <a:fillRef idx="0">
+            <a:schemeClr val="accent1"/>
+          </a:fillRef>
+          <a:effectRef idx="0">
+            <a:schemeClr val="accent1"/>
+          </a:effectRef>
+          <a:fontRef idx="minor">
+            <a:schemeClr val="tx1"/>
+          </a:fontRef>
+        </p:style>
+      </p:cxnSp>
+      <p:cxnSp>
+        <p:nvCxnSpPr>
+          <p:cNvPr id="154" name="Straight Arrow Connector 153"/>
+          <p:cNvCxnSpPr>
+            <a:stCxn id="141" idx="1"/>
+            <a:endCxn id="142" idx="3"/>
+          </p:cNvCxnSpPr>
+          <p:nvPr/>
+        </p:nvCxnSpPr>
+        <p:spPr>
+          <a:xfrm flipH="1">
+            <a:off x="2438400" y="4305300"/>
+            <a:ext cx="228600" cy="0"/>
+          </a:xfrm>
+          <a:prstGeom prst="straightConnector1">
+            <a:avLst/>
+          </a:prstGeom>
+          <a:ln>
+            <a:tailEnd type="arrow"/>
+          </a:ln>
+        </p:spPr>
+        <p:style>
+          <a:lnRef idx="1">
+            <a:schemeClr val="accent1"/>
+          </a:lnRef>
+          <a:fillRef idx="0">
+            <a:schemeClr val="accent1"/>
+          </a:fillRef>
+          <a:effectRef idx="0">
+            <a:schemeClr val="accent1"/>
+          </a:effectRef>
+          <a:fontRef idx="minor">
+            <a:schemeClr val="tx1"/>
+          </a:fontRef>
+        </p:style>
+      </p:cxnSp>
+      <p:sp>
+        <p:nvSpPr>
+          <p:cNvPr id="193" name="Rectangle 192"/>
+          <p:cNvSpPr/>
+          <p:nvPr/>
+        </p:nvSpPr>
+        <p:spPr>
+          <a:xfrm>
+            <a:off x="2667000" y="2514600"/>
+            <a:ext cx="914400" cy="228600"/>
+          </a:xfrm>
+          <a:prstGeom prst="rect">
+            <a:avLst/>
+          </a:prstGeom>
+          <a:solidFill>
+            <a:srgbClr val="00B050"/>
+          </a:solidFill>
+        </p:spPr>
+        <p:style>
+          <a:lnRef idx="2">
+            <a:schemeClr val="accent1">
+              <a:shade val="50000"/>
+            </a:schemeClr>
+          </a:lnRef>
+          <a:fillRef idx="1">
+            <a:schemeClr val="accent1"/>
+          </a:fillRef>
+          <a:effectRef idx="0">
+            <a:schemeClr val="accent1"/>
+          </a:effectRef>
+          <a:fontRef idx="minor">
+            <a:schemeClr val="lt1"/>
+          </a:fontRef>
+        </p:style>
+        <p:txBody>
+          <a:bodyPr rtlCol="0" anchor="ctr"/>
+          <a:lstStyle/>
+          <a:p>
+            <a:pPr algn="ctr"/>
+            <a:r>
+              <a:rPr lang="en-US" sz="1000" dirty="0" err="1" smtClean="0">
+                <a:solidFill>
+                  <a:schemeClr val="tx1"/>
+                </a:solidFill>
+              </a:rPr>
+              <a:t>OnInvalid</a:t>
+            </a:r>
+            <a:endParaRPr lang="en-US" sz="1000" dirty="0">
+              <a:solidFill>
+                <a:schemeClr val="tx1"/>
+              </a:solidFill>
+            </a:endParaRPr>
+          </a:p>
+        </p:txBody>
+      </p:sp>
+      <p:sp>
+        <p:nvSpPr>
+          <p:cNvPr id="237" name="TextBox 236"/>
+          <p:cNvSpPr txBox="1"/>
+          <p:nvPr/>
+        </p:nvSpPr>
+        <p:spPr>
+          <a:xfrm>
+            <a:off x="228600" y="2590800"/>
+            <a:ext cx="787588" cy="307777"/>
+          </a:xfrm>
+          <a:prstGeom prst="rect">
+            <a:avLst/>
+          </a:prstGeom>
+          <a:noFill/>
+        </p:spPr>
+        <p:txBody>
+          <a:bodyPr wrap="none" rtlCol="0">
+            <a:spAutoFit/>
+          </a:bodyPr>
+          <a:lstStyle/>
+          <a:p>
+            <a:r>
+              <a:rPr lang="en-US" altLang="zh-CN" sz="1400" b="1" dirty="0" smtClean="0"/>
+              <a:t>Request</a:t>
+            </a:r>
+            <a:endParaRPr lang="en-US" sz="1400" b="1" dirty="0"/>
+          </a:p>
+        </p:txBody>
+      </p:sp>
+      <p:sp>
+        <p:nvSpPr>
+          <p:cNvPr id="239" name="TextBox 238"/>
+          <p:cNvSpPr txBox="1"/>
+          <p:nvPr/>
+        </p:nvSpPr>
+        <p:spPr>
+          <a:xfrm>
+            <a:off x="228600" y="4191000"/>
+            <a:ext cx="818109" cy="307777"/>
+          </a:xfrm>
+          <a:prstGeom prst="rect">
+            <a:avLst/>
+          </a:prstGeom>
+          <a:noFill/>
+        </p:spPr>
+        <p:txBody>
+          <a:bodyPr wrap="none" rtlCol="0">
+            <a:spAutoFit/>
+          </a:bodyPr>
+          <a:lstStyle/>
+          <a:p>
+            <a:r>
+              <a:rPr lang="en-US" altLang="zh-CN" sz="1400" b="1" dirty="0" smtClean="0"/>
+              <a:t>Program</a:t>
+            </a:r>
+            <a:endParaRPr lang="en-US" sz="1400" b="1" dirty="0"/>
+          </a:p>
+        </p:txBody>
+      </p:sp>
+      <p:sp>
+        <p:nvSpPr>
+          <p:cNvPr id="241" name="TextBox 240"/>
+          <p:cNvSpPr txBox="1"/>
+          <p:nvPr/>
+        </p:nvSpPr>
+        <p:spPr>
+          <a:xfrm>
+            <a:off x="7239000" y="1524000"/>
+            <a:ext cx="922047" cy="307777"/>
+          </a:xfrm>
+          <a:prstGeom prst="rect">
+            <a:avLst/>
+          </a:prstGeom>
+          <a:noFill/>
+        </p:spPr>
+        <p:txBody>
+          <a:bodyPr wrap="none" rtlCol="0">
+            <a:spAutoFit/>
+          </a:bodyPr>
+          <a:lstStyle/>
+          <a:p>
+            <a:r>
+              <a:rPr lang="en-US" altLang="zh-CN" sz="1400" b="1" dirty="0" smtClean="0"/>
+              <a:t>Scheduler</a:t>
+            </a:r>
+            <a:endParaRPr lang="en-US" sz="1400" b="1" dirty="0"/>
+          </a:p>
+        </p:txBody>
+      </p:sp>
+    </p:spTree>
+  </p:cSld>
+  <p:clrMapOvr>
+    <a:masterClrMapping/>
+  </p:clrMapOvr>
+</p:sld>
+</file>
+
 <file path=ppt/slides/slide2.xml><?xml version="1.0" encoding="utf-8"?>
 <p:sld xmlns:a="http://schemas.openxmlformats.org/drawingml/2006/main" xmlns:r="http://schemas.openxmlformats.org/officeDocument/2006/relationships" xmlns:p="http://schemas.openxmlformats.org/presentationml/2006/main">
   <p:cSld>
@@ -10017,7 +11365,7 @@
         </p:nvSpPr>
         <p:spPr>
           <a:xfrm>
-            <a:off x="3124200" y="1981200"/>
+            <a:off x="4648200" y="381000"/>
             <a:ext cx="1219200" cy="228600"/>
           </a:xfrm>
           <a:prstGeom prst="rect">
@@ -10075,7 +11423,7 @@
         </p:nvSpPr>
         <p:spPr>
           <a:xfrm>
-            <a:off x="3124200" y="2286000"/>
+            <a:off x="4648200" y="685800"/>
             <a:ext cx="1219200" cy="228600"/>
           </a:xfrm>
           <a:prstGeom prst="rect">
@@ -10133,7 +11481,7 @@
         </p:nvSpPr>
         <p:spPr>
           <a:xfrm>
-            <a:off x="4343400" y="3810000"/>
+            <a:off x="2590800" y="3200400"/>
             <a:ext cx="762000" cy="228600"/>
           </a:xfrm>
           <a:prstGeom prst="rect">
@@ -10193,12 +11541,207 @@
           <p:nvPr/>
         </p:nvCxnSpPr>
         <p:spPr>
-          <a:xfrm>
-            <a:off x="4343400" y="1104900"/>
-            <a:ext cx="381000" cy="2705100"/>
+          <a:xfrm flipH="1">
+            <a:off x="2971800" y="1104900"/>
+            <a:ext cx="1371600" cy="2095500"/>
+          </a:xfrm>
+          <a:prstGeom prst="curvedConnector4">
+            <a:avLst>
+              <a:gd name="adj1" fmla="val -16667"/>
+              <a:gd name="adj2" fmla="val 52727"/>
+            </a:avLst>
+          </a:prstGeom>
+          <a:ln>
+            <a:prstDash val="dash"/>
+            <a:tailEnd type="arrow"/>
+          </a:ln>
+        </p:spPr>
+        <p:style>
+          <a:lnRef idx="1">
+            <a:schemeClr val="accent1"/>
+          </a:lnRef>
+          <a:fillRef idx="0">
+            <a:schemeClr val="accent1"/>
+          </a:fillRef>
+          <a:effectRef idx="0">
+            <a:schemeClr val="accent1"/>
+          </a:effectRef>
+          <a:fontRef idx="minor">
+            <a:schemeClr val="tx1"/>
+          </a:fontRef>
+        </p:style>
+      </p:cxnSp>
+      <p:sp>
+        <p:nvSpPr>
+          <p:cNvPr id="49" name="Rectangle 48"/>
+          <p:cNvSpPr/>
+          <p:nvPr/>
+        </p:nvSpPr>
+        <p:spPr>
+          <a:xfrm>
+            <a:off x="3962400" y="3733800"/>
+            <a:ext cx="762000" cy="228600"/>
+          </a:xfrm>
+          <a:prstGeom prst="rect">
+            <a:avLst/>
+          </a:prstGeom>
+          <a:solidFill>
+            <a:schemeClr val="accent2">
+              <a:lumMod val="40000"/>
+              <a:lumOff val="60000"/>
+            </a:schemeClr>
+          </a:solidFill>
+        </p:spPr>
+        <p:style>
+          <a:lnRef idx="2">
+            <a:schemeClr val="accent1">
+              <a:shade val="50000"/>
+            </a:schemeClr>
+          </a:lnRef>
+          <a:fillRef idx="1">
+            <a:schemeClr val="accent1"/>
+          </a:fillRef>
+          <a:effectRef idx="0">
+            <a:schemeClr val="accent1"/>
+          </a:effectRef>
+          <a:fontRef idx="minor">
+            <a:schemeClr val="lt1"/>
+          </a:fontRef>
+        </p:style>
+        <p:txBody>
+          <a:bodyPr rtlCol="0" anchor="ctr"/>
+          <a:lstStyle/>
+          <a:p>
+            <a:pPr algn="ctr"/>
+            <a:r>
+              <a:rPr lang="en-US" sz="1000" dirty="0" smtClean="0">
+                <a:solidFill>
+                  <a:schemeClr val="tx1"/>
+                </a:solidFill>
+              </a:rPr>
+              <a:t>Priority</a:t>
+            </a:r>
+            <a:endParaRPr lang="en-US" sz="1000" dirty="0">
+              <a:solidFill>
+                <a:schemeClr val="tx1"/>
+              </a:solidFill>
+            </a:endParaRPr>
+          </a:p>
+        </p:txBody>
+      </p:sp>
+      <p:sp>
+        <p:nvSpPr>
+          <p:cNvPr id="50" name="Rectangle 49"/>
+          <p:cNvSpPr/>
+          <p:nvPr/>
+        </p:nvSpPr>
+        <p:spPr>
+          <a:xfrm>
+            <a:off x="6019800" y="3657600"/>
+            <a:ext cx="762000" cy="228600"/>
+          </a:xfrm>
+          <a:prstGeom prst="rect">
+            <a:avLst/>
+          </a:prstGeom>
+          <a:solidFill>
+            <a:schemeClr val="accent2">
+              <a:lumMod val="40000"/>
+              <a:lumOff val="60000"/>
+            </a:schemeClr>
+          </a:solidFill>
+        </p:spPr>
+        <p:style>
+          <a:lnRef idx="2">
+            <a:schemeClr val="accent1">
+              <a:shade val="50000"/>
+            </a:schemeClr>
+          </a:lnRef>
+          <a:fillRef idx="1">
+            <a:schemeClr val="accent1"/>
+          </a:fillRef>
+          <a:effectRef idx="0">
+            <a:schemeClr val="accent1"/>
+          </a:effectRef>
+          <a:fontRef idx="minor">
+            <a:schemeClr val="lt1"/>
+          </a:fontRef>
+        </p:style>
+        <p:txBody>
+          <a:bodyPr rtlCol="0" anchor="ctr"/>
+          <a:lstStyle/>
+          <a:p>
+            <a:pPr algn="ctr"/>
+            <a:r>
+              <a:rPr lang="en-US" sz="1000" dirty="0" smtClean="0">
+                <a:solidFill>
+                  <a:schemeClr val="tx1"/>
+                </a:solidFill>
+              </a:rPr>
+              <a:t>Priority</a:t>
+            </a:r>
+            <a:endParaRPr lang="en-US" sz="1000" dirty="0">
+              <a:solidFill>
+                <a:schemeClr val="tx1"/>
+              </a:solidFill>
+            </a:endParaRPr>
+          </a:p>
+        </p:txBody>
+      </p:sp>
+      <p:cxnSp>
+        <p:nvCxnSpPr>
+          <p:cNvPr id="51" name="Shape 50"/>
+          <p:cNvCxnSpPr>
+            <a:stCxn id="136" idx="3"/>
+            <a:endCxn id="49" idx="0"/>
+          </p:cNvCxnSpPr>
+          <p:nvPr/>
+        </p:nvCxnSpPr>
+        <p:spPr>
+          <a:xfrm>
+            <a:off x="3352800" y="3314700"/>
+            <a:ext cx="990600" cy="419100"/>
           </a:xfrm>
           <a:prstGeom prst="curvedConnector2">
             <a:avLst/>
+          </a:prstGeom>
+          <a:ln>
+            <a:prstDash val="dash"/>
+            <a:tailEnd type="arrow"/>
+          </a:ln>
+        </p:spPr>
+        <p:style>
+          <a:lnRef idx="1">
+            <a:schemeClr val="accent1"/>
+          </a:lnRef>
+          <a:fillRef idx="0">
+            <a:schemeClr val="accent1"/>
+          </a:fillRef>
+          <a:effectRef idx="0">
+            <a:schemeClr val="accent1"/>
+          </a:effectRef>
+          <a:fontRef idx="minor">
+            <a:schemeClr val="tx1"/>
+          </a:fontRef>
+        </p:style>
+      </p:cxnSp>
+      <p:cxnSp>
+        <p:nvCxnSpPr>
+          <p:cNvPr id="59" name="Shape 58"/>
+          <p:cNvCxnSpPr>
+            <a:stCxn id="49" idx="3"/>
+            <a:endCxn id="50" idx="1"/>
+          </p:cNvCxnSpPr>
+          <p:nvPr/>
+        </p:nvCxnSpPr>
+        <p:spPr>
+          <a:xfrm flipV="1">
+            <a:off x="4724400" y="3771900"/>
+            <a:ext cx="1295400" cy="76200"/>
+          </a:xfrm>
+          <a:prstGeom prst="curvedConnector3">
+            <a:avLst>
+              <a:gd name="adj1" fmla="val 50000"/>
+            </a:avLst>
           </a:prstGeom>
           <a:ln>
             <a:prstDash val="dash"/>
@@ -18983,15 +20526,7 @@
                   <a:schemeClr val="tx1"/>
                 </a:solidFill>
               </a:rPr>
-              <a:t>Schedule </a:t>
-            </a:r>
-            <a:r>
-              <a:rPr lang="en-US" sz="1200" dirty="0" smtClean="0">
-                <a:solidFill>
-                  <a:schemeClr val="tx1"/>
-                </a:solidFill>
-              </a:rPr>
-              <a:t>Log</a:t>
+              <a:t>Schedule Log</a:t>
             </a:r>
             <a:endParaRPr lang="en-US" sz="1200" dirty="0">
               <a:solidFill>
@@ -19107,15 +20642,7 @@
                   <a:schemeClr val="tx1"/>
                 </a:solidFill>
               </a:rPr>
-              <a:t>Schedule </a:t>
-            </a:r>
-            <a:r>
-              <a:rPr lang="en-US" sz="1200" dirty="0" smtClean="0">
-                <a:solidFill>
-                  <a:schemeClr val="tx1"/>
-                </a:solidFill>
-              </a:rPr>
-              <a:t>Log</a:t>
+              <a:t>Schedule Log</a:t>
             </a:r>
             <a:endParaRPr lang="en-US" sz="1200" dirty="0">
               <a:solidFill>
@@ -20411,6 +21938,1669 @@
           </a:p>
         </p:txBody>
       </p:sp>
+      <p:grpSp>
+        <p:nvGrpSpPr>
+          <p:cNvPr id="33" name="Group 89"/>
+          <p:cNvGrpSpPr/>
+          <p:nvPr/>
+        </p:nvGrpSpPr>
+        <p:grpSpPr>
+          <a:xfrm>
+            <a:off x="6858000" y="2530418"/>
+            <a:ext cx="685800" cy="685800"/>
+            <a:chOff x="3512346" y="930685"/>
+            <a:chExt cx="1440649" cy="1371613"/>
+          </a:xfrm>
+        </p:grpSpPr>
+        <p:sp>
+          <p:nvSpPr>
+            <p:cNvPr id="34" name="Oval 33"/>
+            <p:cNvSpPr/>
+            <p:nvPr/>
+          </p:nvSpPr>
+          <p:spPr>
+            <a:xfrm>
+              <a:off x="3512346" y="930685"/>
+              <a:ext cx="1440649" cy="1371613"/>
+            </a:xfrm>
+            <a:prstGeom prst="ellipse">
+              <a:avLst/>
+            </a:prstGeom>
+          </p:spPr>
+          <p:style>
+            <a:lnRef idx="2">
+              <a:schemeClr val="lt1">
+                <a:hueOff val="0"/>
+                <a:satOff val="0"/>
+                <a:lumOff val="0"/>
+                <a:alphaOff val="0"/>
+              </a:schemeClr>
+            </a:lnRef>
+            <a:fillRef idx="1">
+              <a:schemeClr val="accent1">
+                <a:hueOff val="0"/>
+                <a:satOff val="0"/>
+                <a:lumOff val="0"/>
+                <a:alphaOff val="0"/>
+              </a:schemeClr>
+            </a:fillRef>
+            <a:effectRef idx="0">
+              <a:schemeClr val="accent1">
+                <a:hueOff val="0"/>
+                <a:satOff val="0"/>
+                <a:lumOff val="0"/>
+                <a:alphaOff val="0"/>
+              </a:schemeClr>
+            </a:effectRef>
+            <a:fontRef idx="minor">
+              <a:schemeClr val="lt1"/>
+            </a:fontRef>
+          </p:style>
+        </p:sp>
+        <p:sp>
+          <p:nvSpPr>
+            <p:cNvPr id="35" name="Oval 4"/>
+            <p:cNvSpPr/>
+            <p:nvPr/>
+          </p:nvSpPr>
+          <p:spPr>
+            <a:xfrm>
+              <a:off x="3774230" y="1083086"/>
+              <a:ext cx="1018693" cy="969877"/>
+            </a:xfrm>
+            <a:prstGeom prst="rect">
+              <a:avLst/>
+            </a:prstGeom>
+          </p:spPr>
+          <p:style>
+            <a:lnRef idx="0">
+              <a:scrgbClr r="0" g="0" b="0"/>
+            </a:lnRef>
+            <a:fillRef idx="0">
+              <a:scrgbClr r="0" g="0" b="0"/>
+            </a:fillRef>
+            <a:effectRef idx="0">
+              <a:scrgbClr r="0" g="0" b="0"/>
+            </a:effectRef>
+            <a:fontRef idx="minor">
+              <a:schemeClr val="lt1"/>
+            </a:fontRef>
+          </p:style>
+          <p:txBody>
+            <a:bodyPr spcFirstLastPara="0" vert="horz" wrap="square" lIns="25400" tIns="25400" rIns="25400" bIns="25400" numCol="1" spcCol="1270" anchor="ctr" anchorCtr="0">
+              <a:noAutofit/>
+            </a:bodyPr>
+            <a:lstStyle/>
+            <a:p>
+              <a:pPr lvl="0" algn="ctr" defTabSz="889000">
+                <a:lnSpc>
+                  <a:spcPct val="90000"/>
+                </a:lnSpc>
+                <a:spcBef>
+                  <a:spcPct val="0"/>
+                </a:spcBef>
+                <a:spcAft>
+                  <a:spcPct val="35000"/>
+                </a:spcAft>
+              </a:pPr>
+              <a:r>
+                <a:rPr lang="en-US" sz="1200" b="1" kern="1200" dirty="0" smtClean="0"/>
+                <a:t>Result</a:t>
+              </a:r>
+              <a:endParaRPr lang="en-US" sz="1200" b="1" kern="1200" dirty="0"/>
+            </a:p>
+          </p:txBody>
+        </p:sp>
+      </p:grpSp>
+      <p:grpSp>
+        <p:nvGrpSpPr>
+          <p:cNvPr id="36" name="Group 89"/>
+          <p:cNvGrpSpPr/>
+          <p:nvPr/>
+        </p:nvGrpSpPr>
+        <p:grpSpPr>
+          <a:xfrm>
+            <a:off x="6858000" y="3063818"/>
+            <a:ext cx="685800" cy="685800"/>
+            <a:chOff x="3512346" y="1346193"/>
+            <a:chExt cx="1440649" cy="1371613"/>
+          </a:xfrm>
+        </p:grpSpPr>
+        <p:sp>
+          <p:nvSpPr>
+            <p:cNvPr id="37" name="Oval 36"/>
+            <p:cNvSpPr/>
+            <p:nvPr/>
+          </p:nvSpPr>
+          <p:spPr>
+            <a:xfrm>
+              <a:off x="3512346" y="1346193"/>
+              <a:ext cx="1440649" cy="1371613"/>
+            </a:xfrm>
+            <a:prstGeom prst="ellipse">
+              <a:avLst/>
+            </a:prstGeom>
+            <a:solidFill>
+              <a:schemeClr val="accent1"/>
+            </a:solidFill>
+          </p:spPr>
+          <p:style>
+            <a:lnRef idx="2">
+              <a:schemeClr val="lt1">
+                <a:hueOff val="0"/>
+                <a:satOff val="0"/>
+                <a:lumOff val="0"/>
+                <a:alphaOff val="0"/>
+              </a:schemeClr>
+            </a:lnRef>
+            <a:fillRef idx="1">
+              <a:schemeClr val="accent1">
+                <a:hueOff val="0"/>
+                <a:satOff val="0"/>
+                <a:lumOff val="0"/>
+                <a:alphaOff val="0"/>
+              </a:schemeClr>
+            </a:fillRef>
+            <a:effectRef idx="0">
+              <a:schemeClr val="accent1">
+                <a:hueOff val="0"/>
+                <a:satOff val="0"/>
+                <a:lumOff val="0"/>
+                <a:alphaOff val="0"/>
+              </a:schemeClr>
+            </a:effectRef>
+            <a:fontRef idx="minor">
+              <a:schemeClr val="lt1"/>
+            </a:fontRef>
+          </p:style>
+        </p:sp>
+        <p:sp>
+          <p:nvSpPr>
+            <p:cNvPr id="38" name="Oval 4"/>
+            <p:cNvSpPr/>
+            <p:nvPr/>
+          </p:nvSpPr>
+          <p:spPr>
+            <a:xfrm>
+              <a:off x="3723324" y="1547061"/>
+              <a:ext cx="1018693" cy="969877"/>
+            </a:xfrm>
+            <a:prstGeom prst="rect">
+              <a:avLst/>
+            </a:prstGeom>
+          </p:spPr>
+          <p:style>
+            <a:lnRef idx="0">
+              <a:scrgbClr r="0" g="0" b="0"/>
+            </a:lnRef>
+            <a:fillRef idx="0">
+              <a:scrgbClr r="0" g="0" b="0"/>
+            </a:fillRef>
+            <a:effectRef idx="0">
+              <a:scrgbClr r="0" g="0" b="0"/>
+            </a:effectRef>
+            <a:fontRef idx="minor">
+              <a:schemeClr val="lt1"/>
+            </a:fontRef>
+          </p:style>
+          <p:txBody>
+            <a:bodyPr spcFirstLastPara="0" vert="horz" wrap="square" lIns="25400" tIns="25400" rIns="25400" bIns="25400" numCol="1" spcCol="1270" anchor="ctr" anchorCtr="0">
+              <a:noAutofit/>
+            </a:bodyPr>
+            <a:lstStyle/>
+            <a:p>
+              <a:pPr lvl="0" algn="ctr" defTabSz="889000">
+                <a:lnSpc>
+                  <a:spcPct val="90000"/>
+                </a:lnSpc>
+                <a:spcBef>
+                  <a:spcPct val="0"/>
+                </a:spcBef>
+                <a:spcAft>
+                  <a:spcPct val="35000"/>
+                </a:spcAft>
+              </a:pPr>
+              <a:r>
+                <a:rPr lang="en-US" sz="1200" b="1" kern="1200" dirty="0" smtClean="0"/>
+                <a:t>Result</a:t>
+              </a:r>
+              <a:endParaRPr lang="en-US" sz="1200" b="1" kern="1200" dirty="0"/>
+            </a:p>
+          </p:txBody>
+        </p:sp>
+      </p:grpSp>
+      <p:grpSp>
+        <p:nvGrpSpPr>
+          <p:cNvPr id="39" name="Group 89"/>
+          <p:cNvGrpSpPr/>
+          <p:nvPr/>
+        </p:nvGrpSpPr>
+        <p:grpSpPr>
+          <a:xfrm>
+            <a:off x="6858000" y="3521018"/>
+            <a:ext cx="685800" cy="685800"/>
+            <a:chOff x="3512346" y="1346193"/>
+            <a:chExt cx="1440649" cy="1371613"/>
+          </a:xfrm>
+        </p:grpSpPr>
+        <p:sp>
+          <p:nvSpPr>
+            <p:cNvPr id="40" name="Oval 39"/>
+            <p:cNvSpPr/>
+            <p:nvPr/>
+          </p:nvSpPr>
+          <p:spPr>
+            <a:xfrm>
+              <a:off x="3512346" y="1346193"/>
+              <a:ext cx="1440649" cy="1371613"/>
+            </a:xfrm>
+            <a:prstGeom prst="ellipse">
+              <a:avLst/>
+            </a:prstGeom>
+            <a:solidFill>
+              <a:schemeClr val="accent3">
+                <a:lumMod val="40000"/>
+                <a:lumOff val="60000"/>
+              </a:schemeClr>
+            </a:solidFill>
+          </p:spPr>
+          <p:style>
+            <a:lnRef idx="2">
+              <a:schemeClr val="lt1">
+                <a:hueOff val="0"/>
+                <a:satOff val="0"/>
+                <a:lumOff val="0"/>
+                <a:alphaOff val="0"/>
+              </a:schemeClr>
+            </a:lnRef>
+            <a:fillRef idx="1">
+              <a:schemeClr val="accent1">
+                <a:hueOff val="0"/>
+                <a:satOff val="0"/>
+                <a:lumOff val="0"/>
+                <a:alphaOff val="0"/>
+              </a:schemeClr>
+            </a:fillRef>
+            <a:effectRef idx="0">
+              <a:schemeClr val="accent1">
+                <a:hueOff val="0"/>
+                <a:satOff val="0"/>
+                <a:lumOff val="0"/>
+                <a:alphaOff val="0"/>
+              </a:schemeClr>
+            </a:effectRef>
+            <a:fontRef idx="minor">
+              <a:schemeClr val="lt1"/>
+            </a:fontRef>
+          </p:style>
+        </p:sp>
+        <p:sp>
+          <p:nvSpPr>
+            <p:cNvPr id="41" name="Oval 4"/>
+            <p:cNvSpPr/>
+            <p:nvPr/>
+          </p:nvSpPr>
+          <p:spPr>
+            <a:xfrm>
+              <a:off x="3723324" y="1547061"/>
+              <a:ext cx="1018693" cy="969877"/>
+            </a:xfrm>
+            <a:prstGeom prst="rect">
+              <a:avLst/>
+            </a:prstGeom>
+          </p:spPr>
+          <p:style>
+            <a:lnRef idx="0">
+              <a:scrgbClr r="0" g="0" b="0"/>
+            </a:lnRef>
+            <a:fillRef idx="0">
+              <a:scrgbClr r="0" g="0" b="0"/>
+            </a:fillRef>
+            <a:effectRef idx="0">
+              <a:scrgbClr r="0" g="0" b="0"/>
+            </a:effectRef>
+            <a:fontRef idx="minor">
+              <a:schemeClr val="lt1"/>
+            </a:fontRef>
+          </p:style>
+          <p:txBody>
+            <a:bodyPr spcFirstLastPara="0" vert="horz" wrap="square" lIns="25400" tIns="25400" rIns="25400" bIns="25400" numCol="1" spcCol="1270" anchor="ctr" anchorCtr="0">
+              <a:noAutofit/>
+            </a:bodyPr>
+            <a:lstStyle/>
+            <a:p>
+              <a:pPr lvl="0" algn="ctr" defTabSz="889000">
+                <a:lnSpc>
+                  <a:spcPct val="90000"/>
+                </a:lnSpc>
+                <a:spcBef>
+                  <a:spcPct val="0"/>
+                </a:spcBef>
+                <a:spcAft>
+                  <a:spcPct val="35000"/>
+                </a:spcAft>
+              </a:pPr>
+              <a:r>
+                <a:rPr lang="en-US" sz="1200" b="1" kern="1200" dirty="0" smtClean="0"/>
+                <a:t>Result</a:t>
+              </a:r>
+              <a:endParaRPr lang="en-US" sz="1200" b="1" kern="1200" dirty="0"/>
+            </a:p>
+          </p:txBody>
+        </p:sp>
+      </p:grpSp>
+      <p:cxnSp>
+        <p:nvCxnSpPr>
+          <p:cNvPr id="44" name="Straight Arrow Connector 43"/>
+          <p:cNvCxnSpPr>
+            <a:stCxn id="37" idx="2"/>
+          </p:cNvCxnSpPr>
+          <p:nvPr/>
+        </p:nvCxnSpPr>
+        <p:spPr>
+          <a:xfrm flipH="1">
+            <a:off x="6096000" y="3406718"/>
+            <a:ext cx="762000" cy="114300"/>
+          </a:xfrm>
+          <a:prstGeom prst="straightConnector1">
+            <a:avLst/>
+          </a:prstGeom>
+          <a:ln>
+            <a:tailEnd type="arrow"/>
+          </a:ln>
+        </p:spPr>
+        <p:style>
+          <a:lnRef idx="1">
+            <a:schemeClr val="accent1"/>
+          </a:lnRef>
+          <a:fillRef idx="0">
+            <a:schemeClr val="accent1"/>
+          </a:fillRef>
+          <a:effectRef idx="0">
+            <a:schemeClr val="accent1"/>
+          </a:effectRef>
+          <a:fontRef idx="minor">
+            <a:schemeClr val="tx1"/>
+          </a:fontRef>
+        </p:style>
+      </p:cxnSp>
+      <p:grpSp>
+        <p:nvGrpSpPr>
+          <p:cNvPr id="45" name="Group 89"/>
+          <p:cNvGrpSpPr/>
+          <p:nvPr/>
+        </p:nvGrpSpPr>
+        <p:grpSpPr>
+          <a:xfrm>
+            <a:off x="6858000" y="1143000"/>
+            <a:ext cx="685800" cy="685800"/>
+            <a:chOff x="3512346" y="1346193"/>
+            <a:chExt cx="1440649" cy="1371613"/>
+          </a:xfrm>
+        </p:grpSpPr>
+        <p:sp>
+          <p:nvSpPr>
+            <p:cNvPr id="46" name="Oval 45"/>
+            <p:cNvSpPr/>
+            <p:nvPr/>
+          </p:nvSpPr>
+          <p:spPr>
+            <a:xfrm>
+              <a:off x="3512346" y="1346193"/>
+              <a:ext cx="1440649" cy="1371613"/>
+            </a:xfrm>
+            <a:prstGeom prst="ellipse">
+              <a:avLst/>
+            </a:prstGeom>
+          </p:spPr>
+          <p:style>
+            <a:lnRef idx="2">
+              <a:schemeClr val="lt1">
+                <a:hueOff val="0"/>
+                <a:satOff val="0"/>
+                <a:lumOff val="0"/>
+                <a:alphaOff val="0"/>
+              </a:schemeClr>
+            </a:lnRef>
+            <a:fillRef idx="1">
+              <a:schemeClr val="accent1">
+                <a:hueOff val="0"/>
+                <a:satOff val="0"/>
+                <a:lumOff val="0"/>
+                <a:alphaOff val="0"/>
+              </a:schemeClr>
+            </a:fillRef>
+            <a:effectRef idx="0">
+              <a:schemeClr val="accent1">
+                <a:hueOff val="0"/>
+                <a:satOff val="0"/>
+                <a:lumOff val="0"/>
+                <a:alphaOff val="0"/>
+              </a:schemeClr>
+            </a:effectRef>
+            <a:fontRef idx="minor">
+              <a:schemeClr val="lt1"/>
+            </a:fontRef>
+          </p:style>
+        </p:sp>
+        <p:sp>
+          <p:nvSpPr>
+            <p:cNvPr id="47" name="Oval 4"/>
+            <p:cNvSpPr/>
+            <p:nvPr/>
+          </p:nvSpPr>
+          <p:spPr>
+            <a:xfrm>
+              <a:off x="3723324" y="1547061"/>
+              <a:ext cx="1018693" cy="969877"/>
+            </a:xfrm>
+            <a:prstGeom prst="rect">
+              <a:avLst/>
+            </a:prstGeom>
+          </p:spPr>
+          <p:style>
+            <a:lnRef idx="0">
+              <a:scrgbClr r="0" g="0" b="0"/>
+            </a:lnRef>
+            <a:fillRef idx="0">
+              <a:scrgbClr r="0" g="0" b="0"/>
+            </a:fillRef>
+            <a:effectRef idx="0">
+              <a:scrgbClr r="0" g="0" b="0"/>
+            </a:effectRef>
+            <a:fontRef idx="minor">
+              <a:schemeClr val="lt1"/>
+            </a:fontRef>
+          </p:style>
+          <p:txBody>
+            <a:bodyPr spcFirstLastPara="0" vert="horz" wrap="square" lIns="25400" tIns="25400" rIns="25400" bIns="25400" numCol="1" spcCol="1270" anchor="ctr" anchorCtr="0">
+              <a:noAutofit/>
+            </a:bodyPr>
+            <a:lstStyle/>
+            <a:p>
+              <a:pPr lvl="0" algn="ctr" defTabSz="889000">
+                <a:lnSpc>
+                  <a:spcPct val="90000"/>
+                </a:lnSpc>
+                <a:spcBef>
+                  <a:spcPct val="0"/>
+                </a:spcBef>
+                <a:spcAft>
+                  <a:spcPct val="35000"/>
+                </a:spcAft>
+              </a:pPr>
+              <a:r>
+                <a:rPr lang="en-US" sz="1200" b="1" kern="1200" dirty="0" smtClean="0"/>
+                <a:t>Result</a:t>
+              </a:r>
+              <a:endParaRPr lang="en-US" sz="1200" b="1" kern="1200" dirty="0"/>
+            </a:p>
+          </p:txBody>
+        </p:sp>
+      </p:grpSp>
+      <p:grpSp>
+        <p:nvGrpSpPr>
+          <p:cNvPr id="48" name="Group 93"/>
+          <p:cNvGrpSpPr/>
+          <p:nvPr/>
+        </p:nvGrpSpPr>
+        <p:grpSpPr>
+          <a:xfrm>
+            <a:off x="6858000" y="1692218"/>
+            <a:ext cx="685800" cy="685800"/>
+            <a:chOff x="3512346" y="1193792"/>
+            <a:chExt cx="1440649" cy="1371613"/>
+          </a:xfrm>
+        </p:grpSpPr>
+        <p:sp>
+          <p:nvSpPr>
+            <p:cNvPr id="49" name="Oval 48"/>
+            <p:cNvSpPr/>
+            <p:nvPr/>
+          </p:nvSpPr>
+          <p:spPr>
+            <a:xfrm>
+              <a:off x="3512346" y="1193792"/>
+              <a:ext cx="1440649" cy="1371613"/>
+            </a:xfrm>
+            <a:prstGeom prst="ellipse">
+              <a:avLst/>
+            </a:prstGeom>
+            <a:solidFill>
+              <a:schemeClr val="accent3">
+                <a:lumMod val="40000"/>
+                <a:lumOff val="60000"/>
+              </a:schemeClr>
+            </a:solidFill>
+          </p:spPr>
+          <p:style>
+            <a:lnRef idx="2">
+              <a:schemeClr val="lt1">
+                <a:hueOff val="0"/>
+                <a:satOff val="0"/>
+                <a:lumOff val="0"/>
+                <a:alphaOff val="0"/>
+              </a:schemeClr>
+            </a:lnRef>
+            <a:fillRef idx="1">
+              <a:schemeClr val="accent1">
+                <a:hueOff val="0"/>
+                <a:satOff val="0"/>
+                <a:lumOff val="0"/>
+                <a:alphaOff val="0"/>
+              </a:schemeClr>
+            </a:fillRef>
+            <a:effectRef idx="0">
+              <a:schemeClr val="accent1">
+                <a:hueOff val="0"/>
+                <a:satOff val="0"/>
+                <a:lumOff val="0"/>
+                <a:alphaOff val="0"/>
+              </a:schemeClr>
+            </a:effectRef>
+            <a:fontRef idx="minor">
+              <a:schemeClr val="lt1"/>
+            </a:fontRef>
+          </p:style>
+        </p:sp>
+        <p:sp>
+          <p:nvSpPr>
+            <p:cNvPr id="50" name="Oval 4"/>
+            <p:cNvSpPr/>
+            <p:nvPr/>
+          </p:nvSpPr>
+          <p:spPr>
+            <a:xfrm>
+              <a:off x="3723324" y="1411490"/>
+              <a:ext cx="1018693" cy="969877"/>
+            </a:xfrm>
+            <a:prstGeom prst="rect">
+              <a:avLst/>
+            </a:prstGeom>
+          </p:spPr>
+          <p:style>
+            <a:lnRef idx="0">
+              <a:scrgbClr r="0" g="0" b="0"/>
+            </a:lnRef>
+            <a:fillRef idx="0">
+              <a:scrgbClr r="0" g="0" b="0"/>
+            </a:fillRef>
+            <a:effectRef idx="0">
+              <a:scrgbClr r="0" g="0" b="0"/>
+            </a:effectRef>
+            <a:fontRef idx="minor">
+              <a:schemeClr val="lt1"/>
+            </a:fontRef>
+          </p:style>
+          <p:txBody>
+            <a:bodyPr spcFirstLastPara="0" vert="horz" wrap="square" lIns="25400" tIns="25400" rIns="25400" bIns="25400" numCol="1" spcCol="1270" anchor="ctr" anchorCtr="0">
+              <a:noAutofit/>
+            </a:bodyPr>
+            <a:lstStyle/>
+            <a:p>
+              <a:pPr lvl="0" algn="ctr" defTabSz="889000">
+                <a:lnSpc>
+                  <a:spcPct val="90000"/>
+                </a:lnSpc>
+                <a:spcBef>
+                  <a:spcPct val="0"/>
+                </a:spcBef>
+                <a:spcAft>
+                  <a:spcPct val="35000"/>
+                </a:spcAft>
+              </a:pPr>
+              <a:r>
+                <a:rPr lang="en-US" sz="1200" b="1" kern="1200" dirty="0" smtClean="0"/>
+                <a:t>Result</a:t>
+              </a:r>
+              <a:endParaRPr lang="en-US" sz="1200" b="1" kern="1200" dirty="0"/>
+            </a:p>
+          </p:txBody>
+        </p:sp>
+      </p:grpSp>
+      <p:cxnSp>
+        <p:nvCxnSpPr>
+          <p:cNvPr id="51" name="Straight Arrow Connector 50"/>
+          <p:cNvCxnSpPr>
+            <a:stCxn id="46" idx="2"/>
+          </p:cNvCxnSpPr>
+          <p:nvPr/>
+        </p:nvCxnSpPr>
+        <p:spPr>
+          <a:xfrm flipH="1">
+            <a:off x="6096000" y="1485900"/>
+            <a:ext cx="762000" cy="0"/>
+          </a:xfrm>
+          <a:prstGeom prst="straightConnector1">
+            <a:avLst/>
+          </a:prstGeom>
+          <a:ln>
+            <a:tailEnd type="arrow"/>
+          </a:ln>
+        </p:spPr>
+        <p:style>
+          <a:lnRef idx="1">
+            <a:schemeClr val="accent1"/>
+          </a:lnRef>
+          <a:fillRef idx="0">
+            <a:schemeClr val="accent1"/>
+          </a:fillRef>
+          <a:effectRef idx="0">
+            <a:schemeClr val="accent1"/>
+          </a:effectRef>
+          <a:fontRef idx="minor">
+            <a:schemeClr val="tx1"/>
+          </a:fontRef>
+        </p:style>
+      </p:cxnSp>
+      <p:cxnSp>
+        <p:nvCxnSpPr>
+          <p:cNvPr id="53" name="Straight Arrow Connector 52"/>
+          <p:cNvCxnSpPr>
+            <a:stCxn id="49" idx="2"/>
+          </p:cNvCxnSpPr>
+          <p:nvPr/>
+        </p:nvCxnSpPr>
+        <p:spPr>
+          <a:xfrm flipH="1">
+            <a:off x="6096000" y="2035118"/>
+            <a:ext cx="762000" cy="0"/>
+          </a:xfrm>
+          <a:prstGeom prst="straightConnector1">
+            <a:avLst/>
+          </a:prstGeom>
+          <a:ln>
+            <a:tailEnd type="arrow"/>
+          </a:ln>
+        </p:spPr>
+        <p:style>
+          <a:lnRef idx="1">
+            <a:schemeClr val="accent1"/>
+          </a:lnRef>
+          <a:fillRef idx="0">
+            <a:schemeClr val="accent1"/>
+          </a:fillRef>
+          <a:effectRef idx="0">
+            <a:schemeClr val="accent1"/>
+          </a:effectRef>
+          <a:fontRef idx="minor">
+            <a:schemeClr val="tx1"/>
+          </a:fontRef>
+        </p:style>
+      </p:cxnSp>
+      <p:cxnSp>
+        <p:nvCxnSpPr>
+          <p:cNvPr id="55" name="Straight Arrow Connector 54"/>
+          <p:cNvCxnSpPr>
+            <a:stCxn id="34" idx="2"/>
+          </p:cNvCxnSpPr>
+          <p:nvPr/>
+        </p:nvCxnSpPr>
+        <p:spPr>
+          <a:xfrm flipH="1">
+            <a:off x="6096000" y="2873318"/>
+            <a:ext cx="762000" cy="131552"/>
+          </a:xfrm>
+          <a:prstGeom prst="straightConnector1">
+            <a:avLst/>
+          </a:prstGeom>
+          <a:ln>
+            <a:tailEnd type="arrow"/>
+          </a:ln>
+        </p:spPr>
+        <p:style>
+          <a:lnRef idx="1">
+            <a:schemeClr val="accent1"/>
+          </a:lnRef>
+          <a:fillRef idx="0">
+            <a:schemeClr val="accent1"/>
+          </a:fillRef>
+          <a:effectRef idx="0">
+            <a:schemeClr val="accent1"/>
+          </a:effectRef>
+          <a:fontRef idx="minor">
+            <a:schemeClr val="tx1"/>
+          </a:fontRef>
+        </p:style>
+      </p:cxnSp>
+      <p:grpSp>
+        <p:nvGrpSpPr>
+          <p:cNvPr id="56" name="Group 89"/>
+          <p:cNvGrpSpPr/>
+          <p:nvPr/>
+        </p:nvGrpSpPr>
+        <p:grpSpPr>
+          <a:xfrm>
+            <a:off x="6858000" y="3902018"/>
+            <a:ext cx="685800" cy="685800"/>
+            <a:chOff x="3512346" y="1346193"/>
+            <a:chExt cx="1440649" cy="1371613"/>
+          </a:xfrm>
+        </p:grpSpPr>
+        <p:sp>
+          <p:nvSpPr>
+            <p:cNvPr id="57" name="Oval 56"/>
+            <p:cNvSpPr/>
+            <p:nvPr/>
+          </p:nvSpPr>
+          <p:spPr>
+            <a:xfrm>
+              <a:off x="3512346" y="1346193"/>
+              <a:ext cx="1440649" cy="1371613"/>
+            </a:xfrm>
+            <a:prstGeom prst="ellipse">
+              <a:avLst/>
+            </a:prstGeom>
+          </p:spPr>
+          <p:style>
+            <a:lnRef idx="2">
+              <a:schemeClr val="lt1">
+                <a:hueOff val="0"/>
+                <a:satOff val="0"/>
+                <a:lumOff val="0"/>
+                <a:alphaOff val="0"/>
+              </a:schemeClr>
+            </a:lnRef>
+            <a:fillRef idx="1">
+              <a:schemeClr val="accent1">
+                <a:hueOff val="0"/>
+                <a:satOff val="0"/>
+                <a:lumOff val="0"/>
+                <a:alphaOff val="0"/>
+              </a:schemeClr>
+            </a:fillRef>
+            <a:effectRef idx="0">
+              <a:schemeClr val="accent1">
+                <a:hueOff val="0"/>
+                <a:satOff val="0"/>
+                <a:lumOff val="0"/>
+                <a:alphaOff val="0"/>
+              </a:schemeClr>
+            </a:effectRef>
+            <a:fontRef idx="minor">
+              <a:schemeClr val="lt1"/>
+            </a:fontRef>
+          </p:style>
+        </p:sp>
+        <p:sp>
+          <p:nvSpPr>
+            <p:cNvPr id="58" name="Oval 4"/>
+            <p:cNvSpPr/>
+            <p:nvPr/>
+          </p:nvSpPr>
+          <p:spPr>
+            <a:xfrm>
+              <a:off x="3723324" y="1547061"/>
+              <a:ext cx="1018693" cy="969877"/>
+            </a:xfrm>
+            <a:prstGeom prst="rect">
+              <a:avLst/>
+            </a:prstGeom>
+          </p:spPr>
+          <p:style>
+            <a:lnRef idx="0">
+              <a:scrgbClr r="0" g="0" b="0"/>
+            </a:lnRef>
+            <a:fillRef idx="0">
+              <a:scrgbClr r="0" g="0" b="0"/>
+            </a:fillRef>
+            <a:effectRef idx="0">
+              <a:scrgbClr r="0" g="0" b="0"/>
+            </a:effectRef>
+            <a:fontRef idx="minor">
+              <a:schemeClr val="lt1"/>
+            </a:fontRef>
+          </p:style>
+          <p:txBody>
+            <a:bodyPr spcFirstLastPara="0" vert="horz" wrap="square" lIns="25400" tIns="25400" rIns="25400" bIns="25400" numCol="1" spcCol="1270" anchor="ctr" anchorCtr="0">
+              <a:noAutofit/>
+            </a:bodyPr>
+            <a:lstStyle/>
+            <a:p>
+              <a:pPr lvl="0" algn="ctr" defTabSz="889000">
+                <a:lnSpc>
+                  <a:spcPct val="90000"/>
+                </a:lnSpc>
+                <a:spcBef>
+                  <a:spcPct val="0"/>
+                </a:spcBef>
+                <a:spcAft>
+                  <a:spcPct val="35000"/>
+                </a:spcAft>
+              </a:pPr>
+              <a:r>
+                <a:rPr lang="en-US" sz="1200" b="1" kern="1200" dirty="0" smtClean="0"/>
+                <a:t>Result</a:t>
+              </a:r>
+              <a:endParaRPr lang="en-US" sz="1200" b="1" kern="1200" dirty="0"/>
+            </a:p>
+          </p:txBody>
+        </p:sp>
+      </p:grpSp>
+      <p:grpSp>
+        <p:nvGrpSpPr>
+          <p:cNvPr id="59" name="Group 89"/>
+          <p:cNvGrpSpPr/>
+          <p:nvPr/>
+        </p:nvGrpSpPr>
+        <p:grpSpPr>
+          <a:xfrm>
+            <a:off x="6858000" y="4435418"/>
+            <a:ext cx="685800" cy="685800"/>
+            <a:chOff x="3512346" y="1346193"/>
+            <a:chExt cx="1440649" cy="1371613"/>
+          </a:xfrm>
+        </p:grpSpPr>
+        <p:sp>
+          <p:nvSpPr>
+            <p:cNvPr id="61" name="Oval 60"/>
+            <p:cNvSpPr/>
+            <p:nvPr/>
+          </p:nvSpPr>
+          <p:spPr>
+            <a:xfrm>
+              <a:off x="3512346" y="1346193"/>
+              <a:ext cx="1440649" cy="1371613"/>
+            </a:xfrm>
+            <a:prstGeom prst="ellipse">
+              <a:avLst/>
+            </a:prstGeom>
+            <a:solidFill>
+              <a:schemeClr val="accent3">
+                <a:lumMod val="40000"/>
+                <a:lumOff val="60000"/>
+              </a:schemeClr>
+            </a:solidFill>
+          </p:spPr>
+          <p:style>
+            <a:lnRef idx="2">
+              <a:schemeClr val="lt1">
+                <a:hueOff val="0"/>
+                <a:satOff val="0"/>
+                <a:lumOff val="0"/>
+                <a:alphaOff val="0"/>
+              </a:schemeClr>
+            </a:lnRef>
+            <a:fillRef idx="1">
+              <a:schemeClr val="accent1">
+                <a:hueOff val="0"/>
+                <a:satOff val="0"/>
+                <a:lumOff val="0"/>
+                <a:alphaOff val="0"/>
+              </a:schemeClr>
+            </a:fillRef>
+            <a:effectRef idx="0">
+              <a:schemeClr val="accent1">
+                <a:hueOff val="0"/>
+                <a:satOff val="0"/>
+                <a:lumOff val="0"/>
+                <a:alphaOff val="0"/>
+              </a:schemeClr>
+            </a:effectRef>
+            <a:fontRef idx="minor">
+              <a:schemeClr val="lt1"/>
+            </a:fontRef>
+          </p:style>
+        </p:sp>
+        <p:sp>
+          <p:nvSpPr>
+            <p:cNvPr id="62" name="Oval 4"/>
+            <p:cNvSpPr/>
+            <p:nvPr/>
+          </p:nvSpPr>
+          <p:spPr>
+            <a:xfrm>
+              <a:off x="3723324" y="1547061"/>
+              <a:ext cx="1018693" cy="969877"/>
+            </a:xfrm>
+            <a:prstGeom prst="rect">
+              <a:avLst/>
+            </a:prstGeom>
+          </p:spPr>
+          <p:style>
+            <a:lnRef idx="0">
+              <a:scrgbClr r="0" g="0" b="0"/>
+            </a:lnRef>
+            <a:fillRef idx="0">
+              <a:scrgbClr r="0" g="0" b="0"/>
+            </a:fillRef>
+            <a:effectRef idx="0">
+              <a:scrgbClr r="0" g="0" b="0"/>
+            </a:effectRef>
+            <a:fontRef idx="minor">
+              <a:schemeClr val="lt1"/>
+            </a:fontRef>
+          </p:style>
+          <p:txBody>
+            <a:bodyPr spcFirstLastPara="0" vert="horz" wrap="square" lIns="25400" tIns="25400" rIns="25400" bIns="25400" numCol="1" spcCol="1270" anchor="ctr" anchorCtr="0">
+              <a:noAutofit/>
+            </a:bodyPr>
+            <a:lstStyle/>
+            <a:p>
+              <a:pPr lvl="0" algn="ctr" defTabSz="889000">
+                <a:lnSpc>
+                  <a:spcPct val="90000"/>
+                </a:lnSpc>
+                <a:spcBef>
+                  <a:spcPct val="0"/>
+                </a:spcBef>
+                <a:spcAft>
+                  <a:spcPct val="35000"/>
+                </a:spcAft>
+              </a:pPr>
+              <a:r>
+                <a:rPr lang="en-US" sz="1200" b="1" kern="1200" dirty="0" smtClean="0"/>
+                <a:t>Result</a:t>
+              </a:r>
+              <a:endParaRPr lang="en-US" sz="1200" b="1" kern="1200" dirty="0"/>
+            </a:p>
+          </p:txBody>
+        </p:sp>
+      </p:grpSp>
+      <p:grpSp>
+        <p:nvGrpSpPr>
+          <p:cNvPr id="63" name="Group 89"/>
+          <p:cNvGrpSpPr/>
+          <p:nvPr/>
+        </p:nvGrpSpPr>
+        <p:grpSpPr>
+          <a:xfrm>
+            <a:off x="6858000" y="4816418"/>
+            <a:ext cx="685800" cy="685800"/>
+            <a:chOff x="3512346" y="1346193"/>
+            <a:chExt cx="1440649" cy="1371613"/>
+          </a:xfrm>
+        </p:grpSpPr>
+        <p:sp>
+          <p:nvSpPr>
+            <p:cNvPr id="66" name="Oval 65"/>
+            <p:cNvSpPr/>
+            <p:nvPr/>
+          </p:nvSpPr>
+          <p:spPr>
+            <a:xfrm>
+              <a:off x="3512346" y="1346193"/>
+              <a:ext cx="1440649" cy="1371613"/>
+            </a:xfrm>
+            <a:prstGeom prst="ellipse">
+              <a:avLst/>
+            </a:prstGeom>
+          </p:spPr>
+          <p:style>
+            <a:lnRef idx="2">
+              <a:schemeClr val="lt1">
+                <a:hueOff val="0"/>
+                <a:satOff val="0"/>
+                <a:lumOff val="0"/>
+                <a:alphaOff val="0"/>
+              </a:schemeClr>
+            </a:lnRef>
+            <a:fillRef idx="1">
+              <a:schemeClr val="accent1">
+                <a:hueOff val="0"/>
+                <a:satOff val="0"/>
+                <a:lumOff val="0"/>
+                <a:alphaOff val="0"/>
+              </a:schemeClr>
+            </a:fillRef>
+            <a:effectRef idx="0">
+              <a:schemeClr val="accent1">
+                <a:hueOff val="0"/>
+                <a:satOff val="0"/>
+                <a:lumOff val="0"/>
+                <a:alphaOff val="0"/>
+              </a:schemeClr>
+            </a:effectRef>
+            <a:fontRef idx="minor">
+              <a:schemeClr val="lt1"/>
+            </a:fontRef>
+          </p:style>
+        </p:sp>
+        <p:sp>
+          <p:nvSpPr>
+            <p:cNvPr id="69" name="Oval 4"/>
+            <p:cNvSpPr/>
+            <p:nvPr/>
+          </p:nvSpPr>
+          <p:spPr>
+            <a:xfrm>
+              <a:off x="3723324" y="1547061"/>
+              <a:ext cx="1018693" cy="969877"/>
+            </a:xfrm>
+            <a:prstGeom prst="rect">
+              <a:avLst/>
+            </a:prstGeom>
+          </p:spPr>
+          <p:style>
+            <a:lnRef idx="0">
+              <a:scrgbClr r="0" g="0" b="0"/>
+            </a:lnRef>
+            <a:fillRef idx="0">
+              <a:scrgbClr r="0" g="0" b="0"/>
+            </a:fillRef>
+            <a:effectRef idx="0">
+              <a:scrgbClr r="0" g="0" b="0"/>
+            </a:effectRef>
+            <a:fontRef idx="minor">
+              <a:schemeClr val="lt1"/>
+            </a:fontRef>
+          </p:style>
+          <p:txBody>
+            <a:bodyPr spcFirstLastPara="0" vert="horz" wrap="square" lIns="25400" tIns="25400" rIns="25400" bIns="25400" numCol="1" spcCol="1270" anchor="ctr" anchorCtr="0">
+              <a:noAutofit/>
+            </a:bodyPr>
+            <a:lstStyle/>
+            <a:p>
+              <a:pPr lvl="0" algn="ctr" defTabSz="889000">
+                <a:lnSpc>
+                  <a:spcPct val="90000"/>
+                </a:lnSpc>
+                <a:spcBef>
+                  <a:spcPct val="0"/>
+                </a:spcBef>
+                <a:spcAft>
+                  <a:spcPct val="35000"/>
+                </a:spcAft>
+              </a:pPr>
+              <a:r>
+                <a:rPr lang="en-US" sz="1200" b="1" kern="1200" dirty="0" smtClean="0"/>
+                <a:t>Result</a:t>
+              </a:r>
+              <a:endParaRPr lang="en-US" sz="1200" b="1" kern="1200" dirty="0"/>
+            </a:p>
+          </p:txBody>
+        </p:sp>
+      </p:grpSp>
+      <p:grpSp>
+        <p:nvGrpSpPr>
+          <p:cNvPr id="70" name="Group 89"/>
+          <p:cNvGrpSpPr/>
+          <p:nvPr/>
+        </p:nvGrpSpPr>
+        <p:grpSpPr>
+          <a:xfrm>
+            <a:off x="6858000" y="5197418"/>
+            <a:ext cx="685800" cy="685800"/>
+            <a:chOff x="3512346" y="1346193"/>
+            <a:chExt cx="1440649" cy="1371613"/>
+          </a:xfrm>
+        </p:grpSpPr>
+        <p:sp>
+          <p:nvSpPr>
+            <p:cNvPr id="71" name="Oval 70"/>
+            <p:cNvSpPr/>
+            <p:nvPr/>
+          </p:nvSpPr>
+          <p:spPr>
+            <a:xfrm>
+              <a:off x="3512346" y="1346193"/>
+              <a:ext cx="1440649" cy="1371613"/>
+            </a:xfrm>
+            <a:prstGeom prst="ellipse">
+              <a:avLst/>
+            </a:prstGeom>
+          </p:spPr>
+          <p:style>
+            <a:lnRef idx="2">
+              <a:schemeClr val="lt1">
+                <a:hueOff val="0"/>
+                <a:satOff val="0"/>
+                <a:lumOff val="0"/>
+                <a:alphaOff val="0"/>
+              </a:schemeClr>
+            </a:lnRef>
+            <a:fillRef idx="1">
+              <a:schemeClr val="accent1">
+                <a:hueOff val="0"/>
+                <a:satOff val="0"/>
+                <a:lumOff val="0"/>
+                <a:alphaOff val="0"/>
+              </a:schemeClr>
+            </a:fillRef>
+            <a:effectRef idx="0">
+              <a:schemeClr val="accent1">
+                <a:hueOff val="0"/>
+                <a:satOff val="0"/>
+                <a:lumOff val="0"/>
+                <a:alphaOff val="0"/>
+              </a:schemeClr>
+            </a:effectRef>
+            <a:fontRef idx="minor">
+              <a:schemeClr val="lt1"/>
+            </a:fontRef>
+          </p:style>
+        </p:sp>
+        <p:sp>
+          <p:nvSpPr>
+            <p:cNvPr id="72" name="Oval 4"/>
+            <p:cNvSpPr/>
+            <p:nvPr/>
+          </p:nvSpPr>
+          <p:spPr>
+            <a:xfrm>
+              <a:off x="3723324" y="1547061"/>
+              <a:ext cx="1018693" cy="969877"/>
+            </a:xfrm>
+            <a:prstGeom prst="rect">
+              <a:avLst/>
+            </a:prstGeom>
+          </p:spPr>
+          <p:style>
+            <a:lnRef idx="0">
+              <a:scrgbClr r="0" g="0" b="0"/>
+            </a:lnRef>
+            <a:fillRef idx="0">
+              <a:scrgbClr r="0" g="0" b="0"/>
+            </a:fillRef>
+            <a:effectRef idx="0">
+              <a:scrgbClr r="0" g="0" b="0"/>
+            </a:effectRef>
+            <a:fontRef idx="minor">
+              <a:schemeClr val="lt1"/>
+            </a:fontRef>
+          </p:style>
+          <p:txBody>
+            <a:bodyPr spcFirstLastPara="0" vert="horz" wrap="square" lIns="25400" tIns="25400" rIns="25400" bIns="25400" numCol="1" spcCol="1270" anchor="ctr" anchorCtr="0">
+              <a:noAutofit/>
+            </a:bodyPr>
+            <a:lstStyle/>
+            <a:p>
+              <a:pPr lvl="0" algn="ctr" defTabSz="889000">
+                <a:lnSpc>
+                  <a:spcPct val="90000"/>
+                </a:lnSpc>
+                <a:spcBef>
+                  <a:spcPct val="0"/>
+                </a:spcBef>
+                <a:spcAft>
+                  <a:spcPct val="35000"/>
+                </a:spcAft>
+              </a:pPr>
+              <a:r>
+                <a:rPr lang="en-US" sz="1200" b="1" kern="1200" dirty="0" smtClean="0"/>
+                <a:t>Result</a:t>
+              </a:r>
+              <a:endParaRPr lang="en-US" sz="1200" b="1" kern="1200" dirty="0"/>
+            </a:p>
+          </p:txBody>
+        </p:sp>
+      </p:grpSp>
+      <p:grpSp>
+        <p:nvGrpSpPr>
+          <p:cNvPr id="73" name="Group 89"/>
+          <p:cNvGrpSpPr/>
+          <p:nvPr/>
+        </p:nvGrpSpPr>
+        <p:grpSpPr>
+          <a:xfrm>
+            <a:off x="6858000" y="5654618"/>
+            <a:ext cx="685800" cy="685800"/>
+            <a:chOff x="3512346" y="1346193"/>
+            <a:chExt cx="1440649" cy="1371613"/>
+          </a:xfrm>
+        </p:grpSpPr>
+        <p:sp>
+          <p:nvSpPr>
+            <p:cNvPr id="74" name="Oval 73"/>
+            <p:cNvSpPr/>
+            <p:nvPr/>
+          </p:nvSpPr>
+          <p:spPr>
+            <a:xfrm>
+              <a:off x="3512346" y="1346193"/>
+              <a:ext cx="1440649" cy="1371613"/>
+            </a:xfrm>
+            <a:prstGeom prst="ellipse">
+              <a:avLst/>
+            </a:prstGeom>
+            <a:solidFill>
+              <a:srgbClr val="FF0000"/>
+            </a:solidFill>
+          </p:spPr>
+          <p:style>
+            <a:lnRef idx="2">
+              <a:schemeClr val="lt1">
+                <a:hueOff val="0"/>
+                <a:satOff val="0"/>
+                <a:lumOff val="0"/>
+                <a:alphaOff val="0"/>
+              </a:schemeClr>
+            </a:lnRef>
+            <a:fillRef idx="1">
+              <a:schemeClr val="accent1">
+                <a:hueOff val="0"/>
+                <a:satOff val="0"/>
+                <a:lumOff val="0"/>
+                <a:alphaOff val="0"/>
+              </a:schemeClr>
+            </a:fillRef>
+            <a:effectRef idx="0">
+              <a:schemeClr val="accent1">
+                <a:hueOff val="0"/>
+                <a:satOff val="0"/>
+                <a:lumOff val="0"/>
+                <a:alphaOff val="0"/>
+              </a:schemeClr>
+            </a:effectRef>
+            <a:fontRef idx="minor">
+              <a:schemeClr val="lt1"/>
+            </a:fontRef>
+          </p:style>
+        </p:sp>
+        <p:sp>
+          <p:nvSpPr>
+            <p:cNvPr id="75" name="Oval 4"/>
+            <p:cNvSpPr/>
+            <p:nvPr/>
+          </p:nvSpPr>
+          <p:spPr>
+            <a:xfrm>
+              <a:off x="3723324" y="1547061"/>
+              <a:ext cx="1018693" cy="969877"/>
+            </a:xfrm>
+            <a:prstGeom prst="rect">
+              <a:avLst/>
+            </a:prstGeom>
+          </p:spPr>
+          <p:style>
+            <a:lnRef idx="0">
+              <a:scrgbClr r="0" g="0" b="0"/>
+            </a:lnRef>
+            <a:fillRef idx="0">
+              <a:scrgbClr r="0" g="0" b="0"/>
+            </a:fillRef>
+            <a:effectRef idx="0">
+              <a:scrgbClr r="0" g="0" b="0"/>
+            </a:effectRef>
+            <a:fontRef idx="minor">
+              <a:schemeClr val="lt1"/>
+            </a:fontRef>
+          </p:style>
+          <p:txBody>
+            <a:bodyPr spcFirstLastPara="0" vert="horz" wrap="square" lIns="25400" tIns="25400" rIns="25400" bIns="25400" numCol="1" spcCol="1270" anchor="ctr" anchorCtr="0">
+              <a:noAutofit/>
+            </a:bodyPr>
+            <a:lstStyle/>
+            <a:p>
+              <a:pPr lvl="0" algn="ctr" defTabSz="889000">
+                <a:lnSpc>
+                  <a:spcPct val="90000"/>
+                </a:lnSpc>
+                <a:spcBef>
+                  <a:spcPct val="0"/>
+                </a:spcBef>
+                <a:spcAft>
+                  <a:spcPct val="35000"/>
+                </a:spcAft>
+              </a:pPr>
+              <a:r>
+                <a:rPr lang="en-US" sz="1200" b="1" kern="1200" dirty="0" smtClean="0"/>
+                <a:t>Result</a:t>
+              </a:r>
+              <a:endParaRPr lang="en-US" sz="1200" b="1" kern="1200" dirty="0"/>
+            </a:p>
+          </p:txBody>
+        </p:sp>
+      </p:grpSp>
+      <p:cxnSp>
+        <p:nvCxnSpPr>
+          <p:cNvPr id="76" name="Straight Arrow Connector 75"/>
+          <p:cNvCxnSpPr>
+            <a:stCxn id="40" idx="2"/>
+          </p:cNvCxnSpPr>
+          <p:nvPr/>
+        </p:nvCxnSpPr>
+        <p:spPr>
+          <a:xfrm flipH="1">
+            <a:off x="6096000" y="3863918"/>
+            <a:ext cx="762000" cy="38100"/>
+          </a:xfrm>
+          <a:prstGeom prst="straightConnector1">
+            <a:avLst/>
+          </a:prstGeom>
+          <a:ln>
+            <a:tailEnd type="arrow"/>
+          </a:ln>
+        </p:spPr>
+        <p:style>
+          <a:lnRef idx="1">
+            <a:schemeClr val="accent1"/>
+          </a:lnRef>
+          <a:fillRef idx="0">
+            <a:schemeClr val="accent1"/>
+          </a:fillRef>
+          <a:effectRef idx="0">
+            <a:schemeClr val="accent1"/>
+          </a:effectRef>
+          <a:fontRef idx="minor">
+            <a:schemeClr val="tx1"/>
+          </a:fontRef>
+        </p:style>
+      </p:cxnSp>
+      <p:cxnSp>
+        <p:nvCxnSpPr>
+          <p:cNvPr id="77" name="Straight Arrow Connector 76"/>
+          <p:cNvCxnSpPr>
+            <a:stCxn id="61" idx="2"/>
+          </p:cNvCxnSpPr>
+          <p:nvPr/>
+        </p:nvCxnSpPr>
+        <p:spPr>
+          <a:xfrm flipH="1" flipV="1">
+            <a:off x="6096000" y="4648778"/>
+            <a:ext cx="762000" cy="129540"/>
+          </a:xfrm>
+          <a:prstGeom prst="straightConnector1">
+            <a:avLst/>
+          </a:prstGeom>
+          <a:ln>
+            <a:tailEnd type="arrow"/>
+          </a:ln>
+        </p:spPr>
+        <p:style>
+          <a:lnRef idx="1">
+            <a:schemeClr val="accent1"/>
+          </a:lnRef>
+          <a:fillRef idx="0">
+            <a:schemeClr val="accent1"/>
+          </a:fillRef>
+          <a:effectRef idx="0">
+            <a:schemeClr val="accent1"/>
+          </a:effectRef>
+          <a:fontRef idx="minor">
+            <a:schemeClr val="tx1"/>
+          </a:fontRef>
+        </p:style>
+      </p:cxnSp>
+      <p:cxnSp>
+        <p:nvCxnSpPr>
+          <p:cNvPr id="78" name="Straight Arrow Connector 77"/>
+          <p:cNvCxnSpPr>
+            <a:stCxn id="66" idx="2"/>
+          </p:cNvCxnSpPr>
+          <p:nvPr/>
+        </p:nvCxnSpPr>
+        <p:spPr>
+          <a:xfrm flipH="1" flipV="1">
+            <a:off x="6096000" y="5098358"/>
+            <a:ext cx="762000" cy="60960"/>
+          </a:xfrm>
+          <a:prstGeom prst="straightConnector1">
+            <a:avLst/>
+          </a:prstGeom>
+          <a:ln>
+            <a:tailEnd type="arrow"/>
+          </a:ln>
+        </p:spPr>
+        <p:style>
+          <a:lnRef idx="1">
+            <a:schemeClr val="accent1"/>
+          </a:lnRef>
+          <a:fillRef idx="0">
+            <a:schemeClr val="accent1"/>
+          </a:fillRef>
+          <a:effectRef idx="0">
+            <a:schemeClr val="accent1"/>
+          </a:effectRef>
+          <a:fontRef idx="minor">
+            <a:schemeClr val="tx1"/>
+          </a:fontRef>
+        </p:style>
+      </p:cxnSp>
+      <p:cxnSp>
+        <p:nvCxnSpPr>
+          <p:cNvPr id="79" name="Straight Arrow Connector 78"/>
+          <p:cNvCxnSpPr>
+            <a:stCxn id="71" idx="2"/>
+          </p:cNvCxnSpPr>
+          <p:nvPr/>
+        </p:nvCxnSpPr>
+        <p:spPr>
+          <a:xfrm flipH="1">
+            <a:off x="6096000" y="5540318"/>
+            <a:ext cx="762000" cy="7620"/>
+          </a:xfrm>
+          <a:prstGeom prst="straightConnector1">
+            <a:avLst/>
+          </a:prstGeom>
+          <a:ln>
+            <a:tailEnd type="arrow"/>
+          </a:ln>
+        </p:spPr>
+        <p:style>
+          <a:lnRef idx="1">
+            <a:schemeClr val="accent1"/>
+          </a:lnRef>
+          <a:fillRef idx="0">
+            <a:schemeClr val="accent1"/>
+          </a:fillRef>
+          <a:effectRef idx="0">
+            <a:schemeClr val="accent1"/>
+          </a:effectRef>
+          <a:fontRef idx="minor">
+            <a:schemeClr val="tx1"/>
+          </a:fontRef>
+        </p:style>
+      </p:cxnSp>
+      <p:cxnSp>
+        <p:nvCxnSpPr>
+          <p:cNvPr id="80" name="Straight Arrow Connector 79"/>
+          <p:cNvCxnSpPr>
+            <a:stCxn id="74" idx="2"/>
+          </p:cNvCxnSpPr>
+          <p:nvPr/>
+        </p:nvCxnSpPr>
+        <p:spPr>
+          <a:xfrm flipH="1">
+            <a:off x="6096000" y="5997518"/>
+            <a:ext cx="762000" cy="0"/>
+          </a:xfrm>
+          <a:prstGeom prst="straightConnector1">
+            <a:avLst/>
+          </a:prstGeom>
+          <a:ln>
+            <a:tailEnd type="arrow"/>
+          </a:ln>
+        </p:spPr>
+        <p:style>
+          <a:lnRef idx="1">
+            <a:schemeClr val="accent1"/>
+          </a:lnRef>
+          <a:fillRef idx="0">
+            <a:schemeClr val="accent1"/>
+          </a:fillRef>
+          <a:effectRef idx="0">
+            <a:schemeClr val="accent1"/>
+          </a:effectRef>
+          <a:fontRef idx="minor">
+            <a:schemeClr val="tx1"/>
+          </a:fontRef>
+        </p:style>
+      </p:cxnSp>
+      <p:cxnSp>
+        <p:nvCxnSpPr>
+          <p:cNvPr id="81" name="Straight Arrow Connector 80"/>
+          <p:cNvCxnSpPr>
+            <a:stCxn id="58" idx="1"/>
+          </p:cNvCxnSpPr>
+          <p:nvPr/>
+        </p:nvCxnSpPr>
+        <p:spPr>
+          <a:xfrm flipH="1">
+            <a:off x="6096000" y="4244918"/>
+            <a:ext cx="862433" cy="38100"/>
+          </a:xfrm>
+          <a:prstGeom prst="straightConnector1">
+            <a:avLst/>
+          </a:prstGeom>
+          <a:ln>
+            <a:tailEnd type="arrow"/>
+          </a:ln>
+        </p:spPr>
+        <p:style>
+          <a:lnRef idx="1">
+            <a:schemeClr val="accent1"/>
+          </a:lnRef>
+          <a:fillRef idx="0">
+            <a:schemeClr val="accent1"/>
+          </a:fillRef>
+          <a:effectRef idx="0">
+            <a:schemeClr val="accent1"/>
+          </a:effectRef>
+          <a:fontRef idx="minor">
+            <a:schemeClr val="tx1"/>
+          </a:fontRef>
+        </p:style>
+      </p:cxnSp>
+      <p:grpSp>
+        <p:nvGrpSpPr>
+          <p:cNvPr id="82" name="Group 89"/>
+          <p:cNvGrpSpPr/>
+          <p:nvPr/>
+        </p:nvGrpSpPr>
+        <p:grpSpPr>
+          <a:xfrm>
+            <a:off x="6858000" y="6019800"/>
+            <a:ext cx="685800" cy="685800"/>
+            <a:chOff x="3512346" y="1346193"/>
+            <a:chExt cx="1440649" cy="1371613"/>
+          </a:xfrm>
+        </p:grpSpPr>
+        <p:sp>
+          <p:nvSpPr>
+            <p:cNvPr id="83" name="Oval 82"/>
+            <p:cNvSpPr/>
+            <p:nvPr/>
+          </p:nvSpPr>
+          <p:spPr>
+            <a:xfrm>
+              <a:off x="3512346" y="1346193"/>
+              <a:ext cx="1440649" cy="1371613"/>
+            </a:xfrm>
+            <a:prstGeom prst="ellipse">
+              <a:avLst/>
+            </a:prstGeom>
+          </p:spPr>
+          <p:style>
+            <a:lnRef idx="2">
+              <a:schemeClr val="lt1">
+                <a:hueOff val="0"/>
+                <a:satOff val="0"/>
+                <a:lumOff val="0"/>
+                <a:alphaOff val="0"/>
+              </a:schemeClr>
+            </a:lnRef>
+            <a:fillRef idx="1">
+              <a:schemeClr val="accent1">
+                <a:hueOff val="0"/>
+                <a:satOff val="0"/>
+                <a:lumOff val="0"/>
+                <a:alphaOff val="0"/>
+              </a:schemeClr>
+            </a:fillRef>
+            <a:effectRef idx="0">
+              <a:schemeClr val="accent1">
+                <a:hueOff val="0"/>
+                <a:satOff val="0"/>
+                <a:lumOff val="0"/>
+                <a:alphaOff val="0"/>
+              </a:schemeClr>
+            </a:effectRef>
+            <a:fontRef idx="minor">
+              <a:schemeClr val="lt1"/>
+            </a:fontRef>
+          </p:style>
+        </p:sp>
+        <p:sp>
+          <p:nvSpPr>
+            <p:cNvPr id="84" name="Oval 4"/>
+            <p:cNvSpPr/>
+            <p:nvPr/>
+          </p:nvSpPr>
+          <p:spPr>
+            <a:xfrm>
+              <a:off x="3723324" y="1547061"/>
+              <a:ext cx="1018693" cy="969877"/>
+            </a:xfrm>
+            <a:prstGeom prst="rect">
+              <a:avLst/>
+            </a:prstGeom>
+          </p:spPr>
+          <p:style>
+            <a:lnRef idx="0">
+              <a:scrgbClr r="0" g="0" b="0"/>
+            </a:lnRef>
+            <a:fillRef idx="0">
+              <a:scrgbClr r="0" g="0" b="0"/>
+            </a:fillRef>
+            <a:effectRef idx="0">
+              <a:scrgbClr r="0" g="0" b="0"/>
+            </a:effectRef>
+            <a:fontRef idx="minor">
+              <a:schemeClr val="lt1"/>
+            </a:fontRef>
+          </p:style>
+          <p:txBody>
+            <a:bodyPr spcFirstLastPara="0" vert="horz" wrap="square" lIns="25400" tIns="25400" rIns="25400" bIns="25400" numCol="1" spcCol="1270" anchor="ctr" anchorCtr="0">
+              <a:noAutofit/>
+            </a:bodyPr>
+            <a:lstStyle/>
+            <a:p>
+              <a:pPr lvl="0" algn="ctr" defTabSz="889000">
+                <a:lnSpc>
+                  <a:spcPct val="90000"/>
+                </a:lnSpc>
+                <a:spcBef>
+                  <a:spcPct val="0"/>
+                </a:spcBef>
+                <a:spcAft>
+                  <a:spcPct val="35000"/>
+                </a:spcAft>
+              </a:pPr>
+              <a:r>
+                <a:rPr lang="en-US" sz="1200" b="1" kern="1200" dirty="0" smtClean="0"/>
+                <a:t>Result</a:t>
+              </a:r>
+              <a:endParaRPr lang="en-US" sz="1200" b="1" kern="1200" dirty="0"/>
+            </a:p>
+          </p:txBody>
+        </p:sp>
+      </p:grpSp>
+      <p:cxnSp>
+        <p:nvCxnSpPr>
+          <p:cNvPr id="85" name="Straight Arrow Connector 84"/>
+          <p:cNvCxnSpPr>
+            <a:stCxn id="83" idx="2"/>
+          </p:cNvCxnSpPr>
+          <p:nvPr/>
+        </p:nvCxnSpPr>
+        <p:spPr>
+          <a:xfrm flipH="1" flipV="1">
+            <a:off x="6096000" y="5997518"/>
+            <a:ext cx="762000" cy="365182"/>
+          </a:xfrm>
+          <a:prstGeom prst="straightConnector1">
+            <a:avLst/>
+          </a:prstGeom>
+          <a:ln>
+            <a:tailEnd type="arrow"/>
+          </a:ln>
+        </p:spPr>
+        <p:style>
+          <a:lnRef idx="1">
+            <a:schemeClr val="accent1"/>
+          </a:lnRef>
+          <a:fillRef idx="0">
+            <a:schemeClr val="accent1"/>
+          </a:fillRef>
+          <a:effectRef idx="0">
+            <a:schemeClr val="accent1"/>
+          </a:effectRef>
+          <a:fontRef idx="minor">
+            <a:schemeClr val="tx1"/>
+          </a:fontRef>
+        </p:style>
+      </p:cxnSp>
     </p:spTree>
   </p:cSld>
   <p:clrMapOvr>
@@ -23369,50 +26559,6 @@
       </p:sp>
       <p:sp>
         <p:nvSpPr>
-          <p:cNvPr id="77" name="Rectangle 76"/>
-          <p:cNvSpPr/>
-          <p:nvPr/>
-        </p:nvSpPr>
-        <p:spPr>
-          <a:xfrm>
-            <a:off x="6477000" y="762000"/>
-            <a:ext cx="1752600" cy="6019800"/>
-          </a:xfrm>
-          <a:prstGeom prst="rect">
-            <a:avLst/>
-          </a:prstGeom>
-          <a:noFill/>
-          <a:ln>
-            <a:prstDash val="dash"/>
-          </a:ln>
-        </p:spPr>
-        <p:style>
-          <a:lnRef idx="2">
-            <a:schemeClr val="accent1">
-              <a:shade val="50000"/>
-            </a:schemeClr>
-          </a:lnRef>
-          <a:fillRef idx="1">
-            <a:schemeClr val="accent1"/>
-          </a:fillRef>
-          <a:effectRef idx="0">
-            <a:schemeClr val="accent1"/>
-          </a:effectRef>
-          <a:fontRef idx="minor">
-            <a:schemeClr val="lt1"/>
-          </a:fontRef>
-        </p:style>
-        <p:txBody>
-          <a:bodyPr rtlCol="0" anchor="ctr"/>
-          <a:lstStyle/>
-          <a:p>
-            <a:pPr algn="ctr"/>
-            <a:endParaRPr lang="en-US"/>
-          </a:p>
-        </p:txBody>
-      </p:sp>
-      <p:sp>
-        <p:nvSpPr>
           <p:cNvPr id="78" name="Rectangle 77"/>
           <p:cNvSpPr/>
           <p:nvPr/>
@@ -23420,7 +26566,7 @@
         <p:spPr>
           <a:xfrm>
             <a:off x="2438400" y="762000"/>
-            <a:ext cx="4038600" cy="3048000"/>
+            <a:ext cx="5562600" cy="3200400"/>
           </a:xfrm>
           <a:prstGeom prst="rect">
             <a:avLst/>
@@ -25442,6 +28588,212 @@
           </a:fontRef>
         </p:style>
       </p:cxnSp>
+      <p:sp>
+        <p:nvSpPr>
+          <p:cNvPr id="56" name="Oval 55"/>
+          <p:cNvSpPr/>
+          <p:nvPr/>
+        </p:nvSpPr>
+        <p:spPr>
+          <a:xfrm>
+            <a:off x="0" y="3886200"/>
+            <a:ext cx="3352800" cy="990600"/>
+          </a:xfrm>
+          <a:prstGeom prst="ellipse">
+            <a:avLst/>
+          </a:prstGeom>
+          <a:noFill/>
+        </p:spPr>
+        <p:style>
+          <a:lnRef idx="2">
+            <a:schemeClr val="accent1">
+              <a:shade val="50000"/>
+            </a:schemeClr>
+          </a:lnRef>
+          <a:fillRef idx="1">
+            <a:schemeClr val="accent1"/>
+          </a:fillRef>
+          <a:effectRef idx="0">
+            <a:schemeClr val="accent1"/>
+          </a:effectRef>
+          <a:fontRef idx="minor">
+            <a:schemeClr val="lt1"/>
+          </a:fontRef>
+        </p:style>
+        <p:txBody>
+          <a:bodyPr rtlCol="0" anchor="ctr"/>
+          <a:lstStyle/>
+          <a:p>
+            <a:pPr algn="ctr"/>
+            <a:endParaRPr lang="en-US"/>
+          </a:p>
+        </p:txBody>
+      </p:sp>
+      <p:sp>
+        <p:nvSpPr>
+          <p:cNvPr id="57" name="Oval 56"/>
+          <p:cNvSpPr/>
+          <p:nvPr/>
+        </p:nvSpPr>
+        <p:spPr>
+          <a:xfrm>
+            <a:off x="3810000" y="609600"/>
+            <a:ext cx="3810000" cy="3124200"/>
+          </a:xfrm>
+          <a:prstGeom prst="ellipse">
+            <a:avLst/>
+          </a:prstGeom>
+          <a:noFill/>
+        </p:spPr>
+        <p:style>
+          <a:lnRef idx="2">
+            <a:schemeClr val="accent1">
+              <a:shade val="50000"/>
+            </a:schemeClr>
+          </a:lnRef>
+          <a:fillRef idx="1">
+            <a:schemeClr val="accent1"/>
+          </a:fillRef>
+          <a:effectRef idx="0">
+            <a:schemeClr val="accent1"/>
+          </a:effectRef>
+          <a:fontRef idx="minor">
+            <a:schemeClr val="lt1"/>
+          </a:fontRef>
+        </p:style>
+        <p:txBody>
+          <a:bodyPr rtlCol="0" anchor="ctr"/>
+          <a:lstStyle/>
+          <a:p>
+            <a:pPr algn="ctr"/>
+            <a:endParaRPr lang="en-US"/>
+          </a:p>
+        </p:txBody>
+      </p:sp>
+      <p:cxnSp>
+        <p:nvCxnSpPr>
+          <p:cNvPr id="59" name="Straight Connector 58"/>
+          <p:cNvCxnSpPr>
+            <a:stCxn id="56" idx="1"/>
+          </p:cNvCxnSpPr>
+          <p:nvPr/>
+        </p:nvCxnSpPr>
+        <p:spPr>
+          <a:xfrm flipH="1" flipV="1">
+            <a:off x="381000" y="3276600"/>
+            <a:ext cx="110007" cy="754670"/>
+          </a:xfrm>
+          <a:prstGeom prst="line">
+            <a:avLst/>
+          </a:prstGeom>
+        </p:spPr>
+        <p:style>
+          <a:lnRef idx="1">
+            <a:schemeClr val="accent1"/>
+          </a:lnRef>
+          <a:fillRef idx="0">
+            <a:schemeClr val="accent1"/>
+          </a:fillRef>
+          <a:effectRef idx="0">
+            <a:schemeClr val="accent1"/>
+          </a:effectRef>
+          <a:fontRef idx="minor">
+            <a:schemeClr val="tx1"/>
+          </a:fontRef>
+        </p:style>
+      </p:cxnSp>
+      <p:sp>
+        <p:nvSpPr>
+          <p:cNvPr id="60" name="TextBox 59"/>
+          <p:cNvSpPr txBox="1"/>
+          <p:nvPr/>
+        </p:nvSpPr>
+        <p:spPr>
+          <a:xfrm>
+            <a:off x="0" y="2895600"/>
+            <a:ext cx="777585" cy="369332"/>
+          </a:xfrm>
+          <a:prstGeom prst="rect">
+            <a:avLst/>
+          </a:prstGeom>
+          <a:noFill/>
+        </p:spPr>
+        <p:txBody>
+          <a:bodyPr wrap="none" rtlCol="0">
+            <a:spAutoFit/>
+          </a:bodyPr>
+          <a:lstStyle/>
+          <a:p>
+            <a:r>
+              <a:rPr lang="en-US" altLang="zh-CN" b="1" dirty="0" smtClean="0"/>
+              <a:t>Result</a:t>
+            </a:r>
+            <a:endParaRPr lang="en-US" b="1" dirty="0"/>
+          </a:p>
+        </p:txBody>
+      </p:sp>
+      <p:cxnSp>
+        <p:nvCxnSpPr>
+          <p:cNvPr id="61" name="Straight Connector 60"/>
+          <p:cNvCxnSpPr>
+            <a:stCxn id="57" idx="6"/>
+          </p:cNvCxnSpPr>
+          <p:nvPr/>
+        </p:nvCxnSpPr>
+        <p:spPr>
+          <a:xfrm flipV="1">
+            <a:off x="7620000" y="1828800"/>
+            <a:ext cx="533400" cy="342900"/>
+          </a:xfrm>
+          <a:prstGeom prst="line">
+            <a:avLst/>
+          </a:prstGeom>
+        </p:spPr>
+        <p:style>
+          <a:lnRef idx="1">
+            <a:schemeClr val="accent1"/>
+          </a:lnRef>
+          <a:fillRef idx="0">
+            <a:schemeClr val="accent1"/>
+          </a:fillRef>
+          <a:effectRef idx="0">
+            <a:schemeClr val="accent1"/>
+          </a:effectRef>
+          <a:fontRef idx="minor">
+            <a:schemeClr val="tx1"/>
+          </a:fontRef>
+        </p:style>
+      </p:cxnSp>
+      <p:sp>
+        <p:nvSpPr>
+          <p:cNvPr id="62" name="TextBox 61"/>
+          <p:cNvSpPr txBox="1"/>
+          <p:nvPr/>
+        </p:nvSpPr>
+        <p:spPr>
+          <a:xfrm>
+            <a:off x="7696200" y="1371600"/>
+            <a:ext cx="1267783" cy="369332"/>
+          </a:xfrm>
+          <a:prstGeom prst="rect">
+            <a:avLst/>
+          </a:prstGeom>
+          <a:noFill/>
+        </p:spPr>
+        <p:txBody>
+          <a:bodyPr wrap="none" rtlCol="0">
+            <a:spAutoFit/>
+          </a:bodyPr>
+          <a:lstStyle/>
+          <a:p>
+            <a:r>
+              <a:rPr lang="en-US" altLang="zh-CN" b="1" dirty="0" smtClean="0"/>
+              <a:t>Assets Pool</a:t>
+            </a:r>
+            <a:endParaRPr lang="en-US" b="1" dirty="0"/>
+          </a:p>
+        </p:txBody>
+      </p:sp>
     </p:spTree>
   </p:cSld>
   <p:clrMapOvr>

</xml_diff>

<commit_message>
Implemented many test cases
</commit_message>
<xml_diff>
--- a/Doc/V5 design doc.pptx
+++ b/Doc/V5 design doc.pptx
@@ -5,7 +5,7 @@
     <p:sldMasterId id="2147483648" r:id="rId1"/>
   </p:sldMasterIdLst>
   <p:notesMasterIdLst>
-    <p:notesMasterId r:id="rId19"/>
+    <p:notesMasterId r:id="rId20"/>
   </p:notesMasterIdLst>
   <p:sldIdLst>
     <p:sldId id="256" r:id="rId2"/>
@@ -25,6 +25,7 @@
     <p:sldId id="266" r:id="rId16"/>
     <p:sldId id="268" r:id="rId17"/>
     <p:sldId id="269" r:id="rId18"/>
+    <p:sldId id="283" r:id="rId19"/>
   </p:sldIdLst>
   <p:sldSz cx="9144000" cy="6858000" type="screen4x3"/>
   <p:notesSz cx="6858000" cy="9144000"/>
@@ -209,7 +210,7 @@
             <a:fld id="{360BB726-B4AA-437F-9776-1FB3CA074112}" type="datetimeFigureOut">
               <a:rPr lang="en-US" smtClean="0"/>
               <a:pPr/>
-              <a:t>4/14/2019</a:t>
+              <a:t>4/15/2019</a:t>
             </a:fld>
             <a:endParaRPr lang="en-US"/>
           </a:p>
@@ -380,7 +381,7 @@
     </p:spTree>
     <p:extLst>
       <p:ext uri="{BB962C8B-B14F-4D97-AF65-F5344CB8AC3E}">
-        <p14:creationId xmlns:p14="http://schemas.microsoft.com/office/powerpoint/2010/main" val="4034910571"/>
+        <p14:creationId xmlns:p14="http://schemas.microsoft.com/office/powerpoint/2010/main" xmlns="" val="4034910571"/>
       </p:ext>
     </p:extLst>
   </p:cSld>
@@ -662,7 +663,7 @@
             <a:fld id="{1D8BD707-D9CF-40AE-B4C6-C98DA3205C09}" type="datetimeFigureOut">
               <a:rPr lang="en-US" smtClean="0"/>
               <a:pPr/>
-              <a:t>4/14/2019</a:t>
+              <a:t>4/15/2019</a:t>
             </a:fld>
             <a:endParaRPr lang="en-US"/>
           </a:p>
@@ -829,7 +830,7 @@
             <a:fld id="{1D8BD707-D9CF-40AE-B4C6-C98DA3205C09}" type="datetimeFigureOut">
               <a:rPr lang="en-US" smtClean="0"/>
               <a:pPr/>
-              <a:t>4/14/2019</a:t>
+              <a:t>4/15/2019</a:t>
             </a:fld>
             <a:endParaRPr lang="en-US"/>
           </a:p>
@@ -1006,7 +1007,7 @@
             <a:fld id="{1D8BD707-D9CF-40AE-B4C6-C98DA3205C09}" type="datetimeFigureOut">
               <a:rPr lang="en-US" smtClean="0"/>
               <a:pPr/>
-              <a:t>4/14/2019</a:t>
+              <a:t>4/15/2019</a:t>
             </a:fld>
             <a:endParaRPr lang="en-US"/>
           </a:p>
@@ -1173,7 +1174,7 @@
             <a:fld id="{1D8BD707-D9CF-40AE-B4C6-C98DA3205C09}" type="datetimeFigureOut">
               <a:rPr lang="en-US" smtClean="0"/>
               <a:pPr/>
-              <a:t>4/14/2019</a:t>
+              <a:t>4/15/2019</a:t>
             </a:fld>
             <a:endParaRPr lang="en-US"/>
           </a:p>
@@ -1416,7 +1417,7 @@
             <a:fld id="{1D8BD707-D9CF-40AE-B4C6-C98DA3205C09}" type="datetimeFigureOut">
               <a:rPr lang="en-US" smtClean="0"/>
               <a:pPr/>
-              <a:t>4/14/2019</a:t>
+              <a:t>4/15/2019</a:t>
             </a:fld>
             <a:endParaRPr lang="en-US"/>
           </a:p>
@@ -1701,7 +1702,7 @@
             <a:fld id="{1D8BD707-D9CF-40AE-B4C6-C98DA3205C09}" type="datetimeFigureOut">
               <a:rPr lang="en-US" smtClean="0"/>
               <a:pPr/>
-              <a:t>4/14/2019</a:t>
+              <a:t>4/15/2019</a:t>
             </a:fld>
             <a:endParaRPr lang="en-US"/>
           </a:p>
@@ -2120,7 +2121,7 @@
             <a:fld id="{1D8BD707-D9CF-40AE-B4C6-C98DA3205C09}" type="datetimeFigureOut">
               <a:rPr lang="en-US" smtClean="0"/>
               <a:pPr/>
-              <a:t>4/14/2019</a:t>
+              <a:t>4/15/2019</a:t>
             </a:fld>
             <a:endParaRPr lang="en-US"/>
           </a:p>
@@ -2235,7 +2236,7 @@
             <a:fld id="{1D8BD707-D9CF-40AE-B4C6-C98DA3205C09}" type="datetimeFigureOut">
               <a:rPr lang="en-US" smtClean="0"/>
               <a:pPr/>
-              <a:t>4/14/2019</a:t>
+              <a:t>4/15/2019</a:t>
             </a:fld>
             <a:endParaRPr lang="en-US"/>
           </a:p>
@@ -2327,7 +2328,7 @@
             <a:fld id="{1D8BD707-D9CF-40AE-B4C6-C98DA3205C09}" type="datetimeFigureOut">
               <a:rPr lang="en-US" smtClean="0"/>
               <a:pPr/>
-              <a:t>4/14/2019</a:t>
+              <a:t>4/15/2019</a:t>
             </a:fld>
             <a:endParaRPr lang="en-US"/>
           </a:p>
@@ -2601,7 +2602,7 @@
             <a:fld id="{1D8BD707-D9CF-40AE-B4C6-C98DA3205C09}" type="datetimeFigureOut">
               <a:rPr lang="en-US" smtClean="0"/>
               <a:pPr/>
-              <a:t>4/14/2019</a:t>
+              <a:t>4/15/2019</a:t>
             </a:fld>
             <a:endParaRPr lang="en-US"/>
           </a:p>
@@ -2851,7 +2852,7 @@
             <a:fld id="{1D8BD707-D9CF-40AE-B4C6-C98DA3205C09}" type="datetimeFigureOut">
               <a:rPr lang="en-US" smtClean="0"/>
               <a:pPr/>
-              <a:t>4/14/2019</a:t>
+              <a:t>4/15/2019</a:t>
             </a:fld>
             <a:endParaRPr lang="en-US"/>
           </a:p>
@@ -3061,7 +3062,7 @@
             <a:fld id="{1D8BD707-D9CF-40AE-B4C6-C98DA3205C09}" type="datetimeFigureOut">
               <a:rPr lang="en-US" smtClean="0"/>
               <a:pPr/>
-              <a:t>4/14/2019</a:t>
+              <a:t>4/15/2019</a:t>
             </a:fld>
             <a:endParaRPr lang="en-US"/>
           </a:p>
@@ -7521,7 +7522,7 @@
     </p:spTree>
     <p:extLst>
       <p:ext uri="{BB962C8B-B14F-4D97-AF65-F5344CB8AC3E}">
-        <p14:creationId xmlns:p14="http://schemas.microsoft.com/office/powerpoint/2010/main" val="2318340239"/>
+        <p14:creationId xmlns:p14="http://schemas.microsoft.com/office/powerpoint/2010/main" xmlns="" val="2318340239"/>
       </p:ext>
     </p:extLst>
   </p:cSld>
@@ -10811,7 +10812,7 @@
     </p:spTree>
     <p:extLst>
       <p:ext uri="{BB962C8B-B14F-4D97-AF65-F5344CB8AC3E}">
-        <p14:creationId xmlns:p14="http://schemas.microsoft.com/office/powerpoint/2010/main" val="228104837"/>
+        <p14:creationId xmlns:p14="http://schemas.microsoft.com/office/powerpoint/2010/main" xmlns="" val="228104837"/>
       </p:ext>
     </p:extLst>
   </p:cSld>
@@ -14162,7 +14163,7 @@
     </p:spTree>
     <p:extLst>
       <p:ext uri="{BB962C8B-B14F-4D97-AF65-F5344CB8AC3E}">
-        <p14:creationId xmlns:p14="http://schemas.microsoft.com/office/powerpoint/2010/main" val="139957165"/>
+        <p14:creationId xmlns:p14="http://schemas.microsoft.com/office/powerpoint/2010/main" xmlns="" val="139957165"/>
       </p:ext>
     </p:extLst>
   </p:cSld>
@@ -17753,7 +17754,7 @@
     </p:spTree>
     <p:extLst>
       <p:ext uri="{BB962C8B-B14F-4D97-AF65-F5344CB8AC3E}">
-        <p14:creationId xmlns:p14="http://schemas.microsoft.com/office/powerpoint/2010/main" val="3666104499"/>
+        <p14:creationId xmlns:p14="http://schemas.microsoft.com/office/powerpoint/2010/main" xmlns="" val="3666104499"/>
       </p:ext>
     </p:extLst>
   </p:cSld>
@@ -23574,32 +23575,6 @@
       </p:grpSpPr>
       <p:sp>
         <p:nvSpPr>
-          <p:cNvPr id="4" name="TextBox 3"/>
-          <p:cNvSpPr txBox="1"/>
-          <p:nvPr/>
-        </p:nvSpPr>
-        <p:spPr>
-          <a:xfrm>
-            <a:off x="685800" y="609600"/>
-            <a:ext cx="184731" cy="369332"/>
-          </a:xfrm>
-          <a:prstGeom prst="rect">
-            <a:avLst/>
-          </a:prstGeom>
-          <a:noFill/>
-        </p:spPr>
-        <p:txBody>
-          <a:bodyPr wrap="none" rtlCol="0">
-            <a:spAutoFit/>
-          </a:bodyPr>
-          <a:lstStyle/>
-          <a:p>
-            <a:endParaRPr lang="en-US" dirty="0"/>
-          </a:p>
-        </p:txBody>
-      </p:sp>
-      <p:sp>
-        <p:nvSpPr>
           <p:cNvPr id="5" name="TextBox 4"/>
           <p:cNvSpPr txBox="1"/>
           <p:nvPr/>
@@ -23636,7 +23611,7 @@
         </p:nvGrpSpPr>
         <p:grpSpPr>
           <a:xfrm>
-            <a:off x="3539047" y="697964"/>
+            <a:off x="5132400" y="697964"/>
             <a:ext cx="1116000" cy="1116000"/>
             <a:chOff x="3512346" y="1346193"/>
             <a:chExt cx="1440649" cy="1371613"/>
@@ -23750,7 +23725,7 @@
         </p:nvGrpSpPr>
         <p:grpSpPr>
           <a:xfrm>
-            <a:off x="5486400" y="697964"/>
+            <a:off x="2355353" y="1295400"/>
             <a:ext cx="1116000" cy="1116000"/>
             <a:chOff x="3512346" y="1346193"/>
             <a:chExt cx="1440649" cy="1371613"/>
@@ -23864,7 +23839,7 @@
         </p:nvGrpSpPr>
         <p:grpSpPr>
           <a:xfrm>
-            <a:off x="3539047" y="3785400"/>
+            <a:off x="5132400" y="3785400"/>
             <a:ext cx="1116000" cy="1116000"/>
             <a:chOff x="3512346" y="1346193"/>
             <a:chExt cx="1440649" cy="1371613"/>
@@ -23978,7 +23953,7 @@
         </p:nvGrpSpPr>
         <p:grpSpPr>
           <a:xfrm>
-            <a:off x="3539047" y="5318810"/>
+            <a:off x="5132400" y="5318810"/>
             <a:ext cx="1116000" cy="1116000"/>
             <a:chOff x="3512346" y="1346193"/>
             <a:chExt cx="1440649" cy="1371613"/>
@@ -24092,7 +24067,7 @@
         </p:nvGrpSpPr>
         <p:grpSpPr>
           <a:xfrm>
-            <a:off x="3539046" y="2244545"/>
+            <a:off x="5132399" y="2244545"/>
             <a:ext cx="1116000" cy="1116000"/>
             <a:chOff x="3512346" y="1346193"/>
             <a:chExt cx="1440649" cy="1371613"/>
@@ -24206,7 +24181,7 @@
         </p:nvGrpSpPr>
         <p:grpSpPr>
           <a:xfrm>
-            <a:off x="1978927" y="5318810"/>
+            <a:off x="3269753" y="5318810"/>
             <a:ext cx="1116000" cy="1116000"/>
             <a:chOff x="3512346" y="1346193"/>
             <a:chExt cx="1440649" cy="1371613"/>
@@ -24317,14 +24292,14 @@
           <p:cNvPr id="3" name="直接箭头连接符 2"/>
           <p:cNvCxnSpPr>
             <a:stCxn id="63" idx="6"/>
-            <a:endCxn id="40" idx="2"/>
+            <a:endCxn id="40" idx="7"/>
           </p:cNvCxnSpPr>
           <p:nvPr/>
         </p:nvCxnSpPr>
         <p:spPr>
-          <a:xfrm>
-            <a:off x="4655047" y="1255964"/>
-            <a:ext cx="831353" cy="0"/>
+          <a:xfrm flipH="1">
+            <a:off x="3307918" y="1255964"/>
+            <a:ext cx="2940482" cy="202870"/>
           </a:xfrm>
           <a:prstGeom prst="straightConnector1">
             <a:avLst/>
@@ -24359,7 +24334,7 @@
         </p:nvCxnSpPr>
         <p:spPr>
           <a:xfrm flipH="1">
-            <a:off x="4097046" y="1813964"/>
+            <a:off x="5690399" y="1813964"/>
             <a:ext cx="1" cy="430581"/>
           </a:xfrm>
           <a:prstGeom prst="straightConnector1">
@@ -24395,7 +24370,7 @@
         </p:nvCxnSpPr>
         <p:spPr>
           <a:xfrm>
-            <a:off x="4097046" y="3360545"/>
+            <a:off x="5690399" y="3360545"/>
             <a:ext cx="1" cy="424855"/>
           </a:xfrm>
           <a:prstGeom prst="straightConnector1">
@@ -24431,7 +24406,7 @@
         </p:nvCxnSpPr>
         <p:spPr>
           <a:xfrm>
-            <a:off x="4097047" y="4901400"/>
+            <a:off x="5690400" y="4901400"/>
             <a:ext cx="0" cy="417410"/>
           </a:xfrm>
           <a:prstGeom prst="straightConnector1">
@@ -24467,8 +24442,8 @@
         </p:nvCxnSpPr>
         <p:spPr>
           <a:xfrm flipH="1">
-            <a:off x="3094927" y="5876810"/>
-            <a:ext cx="444120" cy="0"/>
+            <a:off x="4385753" y="5876810"/>
+            <a:ext cx="746647" cy="0"/>
           </a:xfrm>
           <a:prstGeom prst="straightConnector1">
             <a:avLst/>
@@ -24503,8 +24478,8 @@
         </p:nvCxnSpPr>
         <p:spPr>
           <a:xfrm flipH="1">
-            <a:off x="2931493" y="4737966"/>
-            <a:ext cx="770988" cy="744278"/>
+            <a:off x="4222318" y="4737966"/>
+            <a:ext cx="1073517" cy="744278"/>
           </a:xfrm>
           <a:prstGeom prst="straightConnector1">
             <a:avLst/>
@@ -24532,15 +24507,14 @@
         <p:nvCxnSpPr>
           <p:cNvPr id="18" name="直接箭头连接符 17"/>
           <p:cNvCxnSpPr>
-            <a:stCxn id="49" idx="7"/>
-            <a:endCxn id="40" idx="3"/>
+            <a:endCxn id="40" idx="6"/>
           </p:cNvCxnSpPr>
           <p:nvPr/>
         </p:nvCxnSpPr>
         <p:spPr>
-          <a:xfrm flipV="1">
-            <a:off x="4491612" y="1650530"/>
-            <a:ext cx="1158222" cy="757449"/>
+          <a:xfrm flipH="1" flipV="1">
+            <a:off x="3471353" y="1853400"/>
+            <a:ext cx="1779601" cy="585000"/>
           </a:xfrm>
           <a:prstGeom prst="straightConnector1">
             <a:avLst/>
@@ -24564,10 +24538,1148 @@
           </a:fontRef>
         </p:style>
       </p:cxnSp>
+      <p:sp>
+        <p:nvSpPr>
+          <p:cNvPr id="29" name="TextBox 28"/>
+          <p:cNvSpPr txBox="1"/>
+          <p:nvPr/>
+        </p:nvSpPr>
+        <p:spPr>
+          <a:xfrm>
+            <a:off x="3879353" y="1219200"/>
+            <a:ext cx="769763" cy="276999"/>
+          </a:xfrm>
+          <a:prstGeom prst="rect">
+            <a:avLst/>
+          </a:prstGeom>
+          <a:noFill/>
+        </p:spPr>
+        <p:txBody>
+          <a:bodyPr wrap="none" rtlCol="0">
+            <a:spAutoFit/>
+          </a:bodyPr>
+          <a:lstStyle/>
+          <a:p>
+            <a:r>
+              <a:rPr lang="en-US" altLang="zh-CN" sz="1200" b="1" dirty="0" smtClean="0"/>
+              <a:t>Abandon</a:t>
+            </a:r>
+            <a:endParaRPr lang="en-US" sz="1200" b="1" dirty="0"/>
+          </a:p>
+        </p:txBody>
+      </p:sp>
+      <p:sp>
+        <p:nvSpPr>
+          <p:cNvPr id="30" name="TextBox 29"/>
+          <p:cNvSpPr txBox="1"/>
+          <p:nvPr/>
+        </p:nvSpPr>
+        <p:spPr>
+          <a:xfrm>
+            <a:off x="3879353" y="1905000"/>
+            <a:ext cx="769763" cy="276999"/>
+          </a:xfrm>
+          <a:prstGeom prst="rect">
+            <a:avLst/>
+          </a:prstGeom>
+          <a:noFill/>
+        </p:spPr>
+        <p:txBody>
+          <a:bodyPr wrap="none" rtlCol="0">
+            <a:spAutoFit/>
+          </a:bodyPr>
+          <a:lstStyle/>
+          <a:p>
+            <a:r>
+              <a:rPr lang="en-US" altLang="zh-CN" sz="1200" b="1" dirty="0" smtClean="0"/>
+              <a:t>Abandon</a:t>
+            </a:r>
+            <a:endParaRPr lang="en-US" sz="1200" b="1" dirty="0"/>
+          </a:p>
+        </p:txBody>
+      </p:sp>
+      <p:sp>
+        <p:nvSpPr>
+          <p:cNvPr id="31" name="TextBox 30"/>
+          <p:cNvSpPr txBox="1"/>
+          <p:nvPr/>
+        </p:nvSpPr>
+        <p:spPr>
+          <a:xfrm>
+            <a:off x="5206718" y="1828800"/>
+            <a:ext cx="1034835" cy="276999"/>
+          </a:xfrm>
+          <a:prstGeom prst="rect">
+            <a:avLst/>
+          </a:prstGeom>
+          <a:noFill/>
+        </p:spPr>
+        <p:txBody>
+          <a:bodyPr wrap="none" rtlCol="0">
+            <a:spAutoFit/>
+          </a:bodyPr>
+          <a:lstStyle/>
+          <a:p>
+            <a:r>
+              <a:rPr lang="en-US" altLang="zh-CN" sz="1200" b="1" dirty="0" smtClean="0"/>
+              <a:t>Assign Assets</a:t>
+            </a:r>
+            <a:endParaRPr lang="en-US" sz="1200" b="1" dirty="0"/>
+          </a:p>
+        </p:txBody>
+      </p:sp>
+      <p:sp>
+        <p:nvSpPr>
+          <p:cNvPr id="32" name="TextBox 31"/>
+          <p:cNvSpPr txBox="1"/>
+          <p:nvPr/>
+        </p:nvSpPr>
+        <p:spPr>
+          <a:xfrm>
+            <a:off x="5327153" y="3352800"/>
+            <a:ext cx="679289" cy="276999"/>
+          </a:xfrm>
+          <a:prstGeom prst="rect">
+            <a:avLst/>
+          </a:prstGeom>
+          <a:noFill/>
+        </p:spPr>
+        <p:txBody>
+          <a:bodyPr wrap="none" rtlCol="0">
+            <a:spAutoFit/>
+          </a:bodyPr>
+          <a:lstStyle/>
+          <a:p>
+            <a:r>
+              <a:rPr lang="en-US" altLang="zh-CN" sz="1200" b="1" dirty="0" smtClean="0"/>
+              <a:t>Execute</a:t>
+            </a:r>
+            <a:endParaRPr lang="en-US" sz="1200" b="1" dirty="0"/>
+          </a:p>
+        </p:txBody>
+      </p:sp>
+      <p:sp>
+        <p:nvSpPr>
+          <p:cNvPr id="33" name="TextBox 32"/>
+          <p:cNvSpPr txBox="1"/>
+          <p:nvPr/>
+        </p:nvSpPr>
+        <p:spPr>
+          <a:xfrm>
+            <a:off x="5327153" y="4953000"/>
+            <a:ext cx="691215" cy="276999"/>
+          </a:xfrm>
+          <a:prstGeom prst="rect">
+            <a:avLst/>
+          </a:prstGeom>
+          <a:noFill/>
+        </p:spPr>
+        <p:txBody>
+          <a:bodyPr wrap="none" rtlCol="0">
+            <a:spAutoFit/>
+          </a:bodyPr>
+          <a:lstStyle/>
+          <a:p>
+            <a:r>
+              <a:rPr lang="en-US" altLang="zh-CN" sz="1200" b="1" dirty="0" smtClean="0"/>
+              <a:t>Commit</a:t>
+            </a:r>
+            <a:endParaRPr lang="en-US" sz="1200" b="1" dirty="0"/>
+          </a:p>
+        </p:txBody>
+      </p:sp>
+      <p:sp>
+        <p:nvSpPr>
+          <p:cNvPr id="34" name="TextBox 33"/>
+          <p:cNvSpPr txBox="1"/>
+          <p:nvPr/>
+        </p:nvSpPr>
+        <p:spPr>
+          <a:xfrm>
+            <a:off x="4260353" y="4876800"/>
+            <a:ext cx="691215" cy="276999"/>
+          </a:xfrm>
+          <a:prstGeom prst="rect">
+            <a:avLst/>
+          </a:prstGeom>
+          <a:noFill/>
+        </p:spPr>
+        <p:txBody>
+          <a:bodyPr wrap="none" rtlCol="0">
+            <a:spAutoFit/>
+          </a:bodyPr>
+          <a:lstStyle/>
+          <a:p>
+            <a:r>
+              <a:rPr lang="en-US" altLang="zh-CN" sz="1200" b="1" dirty="0" smtClean="0"/>
+              <a:t>Commit</a:t>
+            </a:r>
+            <a:endParaRPr lang="en-US" sz="1200" b="1" dirty="0"/>
+          </a:p>
+        </p:txBody>
+      </p:sp>
+      <p:sp>
+        <p:nvSpPr>
+          <p:cNvPr id="35" name="TextBox 34"/>
+          <p:cNvSpPr txBox="1"/>
+          <p:nvPr/>
+        </p:nvSpPr>
+        <p:spPr>
+          <a:xfrm>
+            <a:off x="4260353" y="5105400"/>
+            <a:ext cx="814967" cy="276999"/>
+          </a:xfrm>
+          <a:prstGeom prst="rect">
+            <a:avLst/>
+          </a:prstGeom>
+          <a:noFill/>
+        </p:spPr>
+        <p:txBody>
+          <a:bodyPr wrap="none" rtlCol="0">
+            <a:spAutoFit/>
+          </a:bodyPr>
+          <a:lstStyle/>
+          <a:p>
+            <a:r>
+              <a:rPr lang="en-US" altLang="zh-CN" sz="1200" b="1" dirty="0" smtClean="0"/>
+              <a:t>Invalidate</a:t>
+            </a:r>
+            <a:endParaRPr lang="en-US" sz="1200" b="1" dirty="0"/>
+          </a:p>
+        </p:txBody>
+      </p:sp>
+      <p:sp>
+        <p:nvSpPr>
+          <p:cNvPr id="36" name="TextBox 35"/>
+          <p:cNvSpPr txBox="1"/>
+          <p:nvPr/>
+        </p:nvSpPr>
+        <p:spPr>
+          <a:xfrm>
+            <a:off x="4336553" y="5638800"/>
+            <a:ext cx="814967" cy="276999"/>
+          </a:xfrm>
+          <a:prstGeom prst="rect">
+            <a:avLst/>
+          </a:prstGeom>
+          <a:noFill/>
+        </p:spPr>
+        <p:txBody>
+          <a:bodyPr wrap="none" rtlCol="0">
+            <a:spAutoFit/>
+          </a:bodyPr>
+          <a:lstStyle/>
+          <a:p>
+            <a:r>
+              <a:rPr lang="en-US" altLang="zh-CN" sz="1200" b="1" dirty="0" smtClean="0"/>
+              <a:t>Invalidate</a:t>
+            </a:r>
+            <a:endParaRPr lang="en-US" sz="1200" b="1" dirty="0"/>
+          </a:p>
+        </p:txBody>
+      </p:sp>
+      <p:cxnSp>
+        <p:nvCxnSpPr>
+          <p:cNvPr id="53" name="直接箭头连接符 17"/>
+          <p:cNvCxnSpPr>
+            <a:stCxn id="43" idx="1"/>
+            <a:endCxn id="40" idx="5"/>
+          </p:cNvCxnSpPr>
+          <p:nvPr/>
+        </p:nvCxnSpPr>
+        <p:spPr>
+          <a:xfrm flipH="1" flipV="1">
+            <a:off x="3307918" y="2247966"/>
+            <a:ext cx="1987917" cy="1700868"/>
+          </a:xfrm>
+          <a:prstGeom prst="straightConnector1">
+            <a:avLst/>
+          </a:prstGeom>
+          <a:ln>
+            <a:tailEnd type="arrow"/>
+          </a:ln>
+        </p:spPr>
+        <p:style>
+          <a:lnRef idx="1">
+            <a:schemeClr val="accent1"/>
+          </a:lnRef>
+          <a:fillRef idx="0">
+            <a:schemeClr val="accent1"/>
+          </a:fillRef>
+          <a:effectRef idx="0">
+            <a:schemeClr val="accent1"/>
+          </a:effectRef>
+          <a:fontRef idx="minor">
+            <a:schemeClr val="tx1"/>
+          </a:fontRef>
+        </p:style>
+      </p:cxnSp>
+      <p:cxnSp>
+        <p:nvCxnSpPr>
+          <p:cNvPr id="57" name="直接箭头连接符 17"/>
+          <p:cNvCxnSpPr>
+            <a:stCxn id="46" idx="1"/>
+          </p:cNvCxnSpPr>
+          <p:nvPr/>
+        </p:nvCxnSpPr>
+        <p:spPr>
+          <a:xfrm flipH="1" flipV="1">
+            <a:off x="3117353" y="2362200"/>
+            <a:ext cx="2178482" cy="3120044"/>
+          </a:xfrm>
+          <a:prstGeom prst="straightConnector1">
+            <a:avLst/>
+          </a:prstGeom>
+          <a:ln>
+            <a:tailEnd type="arrow"/>
+          </a:ln>
+        </p:spPr>
+        <p:style>
+          <a:lnRef idx="1">
+            <a:schemeClr val="accent1"/>
+          </a:lnRef>
+          <a:fillRef idx="0">
+            <a:schemeClr val="accent1"/>
+          </a:fillRef>
+          <a:effectRef idx="0">
+            <a:schemeClr val="accent1"/>
+          </a:effectRef>
+          <a:fontRef idx="minor">
+            <a:schemeClr val="tx1"/>
+          </a:fontRef>
+        </p:style>
+      </p:cxnSp>
+      <p:cxnSp>
+        <p:nvCxnSpPr>
+          <p:cNvPr id="58" name="直接箭头连接符 17"/>
+          <p:cNvCxnSpPr>
+            <a:stCxn id="55" idx="0"/>
+            <a:endCxn id="40" idx="4"/>
+          </p:cNvCxnSpPr>
+          <p:nvPr/>
+        </p:nvCxnSpPr>
+        <p:spPr>
+          <a:xfrm flipH="1" flipV="1">
+            <a:off x="2913353" y="2411400"/>
+            <a:ext cx="914400" cy="2907410"/>
+          </a:xfrm>
+          <a:prstGeom prst="straightConnector1">
+            <a:avLst/>
+          </a:prstGeom>
+          <a:ln>
+            <a:tailEnd type="arrow"/>
+          </a:ln>
+        </p:spPr>
+        <p:style>
+          <a:lnRef idx="1">
+            <a:schemeClr val="accent1"/>
+          </a:lnRef>
+          <a:fillRef idx="0">
+            <a:schemeClr val="accent1"/>
+          </a:fillRef>
+          <a:effectRef idx="0">
+            <a:schemeClr val="accent1"/>
+          </a:effectRef>
+          <a:fontRef idx="minor">
+            <a:schemeClr val="tx1"/>
+          </a:fontRef>
+        </p:style>
+      </p:cxnSp>
+      <p:sp>
+        <p:nvSpPr>
+          <p:cNvPr id="70" name="TextBox 69"/>
+          <p:cNvSpPr txBox="1"/>
+          <p:nvPr/>
+        </p:nvSpPr>
+        <p:spPr>
+          <a:xfrm>
+            <a:off x="3879353" y="2743200"/>
+            <a:ext cx="769763" cy="276999"/>
+          </a:xfrm>
+          <a:prstGeom prst="rect">
+            <a:avLst/>
+          </a:prstGeom>
+          <a:noFill/>
+        </p:spPr>
+        <p:txBody>
+          <a:bodyPr wrap="none" rtlCol="0">
+            <a:spAutoFit/>
+          </a:bodyPr>
+          <a:lstStyle/>
+          <a:p>
+            <a:r>
+              <a:rPr lang="en-US" altLang="zh-CN" sz="1200" b="1" dirty="0" smtClean="0"/>
+              <a:t>Abandon</a:t>
+            </a:r>
+            <a:endParaRPr lang="en-US" sz="1200" b="1" dirty="0"/>
+          </a:p>
+        </p:txBody>
+      </p:sp>
+      <p:sp>
+        <p:nvSpPr>
+          <p:cNvPr id="71" name="TextBox 70"/>
+          <p:cNvSpPr txBox="1"/>
+          <p:nvPr/>
+        </p:nvSpPr>
+        <p:spPr>
+          <a:xfrm>
+            <a:off x="3574553" y="3352800"/>
+            <a:ext cx="769763" cy="276999"/>
+          </a:xfrm>
+          <a:prstGeom prst="rect">
+            <a:avLst/>
+          </a:prstGeom>
+          <a:noFill/>
+        </p:spPr>
+        <p:txBody>
+          <a:bodyPr wrap="none" rtlCol="0">
+            <a:spAutoFit/>
+          </a:bodyPr>
+          <a:lstStyle/>
+          <a:p>
+            <a:r>
+              <a:rPr lang="en-US" altLang="zh-CN" sz="1200" b="1" dirty="0" smtClean="0"/>
+              <a:t>Abandon</a:t>
+            </a:r>
+            <a:endParaRPr lang="en-US" sz="1200" b="1" dirty="0"/>
+          </a:p>
+        </p:txBody>
+      </p:sp>
+      <p:sp>
+        <p:nvSpPr>
+          <p:cNvPr id="72" name="TextBox 71"/>
+          <p:cNvSpPr txBox="1"/>
+          <p:nvPr/>
+        </p:nvSpPr>
+        <p:spPr>
+          <a:xfrm>
+            <a:off x="2964953" y="3733800"/>
+            <a:ext cx="769763" cy="276999"/>
+          </a:xfrm>
+          <a:prstGeom prst="rect">
+            <a:avLst/>
+          </a:prstGeom>
+          <a:noFill/>
+        </p:spPr>
+        <p:txBody>
+          <a:bodyPr wrap="none" rtlCol="0">
+            <a:spAutoFit/>
+          </a:bodyPr>
+          <a:lstStyle/>
+          <a:p>
+            <a:r>
+              <a:rPr lang="en-US" altLang="zh-CN" sz="1200" b="1" dirty="0" smtClean="0"/>
+              <a:t>Abandon</a:t>
+            </a:r>
+            <a:endParaRPr lang="en-US" sz="1200" b="1" dirty="0"/>
+          </a:p>
+        </p:txBody>
+      </p:sp>
     </p:spTree>
     <p:extLst>
       <p:ext uri="{BB962C8B-B14F-4D97-AF65-F5344CB8AC3E}">
-        <p14:creationId xmlns:p14="http://schemas.microsoft.com/office/powerpoint/2010/main" val="3331000156"/>
+        <p14:creationId xmlns:p14="http://schemas.microsoft.com/office/powerpoint/2010/main" xmlns="" val="3331000156"/>
+      </p:ext>
+    </p:extLst>
+  </p:cSld>
+  <p:clrMapOvr>
+    <a:masterClrMapping/>
+  </p:clrMapOvr>
+</p:sld>
+</file>
+
+<file path=ppt/slides/slide18.xml><?xml version="1.0" encoding="utf-8"?>
+<p:sld xmlns:a="http://schemas.openxmlformats.org/drawingml/2006/main" xmlns:r="http://schemas.openxmlformats.org/officeDocument/2006/relationships" xmlns:p="http://schemas.openxmlformats.org/presentationml/2006/main">
+  <p:cSld>
+    <p:spTree>
+      <p:nvGrpSpPr>
+        <p:cNvPr id="1" name=""/>
+        <p:cNvGrpSpPr/>
+        <p:nvPr/>
+      </p:nvGrpSpPr>
+      <p:grpSpPr>
+        <a:xfrm>
+          <a:off x="0" y="0"/>
+          <a:ext cx="0" cy="0"/>
+          <a:chOff x="0" y="0"/>
+          <a:chExt cx="0" cy="0"/>
+        </a:xfrm>
+      </p:grpSpPr>
+      <p:sp>
+        <p:nvSpPr>
+          <p:cNvPr id="4" name="TextBox 3"/>
+          <p:cNvSpPr txBox="1"/>
+          <p:nvPr/>
+        </p:nvSpPr>
+        <p:spPr>
+          <a:xfrm>
+            <a:off x="685800" y="609600"/>
+            <a:ext cx="184731" cy="369332"/>
+          </a:xfrm>
+          <a:prstGeom prst="rect">
+            <a:avLst/>
+          </a:prstGeom>
+          <a:noFill/>
+        </p:spPr>
+        <p:txBody>
+          <a:bodyPr wrap="none" rtlCol="0">
+            <a:spAutoFit/>
+          </a:bodyPr>
+          <a:lstStyle/>
+          <a:p>
+            <a:endParaRPr lang="en-US" dirty="0"/>
+          </a:p>
+        </p:txBody>
+      </p:sp>
+      <p:sp>
+        <p:nvSpPr>
+          <p:cNvPr id="5" name="TextBox 4"/>
+          <p:cNvSpPr txBox="1"/>
+          <p:nvPr/>
+        </p:nvSpPr>
+        <p:spPr>
+          <a:xfrm>
+            <a:off x="457200" y="381000"/>
+            <a:ext cx="1984005" cy="523220"/>
+          </a:xfrm>
+          <a:prstGeom prst="rect">
+            <a:avLst/>
+          </a:prstGeom>
+          <a:noFill/>
+        </p:spPr>
+        <p:txBody>
+          <a:bodyPr wrap="none" rtlCol="0">
+            <a:spAutoFit/>
+          </a:bodyPr>
+          <a:lstStyle/>
+          <a:p>
+            <a:r>
+              <a:rPr lang="en-US" altLang="zh-CN" sz="2800" b="1" dirty="0" smtClean="0"/>
+              <a:t>Assets </a:t>
+            </a:r>
+            <a:r>
+              <a:rPr lang="en-US" altLang="zh-CN" sz="2800" b="1" dirty="0" smtClean="0"/>
+              <a:t>State</a:t>
+            </a:r>
+            <a:endParaRPr lang="en-US" sz="2800" b="1" dirty="0"/>
+          </a:p>
+        </p:txBody>
+      </p:sp>
+      <p:grpSp>
+        <p:nvGrpSpPr>
+          <p:cNvPr id="2" name="Group 61"/>
+          <p:cNvGrpSpPr/>
+          <p:nvPr/>
+        </p:nvGrpSpPr>
+        <p:grpSpPr>
+          <a:xfrm>
+            <a:off x="3566047" y="1447800"/>
+            <a:ext cx="1116000" cy="1116000"/>
+            <a:chOff x="3512346" y="1346193"/>
+            <a:chExt cx="1440649" cy="1371613"/>
+          </a:xfrm>
+        </p:grpSpPr>
+        <p:sp>
+          <p:nvSpPr>
+            <p:cNvPr id="63" name="Oval 62"/>
+            <p:cNvSpPr/>
+            <p:nvPr/>
+          </p:nvSpPr>
+          <p:spPr>
+            <a:xfrm>
+              <a:off x="3512346" y="1346193"/>
+              <a:ext cx="1440649" cy="1371613"/>
+            </a:xfrm>
+            <a:prstGeom prst="ellipse">
+              <a:avLst/>
+            </a:prstGeom>
+          </p:spPr>
+          <p:style>
+            <a:lnRef idx="2">
+              <a:schemeClr val="lt1">
+                <a:hueOff val="0"/>
+                <a:satOff val="0"/>
+                <a:lumOff val="0"/>
+                <a:alphaOff val="0"/>
+              </a:schemeClr>
+            </a:lnRef>
+            <a:fillRef idx="1">
+              <a:schemeClr val="accent1">
+                <a:hueOff val="0"/>
+                <a:satOff val="0"/>
+                <a:lumOff val="0"/>
+                <a:alphaOff val="0"/>
+              </a:schemeClr>
+            </a:fillRef>
+            <a:effectRef idx="0">
+              <a:schemeClr val="accent1">
+                <a:hueOff val="0"/>
+                <a:satOff val="0"/>
+                <a:lumOff val="0"/>
+                <a:alphaOff val="0"/>
+              </a:schemeClr>
+            </a:effectRef>
+            <a:fontRef idx="minor">
+              <a:schemeClr val="lt1"/>
+            </a:fontRef>
+          </p:style>
+        </p:sp>
+        <p:sp>
+          <p:nvSpPr>
+            <p:cNvPr id="64" name="Oval 4"/>
+            <p:cNvSpPr/>
+            <p:nvPr/>
+          </p:nvSpPr>
+          <p:spPr>
+            <a:xfrm>
+              <a:off x="3723324" y="1547061"/>
+              <a:ext cx="1018693" cy="969877"/>
+            </a:xfrm>
+            <a:prstGeom prst="rect">
+              <a:avLst/>
+            </a:prstGeom>
+          </p:spPr>
+          <p:style>
+            <a:lnRef idx="0">
+              <a:scrgbClr r="0" g="0" b="0"/>
+            </a:lnRef>
+            <a:fillRef idx="0">
+              <a:scrgbClr r="0" g="0" b="0"/>
+            </a:fillRef>
+            <a:effectRef idx="0">
+              <a:scrgbClr r="0" g="0" b="0"/>
+            </a:effectRef>
+            <a:fontRef idx="minor">
+              <a:schemeClr val="lt1"/>
+            </a:fontRef>
+          </p:style>
+          <p:txBody>
+            <a:bodyPr spcFirstLastPara="0" vert="horz" wrap="square" lIns="25400" tIns="25400" rIns="25400" bIns="25400" numCol="1" spcCol="1270" anchor="ctr" anchorCtr="0">
+              <a:noAutofit/>
+            </a:bodyPr>
+            <a:lstStyle/>
+            <a:p>
+              <a:pPr lvl="0" algn="ctr" defTabSz="889000">
+                <a:lnSpc>
+                  <a:spcPct val="90000"/>
+                </a:lnSpc>
+                <a:spcBef>
+                  <a:spcPct val="0"/>
+                </a:spcBef>
+                <a:spcAft>
+                  <a:spcPct val="35000"/>
+                </a:spcAft>
+              </a:pPr>
+              <a:r>
+                <a:rPr lang="en-US" sz="1200" b="1" kern="1200" dirty="0" smtClean="0"/>
+                <a:t>Idle</a:t>
+              </a:r>
+              <a:endParaRPr lang="en-US" sz="1200" b="1" kern="1200" dirty="0"/>
+            </a:p>
+          </p:txBody>
+        </p:sp>
+      </p:grpSp>
+      <p:grpSp>
+        <p:nvGrpSpPr>
+          <p:cNvPr id="6" name="Group 61"/>
+          <p:cNvGrpSpPr/>
+          <p:nvPr/>
+        </p:nvGrpSpPr>
+        <p:grpSpPr>
+          <a:xfrm>
+            <a:off x="5638800" y="3913200"/>
+            <a:ext cx="1116000" cy="1116000"/>
+            <a:chOff x="3512346" y="1346193"/>
+            <a:chExt cx="1440649" cy="1371613"/>
+          </a:xfrm>
+        </p:grpSpPr>
+        <p:sp>
+          <p:nvSpPr>
+            <p:cNvPr id="40" name="Oval 62"/>
+            <p:cNvSpPr/>
+            <p:nvPr/>
+          </p:nvSpPr>
+          <p:spPr>
+            <a:xfrm>
+              <a:off x="3512346" y="1346193"/>
+              <a:ext cx="1440649" cy="1371613"/>
+            </a:xfrm>
+            <a:prstGeom prst="ellipse">
+              <a:avLst/>
+            </a:prstGeom>
+          </p:spPr>
+          <p:style>
+            <a:lnRef idx="2">
+              <a:schemeClr val="lt1">
+                <a:hueOff val="0"/>
+                <a:satOff val="0"/>
+                <a:lumOff val="0"/>
+                <a:alphaOff val="0"/>
+              </a:schemeClr>
+            </a:lnRef>
+            <a:fillRef idx="1">
+              <a:schemeClr val="accent1">
+                <a:hueOff val="0"/>
+                <a:satOff val="0"/>
+                <a:lumOff val="0"/>
+                <a:alphaOff val="0"/>
+              </a:schemeClr>
+            </a:fillRef>
+            <a:effectRef idx="0">
+              <a:schemeClr val="accent1">
+                <a:hueOff val="0"/>
+                <a:satOff val="0"/>
+                <a:lumOff val="0"/>
+                <a:alphaOff val="0"/>
+              </a:schemeClr>
+            </a:effectRef>
+            <a:fontRef idx="minor">
+              <a:schemeClr val="lt1"/>
+            </a:fontRef>
+          </p:style>
+        </p:sp>
+        <p:sp>
+          <p:nvSpPr>
+            <p:cNvPr id="41" name="Oval 4"/>
+            <p:cNvSpPr/>
+            <p:nvPr/>
+          </p:nvSpPr>
+          <p:spPr>
+            <a:xfrm>
+              <a:off x="3723324" y="1547061"/>
+              <a:ext cx="1018693" cy="969877"/>
+            </a:xfrm>
+            <a:prstGeom prst="rect">
+              <a:avLst/>
+            </a:prstGeom>
+          </p:spPr>
+          <p:style>
+            <a:lnRef idx="0">
+              <a:scrgbClr r="0" g="0" b="0"/>
+            </a:lnRef>
+            <a:fillRef idx="0">
+              <a:scrgbClr r="0" g="0" b="0"/>
+            </a:fillRef>
+            <a:effectRef idx="0">
+              <a:scrgbClr r="0" g="0" b="0"/>
+            </a:effectRef>
+            <a:fontRef idx="minor">
+              <a:schemeClr val="lt1"/>
+            </a:fontRef>
+          </p:style>
+          <p:txBody>
+            <a:bodyPr spcFirstLastPara="0" vert="horz" wrap="square" lIns="25400" tIns="25400" rIns="25400" bIns="25400" numCol="1" spcCol="1270" anchor="ctr" anchorCtr="0">
+              <a:noAutofit/>
+            </a:bodyPr>
+            <a:lstStyle/>
+            <a:p>
+              <a:pPr lvl="0" algn="ctr" defTabSz="889000">
+                <a:lnSpc>
+                  <a:spcPct val="90000"/>
+                </a:lnSpc>
+                <a:spcBef>
+                  <a:spcPct val="0"/>
+                </a:spcBef>
+                <a:spcAft>
+                  <a:spcPct val="35000"/>
+                </a:spcAft>
+              </a:pPr>
+              <a:r>
+                <a:rPr lang="en-US" sz="1200" b="1" dirty="0" smtClean="0"/>
+                <a:t>Using</a:t>
+              </a:r>
+              <a:endParaRPr lang="en-US" sz="1200" b="1" kern="1200" dirty="0"/>
+            </a:p>
+          </p:txBody>
+        </p:sp>
+      </p:grpSp>
+      <p:grpSp>
+        <p:nvGrpSpPr>
+          <p:cNvPr id="11" name="Group 61"/>
+          <p:cNvGrpSpPr/>
+          <p:nvPr/>
+        </p:nvGrpSpPr>
+        <p:grpSpPr>
+          <a:xfrm>
+            <a:off x="1600200" y="3913200"/>
+            <a:ext cx="1116000" cy="1116000"/>
+            <a:chOff x="3512346" y="1346193"/>
+            <a:chExt cx="1440649" cy="1371613"/>
+          </a:xfrm>
+        </p:grpSpPr>
+        <p:sp>
+          <p:nvSpPr>
+            <p:cNvPr id="49" name="Oval 62"/>
+            <p:cNvSpPr/>
+            <p:nvPr/>
+          </p:nvSpPr>
+          <p:spPr>
+            <a:xfrm>
+              <a:off x="3512346" y="1346193"/>
+              <a:ext cx="1440649" cy="1371613"/>
+            </a:xfrm>
+            <a:prstGeom prst="ellipse">
+              <a:avLst/>
+            </a:prstGeom>
+          </p:spPr>
+          <p:style>
+            <a:lnRef idx="2">
+              <a:schemeClr val="lt1">
+                <a:hueOff val="0"/>
+                <a:satOff val="0"/>
+                <a:lumOff val="0"/>
+                <a:alphaOff val="0"/>
+              </a:schemeClr>
+            </a:lnRef>
+            <a:fillRef idx="1">
+              <a:schemeClr val="accent1">
+                <a:hueOff val="0"/>
+                <a:satOff val="0"/>
+                <a:lumOff val="0"/>
+                <a:alphaOff val="0"/>
+              </a:schemeClr>
+            </a:fillRef>
+            <a:effectRef idx="0">
+              <a:schemeClr val="accent1">
+                <a:hueOff val="0"/>
+                <a:satOff val="0"/>
+                <a:lumOff val="0"/>
+                <a:alphaOff val="0"/>
+              </a:schemeClr>
+            </a:effectRef>
+            <a:fontRef idx="minor">
+              <a:schemeClr val="lt1"/>
+            </a:fontRef>
+          </p:style>
+        </p:sp>
+        <p:sp>
+          <p:nvSpPr>
+            <p:cNvPr id="50" name="Oval 4"/>
+            <p:cNvSpPr/>
+            <p:nvPr/>
+          </p:nvSpPr>
+          <p:spPr>
+            <a:xfrm>
+              <a:off x="3723324" y="1547061"/>
+              <a:ext cx="1018693" cy="969877"/>
+            </a:xfrm>
+            <a:prstGeom prst="rect">
+              <a:avLst/>
+            </a:prstGeom>
+          </p:spPr>
+          <p:style>
+            <a:lnRef idx="0">
+              <a:scrgbClr r="0" g="0" b="0"/>
+            </a:lnRef>
+            <a:fillRef idx="0">
+              <a:scrgbClr r="0" g="0" b="0"/>
+            </a:fillRef>
+            <a:effectRef idx="0">
+              <a:scrgbClr r="0" g="0" b="0"/>
+            </a:effectRef>
+            <a:fontRef idx="minor">
+              <a:schemeClr val="lt1"/>
+            </a:fontRef>
+          </p:style>
+          <p:txBody>
+            <a:bodyPr spcFirstLastPara="0" vert="horz" wrap="square" lIns="25400" tIns="25400" rIns="25400" bIns="25400" numCol="1" spcCol="1270" anchor="ctr" anchorCtr="0">
+              <a:noAutofit/>
+            </a:bodyPr>
+            <a:lstStyle/>
+            <a:p>
+              <a:pPr lvl="0" algn="ctr" defTabSz="889000">
+                <a:lnSpc>
+                  <a:spcPct val="90000"/>
+                </a:lnSpc>
+                <a:spcBef>
+                  <a:spcPct val="0"/>
+                </a:spcBef>
+                <a:spcAft>
+                  <a:spcPct val="35000"/>
+                </a:spcAft>
+              </a:pPr>
+              <a:r>
+                <a:rPr lang="en-US" sz="1200" b="1" kern="1200" dirty="0" smtClean="0"/>
+                <a:t>Assigned</a:t>
+              </a:r>
+              <a:endParaRPr lang="en-US" sz="1200" b="1" kern="1200" dirty="0"/>
+            </a:p>
+          </p:txBody>
+        </p:sp>
+      </p:grpSp>
+      <p:cxnSp>
+        <p:nvCxnSpPr>
+          <p:cNvPr id="3" name="直接箭头连接符 2"/>
+          <p:cNvCxnSpPr>
+            <a:endCxn id="63" idx="5"/>
+          </p:cNvCxnSpPr>
+          <p:nvPr/>
+        </p:nvCxnSpPr>
+        <p:spPr>
+          <a:xfrm flipH="1" flipV="1">
+            <a:off x="4518612" y="2400366"/>
+            <a:ext cx="1272588" cy="1638234"/>
+          </a:xfrm>
+          <a:prstGeom prst="straightConnector1">
+            <a:avLst/>
+          </a:prstGeom>
+          <a:ln>
+            <a:tailEnd type="arrow"/>
+          </a:ln>
+        </p:spPr>
+        <p:style>
+          <a:lnRef idx="1">
+            <a:schemeClr val="accent1"/>
+          </a:lnRef>
+          <a:fillRef idx="0">
+            <a:schemeClr val="accent1"/>
+          </a:fillRef>
+          <a:effectRef idx="0">
+            <a:schemeClr val="accent1"/>
+          </a:effectRef>
+          <a:fontRef idx="minor">
+            <a:schemeClr val="tx1"/>
+          </a:fontRef>
+        </p:style>
+      </p:cxnSp>
+      <p:cxnSp>
+        <p:nvCxnSpPr>
+          <p:cNvPr id="7" name="直接箭头连接符 6"/>
+          <p:cNvCxnSpPr>
+            <a:stCxn id="63" idx="3"/>
+            <a:endCxn id="49" idx="7"/>
+          </p:cNvCxnSpPr>
+          <p:nvPr/>
+        </p:nvCxnSpPr>
+        <p:spPr>
+          <a:xfrm flipH="1">
+            <a:off x="2552765" y="2400366"/>
+            <a:ext cx="1176717" cy="1676268"/>
+          </a:xfrm>
+          <a:prstGeom prst="straightConnector1">
+            <a:avLst/>
+          </a:prstGeom>
+          <a:ln>
+            <a:tailEnd type="arrow"/>
+          </a:ln>
+        </p:spPr>
+        <p:style>
+          <a:lnRef idx="1">
+            <a:schemeClr val="accent1"/>
+          </a:lnRef>
+          <a:fillRef idx="0">
+            <a:schemeClr val="accent1"/>
+          </a:fillRef>
+          <a:effectRef idx="0">
+            <a:schemeClr val="accent1"/>
+          </a:effectRef>
+          <a:fontRef idx="minor">
+            <a:schemeClr val="tx1"/>
+          </a:fontRef>
+        </p:style>
+      </p:cxnSp>
+      <p:cxnSp>
+        <p:nvCxnSpPr>
+          <p:cNvPr id="18" name="直接箭头连接符 17"/>
+          <p:cNvCxnSpPr>
+            <a:stCxn id="49" idx="6"/>
+            <a:endCxn id="40" idx="2"/>
+          </p:cNvCxnSpPr>
+          <p:nvPr/>
+        </p:nvCxnSpPr>
+        <p:spPr>
+          <a:xfrm>
+            <a:off x="2716200" y="4471200"/>
+            <a:ext cx="2922600" cy="0"/>
+          </a:xfrm>
+          <a:prstGeom prst="straightConnector1">
+            <a:avLst/>
+          </a:prstGeom>
+          <a:ln>
+            <a:tailEnd type="arrow"/>
+          </a:ln>
+        </p:spPr>
+        <p:style>
+          <a:lnRef idx="1">
+            <a:schemeClr val="accent1"/>
+          </a:lnRef>
+          <a:fillRef idx="0">
+            <a:schemeClr val="accent1"/>
+          </a:fillRef>
+          <a:effectRef idx="0">
+            <a:schemeClr val="accent1"/>
+          </a:effectRef>
+          <a:fontRef idx="minor">
+            <a:schemeClr val="tx1"/>
+          </a:fontRef>
+        </p:style>
+      </p:cxnSp>
+      <p:sp>
+        <p:nvSpPr>
+          <p:cNvPr id="37" name="TextBox 36"/>
+          <p:cNvSpPr txBox="1"/>
+          <p:nvPr/>
+        </p:nvSpPr>
+        <p:spPr>
+          <a:xfrm>
+            <a:off x="2286000" y="2847201"/>
+            <a:ext cx="1034835" cy="276999"/>
+          </a:xfrm>
+          <a:prstGeom prst="rect">
+            <a:avLst/>
+          </a:prstGeom>
+          <a:noFill/>
+        </p:spPr>
+        <p:txBody>
+          <a:bodyPr wrap="none" rtlCol="0">
+            <a:spAutoFit/>
+          </a:bodyPr>
+          <a:lstStyle/>
+          <a:p>
+            <a:r>
+              <a:rPr lang="en-US" altLang="zh-CN" sz="1200" b="1" dirty="0" smtClean="0"/>
+              <a:t>Assign Assets</a:t>
+            </a:r>
+            <a:endParaRPr lang="en-US" sz="1200" b="1" dirty="0"/>
+          </a:p>
+        </p:txBody>
+      </p:sp>
+      <p:sp>
+        <p:nvSpPr>
+          <p:cNvPr id="38" name="TextBox 37"/>
+          <p:cNvSpPr txBox="1"/>
+          <p:nvPr/>
+        </p:nvSpPr>
+        <p:spPr>
+          <a:xfrm>
+            <a:off x="3581400" y="4191000"/>
+            <a:ext cx="679289" cy="276999"/>
+          </a:xfrm>
+          <a:prstGeom prst="rect">
+            <a:avLst/>
+          </a:prstGeom>
+          <a:noFill/>
+        </p:spPr>
+        <p:txBody>
+          <a:bodyPr wrap="none" rtlCol="0">
+            <a:spAutoFit/>
+          </a:bodyPr>
+          <a:lstStyle/>
+          <a:p>
+            <a:r>
+              <a:rPr lang="en-US" altLang="zh-CN" sz="1200" b="1" dirty="0" smtClean="0"/>
+              <a:t>Execute</a:t>
+            </a:r>
+            <a:endParaRPr lang="en-US" sz="1200" b="1" dirty="0"/>
+          </a:p>
+        </p:txBody>
+      </p:sp>
+      <p:sp>
+        <p:nvSpPr>
+          <p:cNvPr id="39" name="TextBox 38"/>
+          <p:cNvSpPr txBox="1"/>
+          <p:nvPr/>
+        </p:nvSpPr>
+        <p:spPr>
+          <a:xfrm>
+            <a:off x="4724400" y="2819400"/>
+            <a:ext cx="814967" cy="646331"/>
+          </a:xfrm>
+          <a:prstGeom prst="rect">
+            <a:avLst/>
+          </a:prstGeom>
+          <a:noFill/>
+        </p:spPr>
+        <p:txBody>
+          <a:bodyPr wrap="none" rtlCol="0">
+            <a:spAutoFit/>
+          </a:bodyPr>
+          <a:lstStyle/>
+          <a:p>
+            <a:r>
+              <a:rPr lang="en-US" altLang="zh-CN" sz="1200" b="1" dirty="0" smtClean="0"/>
+              <a:t>Commit</a:t>
+            </a:r>
+          </a:p>
+          <a:p>
+            <a:endParaRPr lang="en-US" altLang="zh-CN" sz="1200" b="1" dirty="0" smtClean="0"/>
+          </a:p>
+          <a:p>
+            <a:r>
+              <a:rPr lang="en-US" sz="1200" b="1" dirty="0" smtClean="0"/>
+              <a:t>Invalidate</a:t>
+            </a:r>
+            <a:endParaRPr lang="en-US" sz="1200" b="1" dirty="0"/>
+          </a:p>
+        </p:txBody>
+      </p:sp>
+      <p:cxnSp>
+        <p:nvCxnSpPr>
+          <p:cNvPr id="42" name="直接箭头连接符 6"/>
+          <p:cNvCxnSpPr/>
+          <p:nvPr/>
+        </p:nvCxnSpPr>
+        <p:spPr>
+          <a:xfrm flipV="1">
+            <a:off x="2590800" y="2438400"/>
+            <a:ext cx="1214882" cy="1714434"/>
+          </a:xfrm>
+          <a:prstGeom prst="straightConnector1">
+            <a:avLst/>
+          </a:prstGeom>
+          <a:ln>
+            <a:tailEnd type="arrow"/>
+          </a:ln>
+        </p:spPr>
+        <p:style>
+          <a:lnRef idx="1">
+            <a:schemeClr val="accent1"/>
+          </a:lnRef>
+          <a:fillRef idx="0">
+            <a:schemeClr val="accent1"/>
+          </a:fillRef>
+          <a:effectRef idx="0">
+            <a:schemeClr val="accent1"/>
+          </a:effectRef>
+          <a:fontRef idx="minor">
+            <a:schemeClr val="tx1"/>
+          </a:fontRef>
+        </p:style>
+      </p:cxnSp>
+      <p:sp>
+        <p:nvSpPr>
+          <p:cNvPr id="52" name="TextBox 51"/>
+          <p:cNvSpPr txBox="1"/>
+          <p:nvPr/>
+        </p:nvSpPr>
+        <p:spPr>
+          <a:xfrm>
+            <a:off x="3048000" y="3276600"/>
+            <a:ext cx="769763" cy="276999"/>
+          </a:xfrm>
+          <a:prstGeom prst="rect">
+            <a:avLst/>
+          </a:prstGeom>
+          <a:noFill/>
+        </p:spPr>
+        <p:txBody>
+          <a:bodyPr wrap="none" rtlCol="0">
+            <a:spAutoFit/>
+          </a:bodyPr>
+          <a:lstStyle/>
+          <a:p>
+            <a:r>
+              <a:rPr lang="en-US" altLang="zh-CN" sz="1200" b="1" dirty="0" smtClean="0"/>
+              <a:t>Abandon</a:t>
+            </a:r>
+            <a:endParaRPr lang="en-US" sz="1200" b="1" dirty="0"/>
+          </a:p>
+        </p:txBody>
+      </p:sp>
+    </p:spTree>
+    <p:extLst>
+      <p:ext uri="{BB962C8B-B14F-4D97-AF65-F5344CB8AC3E}">
+        <p14:creationId xmlns:p14="http://schemas.microsoft.com/office/powerpoint/2010/main" xmlns="" val="3331000156"/>
       </p:ext>
     </p:extLst>
   </p:cSld>
@@ -43897,7 +45009,7 @@
     </p:spTree>
     <p:extLst>
       <p:ext uri="{BB962C8B-B14F-4D97-AF65-F5344CB8AC3E}">
-        <p14:creationId xmlns:p14="http://schemas.microsoft.com/office/powerpoint/2010/main" val="310334687"/>
+        <p14:creationId xmlns:p14="http://schemas.microsoft.com/office/powerpoint/2010/main" xmlns="" val="310334687"/>
       </p:ext>
     </p:extLst>
   </p:cSld>
@@ -47187,7 +48299,7 @@
     </p:spTree>
     <p:extLst>
       <p:ext uri="{BB962C8B-B14F-4D97-AF65-F5344CB8AC3E}">
-        <p14:creationId xmlns:p14="http://schemas.microsoft.com/office/powerpoint/2010/main" val="4063426240"/>
+        <p14:creationId xmlns:p14="http://schemas.microsoft.com/office/powerpoint/2010/main" xmlns="" val="4063426240"/>
       </p:ext>
     </p:extLst>
   </p:cSld>

</xml_diff>

<commit_message>
Added records property to AssetClass to store usage information. Ready for serialization
</commit_message>
<xml_diff>
--- a/Doc/V5 design doc.pptx
+++ b/Doc/V5 design doc.pptx
@@ -5,7 +5,7 @@
     <p:sldMasterId id="2147483648" r:id="rId1"/>
   </p:sldMasterIdLst>
   <p:notesMasterIdLst>
-    <p:notesMasterId r:id="rId20"/>
+    <p:notesMasterId r:id="rId21"/>
   </p:notesMasterIdLst>
   <p:sldIdLst>
     <p:sldId id="256" r:id="rId2"/>
@@ -26,6 +26,7 @@
     <p:sldId id="268" r:id="rId17"/>
     <p:sldId id="269" r:id="rId18"/>
     <p:sldId id="283" r:id="rId19"/>
+    <p:sldId id="284" r:id="rId20"/>
   </p:sldIdLst>
   <p:sldSz cx="9144000" cy="6858000" type="screen4x3"/>
   <p:notesSz cx="6858000" cy="9144000"/>
@@ -210,7 +211,7 @@
             <a:fld id="{360BB726-B4AA-437F-9776-1FB3CA074112}" type="datetimeFigureOut">
               <a:rPr lang="en-US" smtClean="0"/>
               <a:pPr/>
-              <a:t>4/15/2019</a:t>
+              <a:t>4/16/2019</a:t>
             </a:fld>
             <a:endParaRPr lang="en-US"/>
           </a:p>
@@ -663,7 +664,7 @@
             <a:fld id="{1D8BD707-D9CF-40AE-B4C6-C98DA3205C09}" type="datetimeFigureOut">
               <a:rPr lang="en-US" smtClean="0"/>
               <a:pPr/>
-              <a:t>4/15/2019</a:t>
+              <a:t>4/16/2019</a:t>
             </a:fld>
             <a:endParaRPr lang="en-US"/>
           </a:p>
@@ -830,7 +831,7 @@
             <a:fld id="{1D8BD707-D9CF-40AE-B4C6-C98DA3205C09}" type="datetimeFigureOut">
               <a:rPr lang="en-US" smtClean="0"/>
               <a:pPr/>
-              <a:t>4/15/2019</a:t>
+              <a:t>4/16/2019</a:t>
             </a:fld>
             <a:endParaRPr lang="en-US"/>
           </a:p>
@@ -1007,7 +1008,7 @@
             <a:fld id="{1D8BD707-D9CF-40AE-B4C6-C98DA3205C09}" type="datetimeFigureOut">
               <a:rPr lang="en-US" smtClean="0"/>
               <a:pPr/>
-              <a:t>4/15/2019</a:t>
+              <a:t>4/16/2019</a:t>
             </a:fld>
             <a:endParaRPr lang="en-US"/>
           </a:p>
@@ -1174,7 +1175,7 @@
             <a:fld id="{1D8BD707-D9CF-40AE-B4C6-C98DA3205C09}" type="datetimeFigureOut">
               <a:rPr lang="en-US" smtClean="0"/>
               <a:pPr/>
-              <a:t>4/15/2019</a:t>
+              <a:t>4/16/2019</a:t>
             </a:fld>
             <a:endParaRPr lang="en-US"/>
           </a:p>
@@ -1417,7 +1418,7 @@
             <a:fld id="{1D8BD707-D9CF-40AE-B4C6-C98DA3205C09}" type="datetimeFigureOut">
               <a:rPr lang="en-US" smtClean="0"/>
               <a:pPr/>
-              <a:t>4/15/2019</a:t>
+              <a:t>4/16/2019</a:t>
             </a:fld>
             <a:endParaRPr lang="en-US"/>
           </a:p>
@@ -1702,7 +1703,7 @@
             <a:fld id="{1D8BD707-D9CF-40AE-B4C6-C98DA3205C09}" type="datetimeFigureOut">
               <a:rPr lang="en-US" smtClean="0"/>
               <a:pPr/>
-              <a:t>4/15/2019</a:t>
+              <a:t>4/16/2019</a:t>
             </a:fld>
             <a:endParaRPr lang="en-US"/>
           </a:p>
@@ -2121,7 +2122,7 @@
             <a:fld id="{1D8BD707-D9CF-40AE-B4C6-C98DA3205C09}" type="datetimeFigureOut">
               <a:rPr lang="en-US" smtClean="0"/>
               <a:pPr/>
-              <a:t>4/15/2019</a:t>
+              <a:t>4/16/2019</a:t>
             </a:fld>
             <a:endParaRPr lang="en-US"/>
           </a:p>
@@ -2236,7 +2237,7 @@
             <a:fld id="{1D8BD707-D9CF-40AE-B4C6-C98DA3205C09}" type="datetimeFigureOut">
               <a:rPr lang="en-US" smtClean="0"/>
               <a:pPr/>
-              <a:t>4/15/2019</a:t>
+              <a:t>4/16/2019</a:t>
             </a:fld>
             <a:endParaRPr lang="en-US"/>
           </a:p>
@@ -2328,7 +2329,7 @@
             <a:fld id="{1D8BD707-D9CF-40AE-B4C6-C98DA3205C09}" type="datetimeFigureOut">
               <a:rPr lang="en-US" smtClean="0"/>
               <a:pPr/>
-              <a:t>4/15/2019</a:t>
+              <a:t>4/16/2019</a:t>
             </a:fld>
             <a:endParaRPr lang="en-US"/>
           </a:p>
@@ -2602,7 +2603,7 @@
             <a:fld id="{1D8BD707-D9CF-40AE-B4C6-C98DA3205C09}" type="datetimeFigureOut">
               <a:rPr lang="en-US" smtClean="0"/>
               <a:pPr/>
-              <a:t>4/15/2019</a:t>
+              <a:t>4/16/2019</a:t>
             </a:fld>
             <a:endParaRPr lang="en-US"/>
           </a:p>
@@ -2852,7 +2853,7 @@
             <a:fld id="{1D8BD707-D9CF-40AE-B4C6-C98DA3205C09}" type="datetimeFigureOut">
               <a:rPr lang="en-US" smtClean="0"/>
               <a:pPr/>
-              <a:t>4/15/2019</a:t>
+              <a:t>4/16/2019</a:t>
             </a:fld>
             <a:endParaRPr lang="en-US"/>
           </a:p>
@@ -3062,7 +3063,7 @@
             <a:fld id="{1D8BD707-D9CF-40AE-B4C6-C98DA3205C09}" type="datetimeFigureOut">
               <a:rPr lang="en-US" smtClean="0"/>
               <a:pPr/>
-              <a:t>4/15/2019</a:t>
+              <a:t>4/16/2019</a:t>
             </a:fld>
             <a:endParaRPr lang="en-US"/>
           </a:p>
@@ -24780,42 +24781,6 @@
       </p:sp>
       <p:cxnSp>
         <p:nvCxnSpPr>
-          <p:cNvPr id="53" name="直接箭头连接符 17"/>
-          <p:cNvCxnSpPr>
-            <a:stCxn id="43" idx="1"/>
-            <a:endCxn id="40" idx="5"/>
-          </p:cNvCxnSpPr>
-          <p:nvPr/>
-        </p:nvCxnSpPr>
-        <p:spPr>
-          <a:xfrm flipH="1" flipV="1">
-            <a:off x="3307918" y="2247966"/>
-            <a:ext cx="1987917" cy="1700868"/>
-          </a:xfrm>
-          <a:prstGeom prst="straightConnector1">
-            <a:avLst/>
-          </a:prstGeom>
-          <a:ln>
-            <a:tailEnd type="arrow"/>
-          </a:ln>
-        </p:spPr>
-        <p:style>
-          <a:lnRef idx="1">
-            <a:schemeClr val="accent1"/>
-          </a:lnRef>
-          <a:fillRef idx="0">
-            <a:schemeClr val="accent1"/>
-          </a:fillRef>
-          <a:effectRef idx="0">
-            <a:schemeClr val="accent1"/>
-          </a:effectRef>
-          <a:fontRef idx="minor">
-            <a:schemeClr val="tx1"/>
-          </a:fontRef>
-        </p:style>
-      </p:cxnSp>
-      <p:cxnSp>
-        <p:nvCxnSpPr>
           <p:cNvPr id="57" name="直接箭头连接符 17"/>
           <p:cNvCxnSpPr>
             <a:stCxn id="46" idx="1"/>
@@ -24885,36 +24850,6 @@
           </a:fontRef>
         </p:style>
       </p:cxnSp>
-      <p:sp>
-        <p:nvSpPr>
-          <p:cNvPr id="70" name="TextBox 69"/>
-          <p:cNvSpPr txBox="1"/>
-          <p:nvPr/>
-        </p:nvSpPr>
-        <p:spPr>
-          <a:xfrm>
-            <a:off x="3879353" y="2743200"/>
-            <a:ext cx="769763" cy="276999"/>
-          </a:xfrm>
-          <a:prstGeom prst="rect">
-            <a:avLst/>
-          </a:prstGeom>
-          <a:noFill/>
-        </p:spPr>
-        <p:txBody>
-          <a:bodyPr wrap="none" rtlCol="0">
-            <a:spAutoFit/>
-          </a:bodyPr>
-          <a:lstStyle/>
-          <a:p>
-            <a:r>
-              <a:rPr lang="en-US" altLang="zh-CN" sz="1200" b="1" dirty="0" smtClean="0"/>
-              <a:t>Abandon</a:t>
-            </a:r>
-            <a:endParaRPr lang="en-US" sz="1200" b="1" dirty="0"/>
-          </a:p>
-        </p:txBody>
-      </p:sp>
       <p:sp>
         <p:nvSpPr>
           <p:cNvPr id="71" name="TextBox 70"/>
@@ -25055,11 +24990,7 @@
           <a:p>
             <a:r>
               <a:rPr lang="en-US" altLang="zh-CN" sz="2800" b="1" dirty="0" smtClean="0"/>
-              <a:t>Assets </a:t>
-            </a:r>
-            <a:r>
-              <a:rPr lang="en-US" altLang="zh-CN" sz="2800" b="1" dirty="0" smtClean="0"/>
-              <a:t>State</a:t>
+              <a:t>Assets State</a:t>
             </a:r>
             <a:endParaRPr lang="en-US" sz="2800" b="1" dirty="0"/>
           </a:p>
@@ -25673,6 +25604,2208 @@
               <a:t>Abandon</a:t>
             </a:r>
             <a:endParaRPr lang="en-US" sz="1200" b="1" dirty="0"/>
+          </a:p>
+        </p:txBody>
+      </p:sp>
+    </p:spTree>
+    <p:extLst>
+      <p:ext uri="{BB962C8B-B14F-4D97-AF65-F5344CB8AC3E}">
+        <p14:creationId xmlns:p14="http://schemas.microsoft.com/office/powerpoint/2010/main" xmlns="" val="3331000156"/>
+      </p:ext>
+    </p:extLst>
+  </p:cSld>
+  <p:clrMapOvr>
+    <a:masterClrMapping/>
+  </p:clrMapOvr>
+</p:sld>
+</file>
+
+<file path=ppt/slides/slide19.xml><?xml version="1.0" encoding="utf-8"?>
+<p:sld xmlns:a="http://schemas.openxmlformats.org/drawingml/2006/main" xmlns:r="http://schemas.openxmlformats.org/officeDocument/2006/relationships" xmlns:p="http://schemas.openxmlformats.org/presentationml/2006/main">
+  <p:cSld>
+    <p:spTree>
+      <p:nvGrpSpPr>
+        <p:cNvPr id="1" name=""/>
+        <p:cNvGrpSpPr/>
+        <p:nvPr/>
+      </p:nvGrpSpPr>
+      <p:grpSpPr>
+        <a:xfrm>
+          <a:off x="0" y="0"/>
+          <a:ext cx="0" cy="0"/>
+          <a:chOff x="0" y="0"/>
+          <a:chExt cx="0" cy="0"/>
+        </a:xfrm>
+      </p:grpSpPr>
+      <p:sp>
+        <p:nvSpPr>
+          <p:cNvPr id="4" name="TextBox 3"/>
+          <p:cNvSpPr txBox="1"/>
+          <p:nvPr/>
+        </p:nvSpPr>
+        <p:spPr>
+          <a:xfrm>
+            <a:off x="685800" y="609600"/>
+            <a:ext cx="184731" cy="369332"/>
+          </a:xfrm>
+          <a:prstGeom prst="rect">
+            <a:avLst/>
+          </a:prstGeom>
+          <a:noFill/>
+        </p:spPr>
+        <p:txBody>
+          <a:bodyPr wrap="none" rtlCol="0">
+            <a:spAutoFit/>
+          </a:bodyPr>
+          <a:lstStyle/>
+          <a:p>
+            <a:endParaRPr lang="en-US" dirty="0"/>
+          </a:p>
+        </p:txBody>
+      </p:sp>
+      <p:sp>
+        <p:nvSpPr>
+          <p:cNvPr id="5" name="TextBox 4"/>
+          <p:cNvSpPr txBox="1"/>
+          <p:nvPr/>
+        </p:nvSpPr>
+        <p:spPr>
+          <a:xfrm>
+            <a:off x="457200" y="381000"/>
+            <a:ext cx="1578830" cy="523220"/>
+          </a:xfrm>
+          <a:prstGeom prst="rect">
+            <a:avLst/>
+          </a:prstGeom>
+          <a:noFill/>
+        </p:spPr>
+        <p:txBody>
+          <a:bodyPr wrap="none" rtlCol="0">
+            <a:spAutoFit/>
+          </a:bodyPr>
+          <a:lstStyle/>
+          <a:p>
+            <a:r>
+              <a:rPr lang="en-US" altLang="zh-CN" sz="2800" b="1" dirty="0" smtClean="0"/>
+              <a:t>Database</a:t>
+            </a:r>
+            <a:endParaRPr lang="en-US" sz="2800" b="1" dirty="0"/>
+          </a:p>
+        </p:txBody>
+      </p:sp>
+      <p:sp>
+        <p:nvSpPr>
+          <p:cNvPr id="21" name="矩形 13">
+            <a:extLst>
+              <a:ext uri="{FF2B5EF4-FFF2-40B4-BE49-F238E27FC236}">
+                <a16:creationId xmlns:a16="http://schemas.microsoft.com/office/drawing/2014/main" xmlns="" id="{FABDA0BF-4421-E54D-BD36-0A1CA3B40E75}"/>
+              </a:ext>
+            </a:extLst>
+          </p:cNvPr>
+          <p:cNvSpPr/>
+          <p:nvPr/>
+        </p:nvSpPr>
+        <p:spPr>
+          <a:xfrm>
+            <a:off x="4191000" y="2362200"/>
+            <a:ext cx="1524000" cy="1371600"/>
+          </a:xfrm>
+          <a:prstGeom prst="rect">
+            <a:avLst/>
+          </a:prstGeom>
+          <a:solidFill>
+            <a:schemeClr val="tx2">
+              <a:lumMod val="40000"/>
+              <a:lumOff val="60000"/>
+            </a:schemeClr>
+          </a:solidFill>
+          <a:ln>
+            <a:solidFill>
+              <a:schemeClr val="bg1">
+                <a:lumMod val="50000"/>
+              </a:schemeClr>
+            </a:solidFill>
+          </a:ln>
+        </p:spPr>
+        <p:style>
+          <a:lnRef idx="2">
+            <a:schemeClr val="dk1"/>
+          </a:lnRef>
+          <a:fillRef idx="1">
+            <a:schemeClr val="lt1"/>
+          </a:fillRef>
+          <a:effectRef idx="0">
+            <a:schemeClr val="dk1"/>
+          </a:effectRef>
+          <a:fontRef idx="minor">
+            <a:schemeClr val="dk1"/>
+          </a:fontRef>
+        </p:style>
+        <p:txBody>
+          <a:bodyPr rtlCol="0" anchor="ctr"/>
+          <a:lstStyle/>
+          <a:p>
+            <a:pPr algn="ctr"/>
+            <a:r>
+              <a:rPr kumimoji="1" lang="en-US" altLang="zh-CN" sz="1400" dirty="0" smtClean="0"/>
+              <a:t>Recipe</a:t>
+            </a:r>
+          </a:p>
+          <a:p>
+            <a:r>
+              <a:rPr kumimoji="1" lang="en-US" altLang="zh-CN" sz="1000" dirty="0" smtClean="0"/>
+              <a:t>Recipe ID (</a:t>
+            </a:r>
+            <a:r>
+              <a:rPr kumimoji="1" lang="en-US" altLang="zh-CN" sz="1000" dirty="0" err="1" smtClean="0"/>
+              <a:t>int</a:t>
+            </a:r>
+            <a:r>
+              <a:rPr kumimoji="1" lang="en-US" altLang="zh-CN" sz="1000" dirty="0" smtClean="0"/>
+              <a:t> PK</a:t>
+            </a:r>
+            <a:r>
+              <a:rPr kumimoji="1" lang="en-US" altLang="zh-CN" sz="1000" dirty="0" smtClean="0"/>
+              <a:t>) </a:t>
+            </a:r>
+            <a:endParaRPr kumimoji="1" lang="en-US" altLang="zh-CN" sz="1000" dirty="0" smtClean="0"/>
+          </a:p>
+          <a:p>
+            <a:r>
+              <a:rPr kumimoji="1" lang="en-US" altLang="zh-CN" sz="1000" dirty="0" smtClean="0"/>
+              <a:t>Tester </a:t>
+            </a:r>
+            <a:r>
+              <a:rPr kumimoji="1" lang="en-US" altLang="zh-CN" sz="1000" dirty="0" smtClean="0"/>
+              <a:t>Recipe ID (</a:t>
+            </a:r>
+            <a:r>
+              <a:rPr kumimoji="1" lang="en-US" altLang="zh-CN" sz="1000" dirty="0" err="1" smtClean="0"/>
+              <a:t>int</a:t>
+            </a:r>
+            <a:r>
+              <a:rPr kumimoji="1" lang="en-US" altLang="zh-CN" sz="1000" dirty="0" smtClean="0"/>
+              <a:t>)</a:t>
+            </a:r>
+          </a:p>
+          <a:p>
+            <a:r>
+              <a:rPr kumimoji="1" lang="en-US" altLang="zh-CN" sz="1000" dirty="0" smtClean="0"/>
+              <a:t>Chamber Recipe ID (</a:t>
+            </a:r>
+            <a:r>
+              <a:rPr kumimoji="1" lang="en-US" altLang="zh-CN" sz="1000" dirty="0" err="1" smtClean="0"/>
+              <a:t>int</a:t>
+            </a:r>
+            <a:r>
+              <a:rPr kumimoji="1" lang="en-US" altLang="zh-CN" sz="1000" dirty="0" smtClean="0"/>
+              <a:t>)</a:t>
+            </a:r>
+            <a:endParaRPr kumimoji="1" lang="en-US" altLang="zh-CN" sz="1000" dirty="0" smtClean="0"/>
+          </a:p>
+        </p:txBody>
+      </p:sp>
+      <p:sp>
+        <p:nvSpPr>
+          <p:cNvPr id="22" name="矩形 13">
+            <a:extLst>
+              <a:ext uri="{FF2B5EF4-FFF2-40B4-BE49-F238E27FC236}">
+                <a16:creationId xmlns:a16="http://schemas.microsoft.com/office/drawing/2014/main" xmlns="" id="{FABDA0BF-4421-E54D-BD36-0A1CA3B40E75}"/>
+              </a:ext>
+            </a:extLst>
+          </p:cNvPr>
+          <p:cNvSpPr/>
+          <p:nvPr/>
+        </p:nvSpPr>
+        <p:spPr>
+          <a:xfrm>
+            <a:off x="914400" y="838200"/>
+            <a:ext cx="1905000" cy="914400"/>
+          </a:xfrm>
+          <a:prstGeom prst="rect">
+            <a:avLst/>
+          </a:prstGeom>
+          <a:solidFill>
+            <a:schemeClr val="tx2">
+              <a:lumMod val="40000"/>
+              <a:lumOff val="60000"/>
+            </a:schemeClr>
+          </a:solidFill>
+          <a:ln>
+            <a:solidFill>
+              <a:schemeClr val="bg1">
+                <a:lumMod val="50000"/>
+              </a:schemeClr>
+            </a:solidFill>
+          </a:ln>
+        </p:spPr>
+        <p:style>
+          <a:lnRef idx="2">
+            <a:schemeClr val="dk1"/>
+          </a:lnRef>
+          <a:fillRef idx="1">
+            <a:schemeClr val="lt1"/>
+          </a:fillRef>
+          <a:effectRef idx="0">
+            <a:schemeClr val="dk1"/>
+          </a:effectRef>
+          <a:fontRef idx="minor">
+            <a:schemeClr val="dk1"/>
+          </a:fontRef>
+        </p:style>
+        <p:txBody>
+          <a:bodyPr rtlCol="0" anchor="ctr"/>
+          <a:lstStyle/>
+          <a:p>
+            <a:pPr algn="ctr"/>
+            <a:r>
+              <a:rPr kumimoji="1" lang="en-US" altLang="zh-CN" sz="1400" dirty="0" smtClean="0"/>
+              <a:t>Models</a:t>
+            </a:r>
+            <a:endParaRPr kumimoji="1" lang="en-US" altLang="zh-CN" sz="1400" dirty="0"/>
+          </a:p>
+          <a:p>
+            <a:r>
+              <a:rPr kumimoji="1" lang="en-US" altLang="zh-CN" sz="1000" dirty="0" smtClean="0"/>
+              <a:t>Model ID (</a:t>
+            </a:r>
+            <a:r>
+              <a:rPr kumimoji="1" lang="en-US" altLang="zh-CN" sz="1000" dirty="0" err="1" smtClean="0"/>
+              <a:t>int</a:t>
+            </a:r>
+            <a:r>
+              <a:rPr kumimoji="1" lang="en-US" altLang="zh-CN" sz="1000" dirty="0" smtClean="0"/>
+              <a:t> PK)</a:t>
+            </a:r>
+          </a:p>
+          <a:p>
+            <a:r>
+              <a:rPr kumimoji="1" lang="en-US" altLang="zh-CN" sz="1000" dirty="0" smtClean="0"/>
+              <a:t>Model Name (string)</a:t>
+            </a:r>
+          </a:p>
+          <a:p>
+            <a:r>
+              <a:rPr kumimoji="1" lang="en-US" altLang="zh-CN" sz="1000" dirty="0" smtClean="0">
+                <a:solidFill>
+                  <a:srgbClr val="FFFF00"/>
+                </a:solidFill>
+              </a:rPr>
+              <a:t>Characteristics (string)</a:t>
+            </a:r>
+          </a:p>
+        </p:txBody>
+      </p:sp>
+      <p:sp>
+        <p:nvSpPr>
+          <p:cNvPr id="24" name="矩形 13">
+            <a:extLst>
+              <a:ext uri="{FF2B5EF4-FFF2-40B4-BE49-F238E27FC236}">
+                <a16:creationId xmlns:a16="http://schemas.microsoft.com/office/drawing/2014/main" xmlns="" id="{FABDA0BF-4421-E54D-BD36-0A1CA3B40E75}"/>
+              </a:ext>
+            </a:extLst>
+          </p:cNvPr>
+          <p:cNvSpPr/>
+          <p:nvPr/>
+        </p:nvSpPr>
+        <p:spPr>
+          <a:xfrm>
+            <a:off x="4419600" y="4572000"/>
+            <a:ext cx="1905000" cy="1752600"/>
+          </a:xfrm>
+          <a:prstGeom prst="rect">
+            <a:avLst/>
+          </a:prstGeom>
+          <a:solidFill>
+            <a:schemeClr val="tx2">
+              <a:lumMod val="40000"/>
+              <a:lumOff val="60000"/>
+            </a:schemeClr>
+          </a:solidFill>
+          <a:ln>
+            <a:solidFill>
+              <a:schemeClr val="bg1">
+                <a:lumMod val="50000"/>
+              </a:schemeClr>
+            </a:solidFill>
+          </a:ln>
+        </p:spPr>
+        <p:style>
+          <a:lnRef idx="2">
+            <a:schemeClr val="dk1"/>
+          </a:lnRef>
+          <a:fillRef idx="1">
+            <a:schemeClr val="lt1"/>
+          </a:fillRef>
+          <a:effectRef idx="0">
+            <a:schemeClr val="dk1"/>
+          </a:effectRef>
+          <a:fontRef idx="minor">
+            <a:schemeClr val="dk1"/>
+          </a:fontRef>
+        </p:style>
+        <p:txBody>
+          <a:bodyPr rtlCol="0" anchor="ctr"/>
+          <a:lstStyle/>
+          <a:p>
+            <a:pPr algn="ctr"/>
+            <a:r>
+              <a:rPr kumimoji="1" lang="en-US" altLang="zh-CN" sz="1400" dirty="0" err="1" smtClean="0"/>
+              <a:t>RawData</a:t>
+            </a:r>
+            <a:endParaRPr kumimoji="1" lang="en-US" altLang="zh-CN" sz="1400" dirty="0" smtClean="0"/>
+          </a:p>
+          <a:p>
+            <a:r>
+              <a:rPr kumimoji="1" lang="en-US" altLang="zh-CN" sz="1000" dirty="0" smtClean="0"/>
+              <a:t>Executor ID </a:t>
+            </a:r>
+            <a:r>
+              <a:rPr kumimoji="1" lang="en-US" altLang="zh-CN" sz="1000" dirty="0" smtClean="0"/>
+              <a:t>(</a:t>
+            </a:r>
+            <a:r>
+              <a:rPr kumimoji="1" lang="en-US" altLang="zh-CN" sz="1000" dirty="0" err="1" smtClean="0"/>
+              <a:t>int</a:t>
+            </a:r>
+            <a:r>
+              <a:rPr kumimoji="1" lang="en-US" altLang="zh-CN" sz="1000" dirty="0" smtClean="0"/>
+              <a:t>)</a:t>
+            </a:r>
+          </a:p>
+          <a:p>
+            <a:r>
+              <a:rPr kumimoji="1" lang="en-US" altLang="zh-CN" sz="1000" dirty="0" smtClean="0"/>
+              <a:t>Source (</a:t>
+            </a:r>
+            <a:r>
+              <a:rPr kumimoji="1" lang="en-US" altLang="zh-CN" sz="1000" dirty="0" err="1" smtClean="0"/>
+              <a:t>int</a:t>
+            </a:r>
+            <a:r>
+              <a:rPr kumimoji="1" lang="en-US" altLang="zh-CN" sz="1000" dirty="0" smtClean="0"/>
+              <a:t>)(0 Tester, 1 Harvester)</a:t>
+            </a:r>
+          </a:p>
+          <a:p>
+            <a:r>
+              <a:rPr kumimoji="1" lang="en-US" altLang="zh-CN" sz="1000" dirty="0" smtClean="0"/>
+              <a:t>Voltage (double)</a:t>
+            </a:r>
+          </a:p>
+          <a:p>
+            <a:r>
+              <a:rPr kumimoji="1" lang="en-US" altLang="zh-CN" sz="1000" dirty="0" smtClean="0"/>
+              <a:t>Current (double)</a:t>
+            </a:r>
+          </a:p>
+          <a:p>
+            <a:r>
+              <a:rPr kumimoji="1" lang="en-US" altLang="zh-CN" sz="1000" dirty="0" smtClean="0"/>
+              <a:t>Temperature (double)</a:t>
+            </a:r>
+          </a:p>
+          <a:p>
+            <a:r>
+              <a:rPr kumimoji="1" lang="en-US" altLang="zh-CN" sz="1000" dirty="0" smtClean="0"/>
+              <a:t>Coulomb Counter (double)</a:t>
+            </a:r>
+          </a:p>
+          <a:p>
+            <a:r>
+              <a:rPr kumimoji="1" lang="en-US" altLang="zh-CN" sz="1000" dirty="0" smtClean="0"/>
+              <a:t>Timestamp (double</a:t>
+            </a:r>
+            <a:r>
+              <a:rPr kumimoji="1" lang="en-US" altLang="zh-CN" sz="1000" dirty="0" smtClean="0"/>
+              <a:t>)</a:t>
+            </a:r>
+          </a:p>
+          <a:p>
+            <a:r>
+              <a:rPr kumimoji="1" lang="en-US" altLang="zh-CN" sz="1000" dirty="0" smtClean="0"/>
+              <a:t>……</a:t>
+            </a:r>
+          </a:p>
+          <a:p>
+            <a:endParaRPr kumimoji="1" lang="en-US" altLang="zh-CN" sz="1000" dirty="0"/>
+          </a:p>
+        </p:txBody>
+      </p:sp>
+      <p:sp>
+        <p:nvSpPr>
+          <p:cNvPr id="25" name="矩形 13">
+            <a:extLst>
+              <a:ext uri="{FF2B5EF4-FFF2-40B4-BE49-F238E27FC236}">
+                <a16:creationId xmlns:a16="http://schemas.microsoft.com/office/drawing/2014/main" xmlns="" id="{FABDA0BF-4421-E54D-BD36-0A1CA3B40E75}"/>
+              </a:ext>
+            </a:extLst>
+          </p:cNvPr>
+          <p:cNvSpPr/>
+          <p:nvPr/>
+        </p:nvSpPr>
+        <p:spPr>
+          <a:xfrm>
+            <a:off x="2971800" y="838200"/>
+            <a:ext cx="1371600" cy="1066800"/>
+          </a:xfrm>
+          <a:prstGeom prst="rect">
+            <a:avLst/>
+          </a:prstGeom>
+          <a:solidFill>
+            <a:schemeClr val="tx2">
+              <a:lumMod val="40000"/>
+              <a:lumOff val="60000"/>
+            </a:schemeClr>
+          </a:solidFill>
+          <a:ln>
+            <a:solidFill>
+              <a:schemeClr val="bg1">
+                <a:lumMod val="50000"/>
+              </a:schemeClr>
+            </a:solidFill>
+          </a:ln>
+        </p:spPr>
+        <p:style>
+          <a:lnRef idx="2">
+            <a:schemeClr val="dk1"/>
+          </a:lnRef>
+          <a:fillRef idx="1">
+            <a:schemeClr val="lt1"/>
+          </a:fillRef>
+          <a:effectRef idx="0">
+            <a:schemeClr val="dk1"/>
+          </a:effectRef>
+          <a:fontRef idx="minor">
+            <a:schemeClr val="dk1"/>
+          </a:fontRef>
+        </p:style>
+        <p:txBody>
+          <a:bodyPr rtlCol="0" anchor="ctr"/>
+          <a:lstStyle/>
+          <a:p>
+            <a:pPr algn="ctr"/>
+            <a:r>
+              <a:rPr kumimoji="1" lang="en-US" altLang="zh-CN" sz="1400" dirty="0" smtClean="0"/>
+              <a:t>Batteries</a:t>
+            </a:r>
+            <a:endParaRPr kumimoji="1" lang="en-US" altLang="zh-CN" sz="1400" dirty="0"/>
+          </a:p>
+          <a:p>
+            <a:r>
+              <a:rPr kumimoji="1" lang="en-US" altLang="zh-CN" sz="1000" dirty="0" smtClean="0"/>
+              <a:t>Battery ID (</a:t>
+            </a:r>
+            <a:r>
+              <a:rPr kumimoji="1" lang="en-US" altLang="zh-CN" sz="1000" dirty="0" err="1" smtClean="0"/>
+              <a:t>int</a:t>
+            </a:r>
+            <a:r>
+              <a:rPr kumimoji="1" lang="en-US" altLang="zh-CN" sz="1000" dirty="0" smtClean="0"/>
+              <a:t> PK)</a:t>
+            </a:r>
+          </a:p>
+          <a:p>
+            <a:r>
+              <a:rPr kumimoji="1" lang="en-US" altLang="zh-CN" sz="1000" dirty="0" smtClean="0"/>
+              <a:t>Asset ID (</a:t>
+            </a:r>
+            <a:r>
+              <a:rPr kumimoji="1" lang="en-US" altLang="zh-CN" sz="1000" dirty="0" err="1" smtClean="0"/>
+              <a:t>int</a:t>
+            </a:r>
+            <a:r>
+              <a:rPr kumimoji="1" lang="en-US" altLang="zh-CN" sz="1000" dirty="0" smtClean="0"/>
+              <a:t>)</a:t>
+            </a:r>
+          </a:p>
+          <a:p>
+            <a:r>
+              <a:rPr kumimoji="1" lang="en-US" altLang="zh-CN" sz="1000" dirty="0" smtClean="0"/>
+              <a:t>Model ID (</a:t>
+            </a:r>
+            <a:r>
+              <a:rPr kumimoji="1" lang="en-US" altLang="zh-CN" sz="1000" dirty="0" err="1" smtClean="0"/>
+              <a:t>int</a:t>
+            </a:r>
+            <a:r>
+              <a:rPr kumimoji="1" lang="en-US" altLang="zh-CN" sz="1000" dirty="0" smtClean="0"/>
+              <a:t>)</a:t>
+            </a:r>
+          </a:p>
+          <a:p>
+            <a:r>
+              <a:rPr kumimoji="1" lang="en-US" altLang="zh-CN" sz="1000" dirty="0" smtClean="0"/>
+              <a:t>Battery Name (string)</a:t>
+            </a:r>
+          </a:p>
+          <a:p>
+            <a:r>
+              <a:rPr kumimoji="1" lang="en-US" altLang="zh-CN" sz="1000" dirty="0" smtClean="0"/>
+              <a:t>Circle Count (double)</a:t>
+            </a:r>
+          </a:p>
+        </p:txBody>
+      </p:sp>
+      <p:sp>
+        <p:nvSpPr>
+          <p:cNvPr id="26" name="矩形 13">
+            <a:extLst>
+              <a:ext uri="{FF2B5EF4-FFF2-40B4-BE49-F238E27FC236}">
+                <a16:creationId xmlns:a16="http://schemas.microsoft.com/office/drawing/2014/main" xmlns="" id="{FABDA0BF-4421-E54D-BD36-0A1CA3B40E75}"/>
+              </a:ext>
+            </a:extLst>
+          </p:cNvPr>
+          <p:cNvSpPr/>
+          <p:nvPr/>
+        </p:nvSpPr>
+        <p:spPr>
+          <a:xfrm>
+            <a:off x="914400" y="2362200"/>
+            <a:ext cx="1447800" cy="1066800"/>
+          </a:xfrm>
+          <a:prstGeom prst="rect">
+            <a:avLst/>
+          </a:prstGeom>
+          <a:solidFill>
+            <a:schemeClr val="tx2">
+              <a:lumMod val="40000"/>
+              <a:lumOff val="60000"/>
+            </a:schemeClr>
+          </a:solidFill>
+          <a:ln>
+            <a:solidFill>
+              <a:schemeClr val="bg1">
+                <a:lumMod val="50000"/>
+              </a:schemeClr>
+            </a:solidFill>
+          </a:ln>
+        </p:spPr>
+        <p:style>
+          <a:lnRef idx="2">
+            <a:schemeClr val="dk1"/>
+          </a:lnRef>
+          <a:fillRef idx="1">
+            <a:schemeClr val="lt1"/>
+          </a:fillRef>
+          <a:effectRef idx="0">
+            <a:schemeClr val="dk1"/>
+          </a:effectRef>
+          <a:fontRef idx="minor">
+            <a:schemeClr val="dk1"/>
+          </a:fontRef>
+        </p:style>
+        <p:txBody>
+          <a:bodyPr rtlCol="0" anchor="ctr"/>
+          <a:lstStyle/>
+          <a:p>
+            <a:pPr algn="ctr"/>
+            <a:r>
+              <a:rPr kumimoji="1" lang="en-US" altLang="zh-CN" sz="1400" dirty="0" smtClean="0"/>
+              <a:t>Programs</a:t>
+            </a:r>
+            <a:endParaRPr kumimoji="1" lang="en-US" altLang="zh-CN" sz="1400" dirty="0"/>
+          </a:p>
+          <a:p>
+            <a:r>
+              <a:rPr kumimoji="1" lang="en-US" altLang="zh-CN" sz="1000" dirty="0" smtClean="0"/>
+              <a:t>ID (</a:t>
+            </a:r>
+            <a:r>
+              <a:rPr kumimoji="1" lang="en-US" altLang="zh-CN" sz="1000" dirty="0" err="1" smtClean="0"/>
+              <a:t>int</a:t>
+            </a:r>
+            <a:r>
+              <a:rPr kumimoji="1" lang="en-US" altLang="zh-CN" sz="1000" dirty="0" smtClean="0"/>
+              <a:t> PK)</a:t>
+            </a:r>
+          </a:p>
+          <a:p>
+            <a:r>
+              <a:rPr kumimoji="1" lang="en-US" altLang="zh-CN" sz="1000" dirty="0" smtClean="0"/>
+              <a:t>Name </a:t>
+            </a:r>
+            <a:r>
+              <a:rPr kumimoji="1" lang="en-US" altLang="zh-CN" sz="1000" dirty="0" smtClean="0"/>
+              <a:t>(string)</a:t>
+            </a:r>
+          </a:p>
+          <a:p>
+            <a:r>
+              <a:rPr kumimoji="1" lang="en-US" altLang="zh-CN" sz="1000" dirty="0" smtClean="0"/>
+              <a:t>Model ID(</a:t>
+            </a:r>
+            <a:r>
+              <a:rPr kumimoji="1" lang="en-US" altLang="zh-CN" sz="1000" dirty="0" err="1" smtClean="0"/>
+              <a:t>int</a:t>
+            </a:r>
+            <a:r>
+              <a:rPr kumimoji="1" lang="en-US" altLang="zh-CN" sz="1000" dirty="0" smtClean="0"/>
+              <a:t>)</a:t>
+            </a:r>
+          </a:p>
+        </p:txBody>
+      </p:sp>
+      <p:cxnSp>
+        <p:nvCxnSpPr>
+          <p:cNvPr id="27" name="Straight Connector 26"/>
+          <p:cNvCxnSpPr/>
+          <p:nvPr/>
+        </p:nvCxnSpPr>
+        <p:spPr>
+          <a:xfrm>
+            <a:off x="0" y="2133600"/>
+            <a:ext cx="9144000" cy="0"/>
+          </a:xfrm>
+          <a:prstGeom prst="line">
+            <a:avLst/>
+          </a:prstGeom>
+        </p:spPr>
+        <p:style>
+          <a:lnRef idx="1">
+            <a:schemeClr val="accent1"/>
+          </a:lnRef>
+          <a:fillRef idx="0">
+            <a:schemeClr val="accent1"/>
+          </a:fillRef>
+          <a:effectRef idx="0">
+            <a:schemeClr val="accent1"/>
+          </a:effectRef>
+          <a:fontRef idx="minor">
+            <a:schemeClr val="tx1"/>
+          </a:fontRef>
+        </p:style>
+      </p:cxnSp>
+      <p:cxnSp>
+        <p:nvCxnSpPr>
+          <p:cNvPr id="28" name="Straight Connector 27"/>
+          <p:cNvCxnSpPr/>
+          <p:nvPr/>
+        </p:nvCxnSpPr>
+        <p:spPr>
+          <a:xfrm>
+            <a:off x="2514600" y="3962400"/>
+            <a:ext cx="6629400" cy="0"/>
+          </a:xfrm>
+          <a:prstGeom prst="line">
+            <a:avLst/>
+          </a:prstGeom>
+        </p:spPr>
+        <p:style>
+          <a:lnRef idx="1">
+            <a:schemeClr val="accent1"/>
+          </a:lnRef>
+          <a:fillRef idx="0">
+            <a:schemeClr val="accent1"/>
+          </a:fillRef>
+          <a:effectRef idx="0">
+            <a:schemeClr val="accent1"/>
+          </a:effectRef>
+          <a:fontRef idx="minor">
+            <a:schemeClr val="tx1"/>
+          </a:fontRef>
+        </p:style>
+      </p:cxnSp>
+      <p:sp>
+        <p:nvSpPr>
+          <p:cNvPr id="29" name="TextBox 28"/>
+          <p:cNvSpPr txBox="1"/>
+          <p:nvPr/>
+        </p:nvSpPr>
+        <p:spPr>
+          <a:xfrm>
+            <a:off x="68119" y="1143000"/>
+            <a:ext cx="778162" cy="369332"/>
+          </a:xfrm>
+          <a:prstGeom prst="rect">
+            <a:avLst/>
+          </a:prstGeom>
+          <a:noFill/>
+        </p:spPr>
+        <p:txBody>
+          <a:bodyPr wrap="none" rtlCol="0">
+            <a:spAutoFit/>
+          </a:bodyPr>
+          <a:lstStyle/>
+          <a:p>
+            <a:r>
+              <a:rPr lang="en-US" dirty="0" smtClean="0"/>
+              <a:t>Assets</a:t>
+            </a:r>
+            <a:endParaRPr lang="en-US" dirty="0"/>
+          </a:p>
+        </p:txBody>
+      </p:sp>
+      <p:sp>
+        <p:nvSpPr>
+          <p:cNvPr id="30" name="TextBox 29"/>
+          <p:cNvSpPr txBox="1"/>
+          <p:nvPr/>
+        </p:nvSpPr>
+        <p:spPr>
+          <a:xfrm>
+            <a:off x="-76200" y="2667000"/>
+            <a:ext cx="1070678" cy="369332"/>
+          </a:xfrm>
+          <a:prstGeom prst="rect">
+            <a:avLst/>
+          </a:prstGeom>
+          <a:noFill/>
+        </p:spPr>
+        <p:txBody>
+          <a:bodyPr wrap="none" rtlCol="0">
+            <a:spAutoFit/>
+          </a:bodyPr>
+          <a:lstStyle/>
+          <a:p>
+            <a:r>
+              <a:rPr lang="en-US" dirty="0" smtClean="0"/>
+              <a:t>Programs</a:t>
+            </a:r>
+            <a:endParaRPr lang="en-US" dirty="0"/>
+          </a:p>
+        </p:txBody>
+      </p:sp>
+      <p:sp>
+        <p:nvSpPr>
+          <p:cNvPr id="31" name="TextBox 30"/>
+          <p:cNvSpPr txBox="1"/>
+          <p:nvPr/>
+        </p:nvSpPr>
+        <p:spPr>
+          <a:xfrm>
+            <a:off x="1066800" y="4888468"/>
+            <a:ext cx="1034066" cy="369332"/>
+          </a:xfrm>
+          <a:prstGeom prst="rect">
+            <a:avLst/>
+          </a:prstGeom>
+          <a:noFill/>
+        </p:spPr>
+        <p:txBody>
+          <a:bodyPr wrap="none" rtlCol="0">
+            <a:spAutoFit/>
+          </a:bodyPr>
+          <a:lstStyle/>
+          <a:p>
+            <a:r>
+              <a:rPr lang="en-US" dirty="0" smtClean="0"/>
+              <a:t>Requests</a:t>
+            </a:r>
+          </a:p>
+        </p:txBody>
+      </p:sp>
+      <p:sp>
+        <p:nvSpPr>
+          <p:cNvPr id="32" name="矩形 13">
+            <a:extLst>
+              <a:ext uri="{FF2B5EF4-FFF2-40B4-BE49-F238E27FC236}">
+                <a16:creationId xmlns:a16="http://schemas.microsoft.com/office/drawing/2014/main" xmlns="" id="{FABDA0BF-4421-E54D-BD36-0A1CA3B40E75}"/>
+              </a:ext>
+            </a:extLst>
+          </p:cNvPr>
+          <p:cNvSpPr/>
+          <p:nvPr/>
+        </p:nvSpPr>
+        <p:spPr>
+          <a:xfrm>
+            <a:off x="762000" y="5410200"/>
+            <a:ext cx="1600200" cy="1295400"/>
+          </a:xfrm>
+          <a:prstGeom prst="rect">
+            <a:avLst/>
+          </a:prstGeom>
+          <a:solidFill>
+            <a:schemeClr val="tx2">
+              <a:lumMod val="40000"/>
+              <a:lumOff val="60000"/>
+            </a:schemeClr>
+          </a:solidFill>
+          <a:ln>
+            <a:solidFill>
+              <a:schemeClr val="bg1">
+                <a:lumMod val="50000"/>
+              </a:schemeClr>
+            </a:solidFill>
+          </a:ln>
+        </p:spPr>
+        <p:style>
+          <a:lnRef idx="2">
+            <a:schemeClr val="dk1"/>
+          </a:lnRef>
+          <a:fillRef idx="1">
+            <a:schemeClr val="lt1"/>
+          </a:fillRef>
+          <a:effectRef idx="0">
+            <a:schemeClr val="dk1"/>
+          </a:effectRef>
+          <a:fontRef idx="minor">
+            <a:schemeClr val="dk1"/>
+          </a:fontRef>
+        </p:style>
+        <p:txBody>
+          <a:bodyPr rtlCol="0" anchor="ctr"/>
+          <a:lstStyle/>
+          <a:p>
+            <a:r>
+              <a:rPr kumimoji="1" lang="en-US" altLang="zh-CN" sz="1400" dirty="0" smtClean="0"/>
+              <a:t>   Request</a:t>
+            </a:r>
+          </a:p>
+          <a:p>
+            <a:r>
+              <a:rPr kumimoji="1" lang="en-US" altLang="zh-CN" sz="1000" dirty="0" smtClean="0"/>
+              <a:t>Request ID </a:t>
+            </a:r>
+            <a:r>
+              <a:rPr kumimoji="1" lang="en-US" altLang="zh-CN" sz="1000" dirty="0" smtClean="0"/>
+              <a:t>(</a:t>
+            </a:r>
+            <a:r>
+              <a:rPr kumimoji="1" lang="en-US" altLang="zh-CN" sz="1000" dirty="0" err="1" smtClean="0"/>
+              <a:t>int</a:t>
+            </a:r>
+            <a:r>
+              <a:rPr kumimoji="1" lang="en-US" altLang="zh-CN" sz="1000" dirty="0" smtClean="0"/>
+              <a:t> PK)</a:t>
+            </a:r>
+          </a:p>
+          <a:p>
+            <a:r>
+              <a:rPr kumimoji="1" lang="en-US" altLang="zh-CN" sz="1000" dirty="0" smtClean="0"/>
+              <a:t>Program ID </a:t>
+            </a:r>
+            <a:r>
+              <a:rPr kumimoji="1" lang="en-US" altLang="zh-CN" sz="1000" dirty="0" smtClean="0"/>
+              <a:t>(</a:t>
+            </a:r>
+            <a:r>
+              <a:rPr kumimoji="1" lang="en-US" altLang="zh-CN" sz="1000" dirty="0" err="1" smtClean="0"/>
+              <a:t>int</a:t>
+            </a:r>
+            <a:r>
+              <a:rPr kumimoji="1" lang="en-US" altLang="zh-CN" sz="1000" dirty="0" smtClean="0"/>
+              <a:t>)</a:t>
+            </a:r>
+          </a:p>
+          <a:p>
+            <a:r>
+              <a:rPr kumimoji="1" lang="en-US" altLang="zh-CN" sz="1000" dirty="0" smtClean="0"/>
+              <a:t>Battery ID </a:t>
+            </a:r>
+            <a:r>
+              <a:rPr kumimoji="1" lang="en-US" altLang="zh-CN" sz="1000" dirty="0" smtClean="0"/>
+              <a:t>(</a:t>
+            </a:r>
+            <a:r>
+              <a:rPr kumimoji="1" lang="en-US" altLang="zh-CN" sz="1000" dirty="0" err="1" smtClean="0"/>
+              <a:t>int</a:t>
+            </a:r>
+            <a:r>
+              <a:rPr kumimoji="1" lang="en-US" altLang="zh-CN" sz="1000" dirty="0" smtClean="0"/>
+              <a:t>)</a:t>
+            </a:r>
+          </a:p>
+          <a:p>
+            <a:r>
+              <a:rPr kumimoji="1" lang="en-US" altLang="zh-CN" sz="1000" dirty="0" smtClean="0"/>
+              <a:t>Requester (</a:t>
+            </a:r>
+            <a:r>
+              <a:rPr kumimoji="1" lang="en-US" altLang="zh-CN" sz="1000" dirty="0" smtClean="0"/>
+              <a:t>string</a:t>
+            </a:r>
+            <a:r>
+              <a:rPr kumimoji="1" lang="en-US" altLang="zh-CN" sz="1000" dirty="0" smtClean="0"/>
+              <a:t>)</a:t>
+            </a:r>
+            <a:endParaRPr kumimoji="1" lang="en-US" altLang="zh-CN" sz="1000" dirty="0" smtClean="0"/>
+          </a:p>
+          <a:p>
+            <a:r>
+              <a:rPr kumimoji="1" lang="en-US" altLang="zh-CN" sz="1000" dirty="0" smtClean="0"/>
+              <a:t>Priority (</a:t>
+            </a:r>
+            <a:r>
+              <a:rPr kumimoji="1" lang="en-US" altLang="zh-CN" sz="1000" dirty="0" err="1" smtClean="0"/>
+              <a:t>int</a:t>
+            </a:r>
+            <a:r>
+              <a:rPr kumimoji="1" lang="en-US" altLang="zh-CN" sz="1000" dirty="0" smtClean="0"/>
+              <a:t>)</a:t>
+            </a:r>
+            <a:endParaRPr kumimoji="1" lang="en-US" altLang="zh-CN" sz="1000" dirty="0" smtClean="0"/>
+          </a:p>
+        </p:txBody>
+      </p:sp>
+      <p:sp>
+        <p:nvSpPr>
+          <p:cNvPr id="33" name="矩形 13">
+            <a:extLst>
+              <a:ext uri="{FF2B5EF4-FFF2-40B4-BE49-F238E27FC236}">
+                <a16:creationId xmlns:a16="http://schemas.microsoft.com/office/drawing/2014/main" xmlns="" id="{FABDA0BF-4421-E54D-BD36-0A1CA3B40E75}"/>
+              </a:ext>
+            </a:extLst>
+          </p:cNvPr>
+          <p:cNvSpPr/>
+          <p:nvPr/>
+        </p:nvSpPr>
+        <p:spPr>
+          <a:xfrm>
+            <a:off x="6019800" y="838200"/>
+            <a:ext cx="1447800" cy="1066800"/>
+          </a:xfrm>
+          <a:prstGeom prst="rect">
+            <a:avLst/>
+          </a:prstGeom>
+          <a:solidFill>
+            <a:schemeClr val="tx2">
+              <a:lumMod val="40000"/>
+              <a:lumOff val="60000"/>
+            </a:schemeClr>
+          </a:solidFill>
+          <a:ln>
+            <a:solidFill>
+              <a:schemeClr val="bg1">
+                <a:lumMod val="50000"/>
+              </a:schemeClr>
+            </a:solidFill>
+          </a:ln>
+        </p:spPr>
+        <p:style>
+          <a:lnRef idx="2">
+            <a:schemeClr val="dk1"/>
+          </a:lnRef>
+          <a:fillRef idx="1">
+            <a:schemeClr val="lt1"/>
+          </a:fillRef>
+          <a:effectRef idx="0">
+            <a:schemeClr val="dk1"/>
+          </a:effectRef>
+          <a:fontRef idx="minor">
+            <a:schemeClr val="dk1"/>
+          </a:fontRef>
+        </p:style>
+        <p:txBody>
+          <a:bodyPr rtlCol="0" anchor="ctr"/>
+          <a:lstStyle/>
+          <a:p>
+            <a:pPr algn="ctr"/>
+            <a:r>
+              <a:rPr kumimoji="1" lang="en-US" altLang="zh-CN" sz="1400" dirty="0" err="1" smtClean="0"/>
+              <a:t>TesterChannels</a:t>
+            </a:r>
+            <a:endParaRPr kumimoji="1" lang="en-US" altLang="zh-CN" sz="1400" dirty="0"/>
+          </a:p>
+          <a:p>
+            <a:r>
+              <a:rPr kumimoji="1" lang="en-US" altLang="zh-CN" sz="1000" dirty="0" smtClean="0"/>
+              <a:t>TC </a:t>
+            </a:r>
+            <a:r>
+              <a:rPr kumimoji="1" lang="en-US" altLang="zh-CN" sz="1000" dirty="0" smtClean="0"/>
+              <a:t>ID(</a:t>
+            </a:r>
+            <a:r>
+              <a:rPr kumimoji="1" lang="en-US" altLang="zh-CN" sz="1000" dirty="0" err="1" smtClean="0"/>
+              <a:t>int</a:t>
+            </a:r>
+            <a:r>
+              <a:rPr kumimoji="1" lang="en-US" altLang="zh-CN" sz="1000" dirty="0" smtClean="0"/>
+              <a:t> PK</a:t>
+            </a:r>
+            <a:r>
+              <a:rPr kumimoji="1" lang="en-US" altLang="zh-CN" sz="1000" dirty="0" smtClean="0"/>
+              <a:t>)</a:t>
+            </a:r>
+          </a:p>
+          <a:p>
+            <a:r>
+              <a:rPr kumimoji="1" lang="en-US" altLang="zh-CN" sz="1000" dirty="0" smtClean="0"/>
+              <a:t>Asset ID (</a:t>
+            </a:r>
+            <a:r>
+              <a:rPr kumimoji="1" lang="en-US" altLang="zh-CN" sz="1000" dirty="0" err="1" smtClean="0"/>
+              <a:t>int</a:t>
+            </a:r>
+            <a:r>
+              <a:rPr kumimoji="1" lang="en-US" altLang="zh-CN" sz="1000" dirty="0" smtClean="0"/>
+              <a:t>)</a:t>
+            </a:r>
+          </a:p>
+          <a:p>
+            <a:r>
+              <a:rPr kumimoji="1" lang="en-US" altLang="zh-CN" sz="1000" dirty="0" smtClean="0"/>
+              <a:t>Tester </a:t>
+            </a:r>
+            <a:r>
+              <a:rPr kumimoji="1" lang="en-US" altLang="zh-CN" sz="1000" dirty="0" smtClean="0"/>
+              <a:t>ID (</a:t>
+            </a:r>
+            <a:r>
+              <a:rPr kumimoji="1" lang="en-US" altLang="zh-CN" sz="1000" dirty="0" err="1" smtClean="0"/>
+              <a:t>int</a:t>
+            </a:r>
+            <a:r>
+              <a:rPr kumimoji="1" lang="en-US" altLang="zh-CN" sz="1000" dirty="0" smtClean="0"/>
+              <a:t>)</a:t>
+            </a:r>
+            <a:endParaRPr kumimoji="1" lang="en-US" altLang="zh-CN" sz="1000" dirty="0" smtClean="0"/>
+          </a:p>
+        </p:txBody>
+      </p:sp>
+      <p:sp>
+        <p:nvSpPr>
+          <p:cNvPr id="43" name="矩形 13">
+            <a:extLst>
+              <a:ext uri="{FF2B5EF4-FFF2-40B4-BE49-F238E27FC236}">
+                <a16:creationId xmlns:a16="http://schemas.microsoft.com/office/drawing/2014/main" xmlns="" id="{FABDA0BF-4421-E54D-BD36-0A1CA3B40E75}"/>
+              </a:ext>
+            </a:extLst>
+          </p:cNvPr>
+          <p:cNvSpPr/>
+          <p:nvPr/>
+        </p:nvSpPr>
+        <p:spPr>
+          <a:xfrm>
+            <a:off x="4495800" y="838200"/>
+            <a:ext cx="1371600" cy="914400"/>
+          </a:xfrm>
+          <a:prstGeom prst="rect">
+            <a:avLst/>
+          </a:prstGeom>
+          <a:solidFill>
+            <a:schemeClr val="tx2">
+              <a:lumMod val="40000"/>
+              <a:lumOff val="60000"/>
+            </a:schemeClr>
+          </a:solidFill>
+          <a:ln>
+            <a:solidFill>
+              <a:schemeClr val="bg1">
+                <a:lumMod val="50000"/>
+              </a:schemeClr>
+            </a:solidFill>
+          </a:ln>
+        </p:spPr>
+        <p:style>
+          <a:lnRef idx="2">
+            <a:schemeClr val="dk1"/>
+          </a:lnRef>
+          <a:fillRef idx="1">
+            <a:schemeClr val="lt1"/>
+          </a:fillRef>
+          <a:effectRef idx="0">
+            <a:schemeClr val="dk1"/>
+          </a:effectRef>
+          <a:fontRef idx="minor">
+            <a:schemeClr val="dk1"/>
+          </a:fontRef>
+        </p:style>
+        <p:txBody>
+          <a:bodyPr rtlCol="0" anchor="ctr"/>
+          <a:lstStyle/>
+          <a:p>
+            <a:pPr algn="ctr"/>
+            <a:r>
+              <a:rPr kumimoji="1" lang="en-US" altLang="zh-CN" sz="1400" dirty="0" smtClean="0"/>
+              <a:t>Testers</a:t>
+            </a:r>
+            <a:endParaRPr kumimoji="1" lang="en-US" altLang="zh-CN" sz="1400" dirty="0"/>
+          </a:p>
+          <a:p>
+            <a:r>
+              <a:rPr kumimoji="1" lang="en-US" altLang="zh-CN" sz="1000" dirty="0" smtClean="0"/>
+              <a:t>Tester ID (</a:t>
+            </a:r>
+            <a:r>
+              <a:rPr kumimoji="1" lang="en-US" altLang="zh-CN" sz="1000" dirty="0" err="1" smtClean="0"/>
+              <a:t>int</a:t>
+            </a:r>
+            <a:r>
+              <a:rPr kumimoji="1" lang="en-US" altLang="zh-CN" sz="1000" dirty="0" smtClean="0"/>
+              <a:t> PK) </a:t>
+            </a:r>
+            <a:r>
+              <a:rPr kumimoji="1" lang="en-US" altLang="zh-CN" sz="1000" dirty="0" smtClean="0"/>
+              <a:t>Name (string)</a:t>
+            </a:r>
+            <a:endParaRPr kumimoji="1" lang="en-US" altLang="zh-CN" sz="1000" dirty="0" smtClean="0"/>
+          </a:p>
+          <a:p>
+            <a:endParaRPr kumimoji="1" lang="en-US" altLang="zh-CN" sz="1000" dirty="0" smtClean="0"/>
+          </a:p>
+        </p:txBody>
+      </p:sp>
+      <p:sp>
+        <p:nvSpPr>
+          <p:cNvPr id="44" name="矩形 13">
+            <a:extLst>
+              <a:ext uri="{FF2B5EF4-FFF2-40B4-BE49-F238E27FC236}">
+                <a16:creationId xmlns:a16="http://schemas.microsoft.com/office/drawing/2014/main" xmlns="" id="{FABDA0BF-4421-E54D-BD36-0A1CA3B40E75}"/>
+              </a:ext>
+            </a:extLst>
+          </p:cNvPr>
+          <p:cNvSpPr/>
+          <p:nvPr/>
+        </p:nvSpPr>
+        <p:spPr>
+          <a:xfrm>
+            <a:off x="7620000" y="838200"/>
+            <a:ext cx="1371600" cy="914400"/>
+          </a:xfrm>
+          <a:prstGeom prst="rect">
+            <a:avLst/>
+          </a:prstGeom>
+          <a:solidFill>
+            <a:schemeClr val="tx2">
+              <a:lumMod val="40000"/>
+              <a:lumOff val="60000"/>
+            </a:schemeClr>
+          </a:solidFill>
+          <a:ln>
+            <a:solidFill>
+              <a:schemeClr val="bg1">
+                <a:lumMod val="50000"/>
+              </a:schemeClr>
+            </a:solidFill>
+          </a:ln>
+        </p:spPr>
+        <p:style>
+          <a:lnRef idx="2">
+            <a:schemeClr val="dk1"/>
+          </a:lnRef>
+          <a:fillRef idx="1">
+            <a:schemeClr val="lt1"/>
+          </a:fillRef>
+          <a:effectRef idx="0">
+            <a:schemeClr val="dk1"/>
+          </a:effectRef>
+          <a:fontRef idx="minor">
+            <a:schemeClr val="dk1"/>
+          </a:fontRef>
+        </p:style>
+        <p:txBody>
+          <a:bodyPr rtlCol="0" anchor="ctr"/>
+          <a:lstStyle/>
+          <a:p>
+            <a:pPr algn="ctr"/>
+            <a:r>
+              <a:rPr kumimoji="1" lang="en-US" altLang="zh-CN" sz="1400" dirty="0" smtClean="0"/>
+              <a:t>Chambers</a:t>
+            </a:r>
+            <a:endParaRPr kumimoji="1" lang="en-US" altLang="zh-CN" sz="1400" dirty="0"/>
+          </a:p>
+          <a:p>
+            <a:r>
+              <a:rPr kumimoji="1" lang="en-US" altLang="zh-CN" sz="1000" dirty="0" smtClean="0"/>
+              <a:t>Channel  ID (</a:t>
+            </a:r>
+            <a:r>
+              <a:rPr kumimoji="1" lang="en-US" altLang="zh-CN" sz="1000" dirty="0" err="1" smtClean="0"/>
+              <a:t>int</a:t>
+            </a:r>
+            <a:r>
+              <a:rPr kumimoji="1" lang="en-US" altLang="zh-CN" sz="1000" dirty="0" smtClean="0"/>
+              <a:t> </a:t>
+            </a:r>
+            <a:r>
+              <a:rPr kumimoji="1" lang="en-US" altLang="zh-CN" sz="1000" dirty="0" smtClean="0"/>
+              <a:t>PK)</a:t>
+            </a:r>
+          </a:p>
+          <a:p>
+            <a:r>
+              <a:rPr kumimoji="1" lang="en-US" altLang="zh-CN" sz="1000" dirty="0" smtClean="0"/>
+              <a:t>Name </a:t>
+            </a:r>
+            <a:r>
+              <a:rPr kumimoji="1" lang="en-US" altLang="zh-CN" sz="1000" dirty="0" smtClean="0"/>
+              <a:t>(string)</a:t>
+            </a:r>
+            <a:endParaRPr kumimoji="1" lang="en-US" altLang="zh-CN" sz="1000" dirty="0" smtClean="0"/>
+          </a:p>
+        </p:txBody>
+      </p:sp>
+      <p:sp>
+        <p:nvSpPr>
+          <p:cNvPr id="45" name="矩形 13">
+            <a:extLst>
+              <a:ext uri="{FF2B5EF4-FFF2-40B4-BE49-F238E27FC236}">
+                <a16:creationId xmlns:a16="http://schemas.microsoft.com/office/drawing/2014/main" xmlns="" id="{FABDA0BF-4421-E54D-BD36-0A1CA3B40E75}"/>
+              </a:ext>
+            </a:extLst>
+          </p:cNvPr>
+          <p:cNvSpPr/>
+          <p:nvPr/>
+        </p:nvSpPr>
+        <p:spPr>
+          <a:xfrm>
+            <a:off x="2590800" y="2362200"/>
+            <a:ext cx="1447800" cy="1066800"/>
+          </a:xfrm>
+          <a:prstGeom prst="rect">
+            <a:avLst/>
+          </a:prstGeom>
+          <a:solidFill>
+            <a:schemeClr val="tx2">
+              <a:lumMod val="40000"/>
+              <a:lumOff val="60000"/>
+            </a:schemeClr>
+          </a:solidFill>
+          <a:ln>
+            <a:solidFill>
+              <a:schemeClr val="bg1">
+                <a:lumMod val="50000"/>
+              </a:schemeClr>
+            </a:solidFill>
+          </a:ln>
+        </p:spPr>
+        <p:style>
+          <a:lnRef idx="2">
+            <a:schemeClr val="dk1"/>
+          </a:lnRef>
+          <a:fillRef idx="1">
+            <a:schemeClr val="lt1"/>
+          </a:fillRef>
+          <a:effectRef idx="0">
+            <a:schemeClr val="dk1"/>
+          </a:effectRef>
+          <a:fontRef idx="minor">
+            <a:schemeClr val="dk1"/>
+          </a:fontRef>
+        </p:style>
+        <p:txBody>
+          <a:bodyPr rtlCol="0" anchor="ctr"/>
+          <a:lstStyle/>
+          <a:p>
+            <a:pPr algn="ctr"/>
+            <a:r>
+              <a:rPr kumimoji="1" lang="en-US" altLang="zh-CN" sz="1400" dirty="0" err="1" smtClean="0"/>
+              <a:t>SubPrograms</a:t>
+            </a:r>
+            <a:endParaRPr kumimoji="1" lang="en-US" altLang="zh-CN" sz="1400" dirty="0"/>
+          </a:p>
+          <a:p>
+            <a:r>
+              <a:rPr kumimoji="1" lang="en-US" altLang="zh-CN" sz="1000" dirty="0" smtClean="0"/>
+              <a:t>ID (</a:t>
+            </a:r>
+            <a:r>
+              <a:rPr kumimoji="1" lang="en-US" altLang="zh-CN" sz="1000" dirty="0" err="1" smtClean="0"/>
+              <a:t>int</a:t>
+            </a:r>
+            <a:r>
+              <a:rPr kumimoji="1" lang="en-US" altLang="zh-CN" sz="1000" dirty="0" smtClean="0"/>
+              <a:t> PK</a:t>
+            </a:r>
+            <a:r>
+              <a:rPr kumimoji="1" lang="en-US" altLang="zh-CN" sz="1000" dirty="0" smtClean="0"/>
+              <a:t>)</a:t>
+            </a:r>
+          </a:p>
+          <a:p>
+            <a:r>
+              <a:rPr kumimoji="1" lang="en-US" altLang="zh-CN" sz="1000" dirty="0" smtClean="0"/>
+              <a:t>First Recipe ID (</a:t>
+            </a:r>
+            <a:r>
+              <a:rPr kumimoji="1" lang="en-US" altLang="zh-CN" sz="1000" dirty="0" err="1" smtClean="0"/>
+              <a:t>int</a:t>
+            </a:r>
+            <a:r>
+              <a:rPr kumimoji="1" lang="en-US" altLang="zh-CN" sz="1000" dirty="0" smtClean="0"/>
+              <a:t>)</a:t>
+            </a:r>
+          </a:p>
+          <a:p>
+            <a:r>
+              <a:rPr kumimoji="1" lang="en-US" altLang="zh-CN" sz="1000" dirty="0" smtClean="0"/>
+              <a:t>Second Recipe ID (</a:t>
+            </a:r>
+            <a:r>
+              <a:rPr kumimoji="1" lang="en-US" altLang="zh-CN" sz="1000" dirty="0" err="1" smtClean="0"/>
+              <a:t>int</a:t>
+            </a:r>
+            <a:r>
+              <a:rPr kumimoji="1" lang="en-US" altLang="zh-CN" sz="1000" dirty="0" smtClean="0"/>
+              <a:t>)</a:t>
+            </a:r>
+          </a:p>
+        </p:txBody>
+      </p:sp>
+      <p:sp>
+        <p:nvSpPr>
+          <p:cNvPr id="46" name="矩形 13">
+            <a:extLst>
+              <a:ext uri="{FF2B5EF4-FFF2-40B4-BE49-F238E27FC236}">
+                <a16:creationId xmlns:a16="http://schemas.microsoft.com/office/drawing/2014/main" xmlns="" id="{FABDA0BF-4421-E54D-BD36-0A1CA3B40E75}"/>
+              </a:ext>
+            </a:extLst>
+          </p:cNvPr>
+          <p:cNvSpPr/>
+          <p:nvPr/>
+        </p:nvSpPr>
+        <p:spPr>
+          <a:xfrm>
+            <a:off x="5867400" y="2362200"/>
+            <a:ext cx="1447800" cy="1066800"/>
+          </a:xfrm>
+          <a:prstGeom prst="rect">
+            <a:avLst/>
+          </a:prstGeom>
+          <a:solidFill>
+            <a:schemeClr val="tx2">
+              <a:lumMod val="40000"/>
+              <a:lumOff val="60000"/>
+            </a:schemeClr>
+          </a:solidFill>
+          <a:ln>
+            <a:solidFill>
+              <a:schemeClr val="bg1">
+                <a:lumMod val="50000"/>
+              </a:schemeClr>
+            </a:solidFill>
+          </a:ln>
+        </p:spPr>
+        <p:style>
+          <a:lnRef idx="2">
+            <a:schemeClr val="dk1"/>
+          </a:lnRef>
+          <a:fillRef idx="1">
+            <a:schemeClr val="lt1"/>
+          </a:fillRef>
+          <a:effectRef idx="0">
+            <a:schemeClr val="dk1"/>
+          </a:effectRef>
+          <a:fontRef idx="minor">
+            <a:schemeClr val="dk1"/>
+          </a:fontRef>
+        </p:style>
+        <p:txBody>
+          <a:bodyPr rtlCol="0" anchor="ctr"/>
+          <a:lstStyle/>
+          <a:p>
+            <a:pPr algn="ctr"/>
+            <a:r>
+              <a:rPr kumimoji="1" lang="en-US" altLang="zh-CN" sz="1400" dirty="0" err="1" smtClean="0"/>
+              <a:t>TesterRecipe</a:t>
+            </a:r>
+            <a:endParaRPr kumimoji="1" lang="en-US" altLang="zh-CN" sz="1400" dirty="0"/>
+          </a:p>
+          <a:p>
+            <a:r>
+              <a:rPr kumimoji="1" lang="en-US" altLang="zh-CN" sz="1000" dirty="0" smtClean="0"/>
+              <a:t>Tester </a:t>
+            </a:r>
+            <a:r>
+              <a:rPr kumimoji="1" lang="en-US" altLang="zh-CN" sz="1000" dirty="0" smtClean="0"/>
+              <a:t>Recipe </a:t>
+            </a:r>
+            <a:r>
+              <a:rPr kumimoji="1" lang="en-US" altLang="zh-CN" sz="1000" dirty="0" smtClean="0"/>
+              <a:t>ID </a:t>
+            </a:r>
+            <a:r>
+              <a:rPr kumimoji="1" lang="en-US" altLang="zh-CN" sz="1000" dirty="0" smtClean="0"/>
+              <a:t>(</a:t>
+            </a:r>
+            <a:r>
+              <a:rPr kumimoji="1" lang="en-US" altLang="zh-CN" sz="1000" dirty="0" err="1" smtClean="0"/>
+              <a:t>int</a:t>
+            </a:r>
+            <a:r>
+              <a:rPr kumimoji="1" lang="en-US" altLang="zh-CN" sz="1000" dirty="0" smtClean="0"/>
+              <a:t> PK)</a:t>
+            </a:r>
+          </a:p>
+          <a:p>
+            <a:r>
+              <a:rPr kumimoji="1" lang="en-US" altLang="zh-CN" sz="1000" dirty="0" smtClean="0"/>
+              <a:t>Steps (string</a:t>
+            </a:r>
+            <a:r>
+              <a:rPr kumimoji="1" lang="en-US" altLang="zh-CN" sz="1000" dirty="0" smtClean="0"/>
+              <a:t>)</a:t>
+            </a:r>
+          </a:p>
+          <a:p>
+            <a:r>
+              <a:rPr kumimoji="1" lang="en-US" altLang="zh-CN" sz="1000" dirty="0" smtClean="0"/>
+              <a:t>Tester </a:t>
+            </a:r>
+            <a:r>
+              <a:rPr kumimoji="1" lang="en-US" altLang="zh-CN" sz="1000" dirty="0" smtClean="0"/>
+              <a:t>ID(</a:t>
+            </a:r>
+            <a:r>
+              <a:rPr kumimoji="1" lang="en-US" altLang="zh-CN" sz="1000" dirty="0" err="1" smtClean="0"/>
+              <a:t>int</a:t>
+            </a:r>
+            <a:r>
+              <a:rPr kumimoji="1" lang="en-US" altLang="zh-CN" sz="1000" dirty="0" smtClean="0"/>
+              <a:t>)</a:t>
+            </a:r>
+          </a:p>
+          <a:p>
+            <a:r>
+              <a:rPr kumimoji="1" lang="en-US" altLang="zh-CN" sz="1000" dirty="0" smtClean="0"/>
+              <a:t>Estimate Duration (Time)</a:t>
+            </a:r>
+            <a:endParaRPr kumimoji="1" lang="en-US" altLang="zh-CN" sz="1000" dirty="0" smtClean="0"/>
+          </a:p>
+        </p:txBody>
+      </p:sp>
+      <p:sp>
+        <p:nvSpPr>
+          <p:cNvPr id="47" name="矩形 13">
+            <a:extLst>
+              <a:ext uri="{FF2B5EF4-FFF2-40B4-BE49-F238E27FC236}">
+                <a16:creationId xmlns:a16="http://schemas.microsoft.com/office/drawing/2014/main" xmlns="" id="{FABDA0BF-4421-E54D-BD36-0A1CA3B40E75}"/>
+              </a:ext>
+            </a:extLst>
+          </p:cNvPr>
+          <p:cNvSpPr/>
+          <p:nvPr/>
+        </p:nvSpPr>
+        <p:spPr>
+          <a:xfrm>
+            <a:off x="7467600" y="2362200"/>
+            <a:ext cx="1447800" cy="1066800"/>
+          </a:xfrm>
+          <a:prstGeom prst="rect">
+            <a:avLst/>
+          </a:prstGeom>
+          <a:solidFill>
+            <a:schemeClr val="tx2">
+              <a:lumMod val="40000"/>
+              <a:lumOff val="60000"/>
+            </a:schemeClr>
+          </a:solidFill>
+          <a:ln>
+            <a:solidFill>
+              <a:schemeClr val="bg1">
+                <a:lumMod val="50000"/>
+              </a:schemeClr>
+            </a:solidFill>
+          </a:ln>
+        </p:spPr>
+        <p:style>
+          <a:lnRef idx="2">
+            <a:schemeClr val="dk1"/>
+          </a:lnRef>
+          <a:fillRef idx="1">
+            <a:schemeClr val="lt1"/>
+          </a:fillRef>
+          <a:effectRef idx="0">
+            <a:schemeClr val="dk1"/>
+          </a:effectRef>
+          <a:fontRef idx="minor">
+            <a:schemeClr val="dk1"/>
+          </a:fontRef>
+        </p:style>
+        <p:txBody>
+          <a:bodyPr rtlCol="0" anchor="ctr"/>
+          <a:lstStyle/>
+          <a:p>
+            <a:pPr algn="ctr"/>
+            <a:r>
+              <a:rPr kumimoji="1" lang="en-US" altLang="zh-CN" sz="1400" dirty="0" err="1" smtClean="0"/>
+              <a:t>ChamberRecipe</a:t>
+            </a:r>
+            <a:endParaRPr kumimoji="1" lang="en-US" altLang="zh-CN" sz="1400" dirty="0"/>
+          </a:p>
+          <a:p>
+            <a:r>
+              <a:rPr kumimoji="1" lang="en-US" altLang="zh-CN" sz="1000" dirty="0" smtClean="0"/>
+              <a:t>Chamber Recipe ID </a:t>
+            </a:r>
+            <a:r>
+              <a:rPr kumimoji="1" lang="en-US" altLang="zh-CN" sz="1000" dirty="0" smtClean="0"/>
+              <a:t>(</a:t>
+            </a:r>
+            <a:r>
+              <a:rPr kumimoji="1" lang="en-US" altLang="zh-CN" sz="1000" dirty="0" err="1" smtClean="0"/>
+              <a:t>int</a:t>
+            </a:r>
+            <a:r>
+              <a:rPr kumimoji="1" lang="en-US" altLang="zh-CN" sz="1000" dirty="0" smtClean="0"/>
+              <a:t> PK)</a:t>
+            </a:r>
+          </a:p>
+          <a:p>
+            <a:r>
+              <a:rPr kumimoji="1" lang="en-US" altLang="zh-CN" sz="1000" dirty="0" smtClean="0"/>
+              <a:t>Chamber ID (</a:t>
+            </a:r>
+            <a:r>
+              <a:rPr kumimoji="1" lang="en-US" altLang="zh-CN" sz="1000" dirty="0" err="1" smtClean="0"/>
+              <a:t>int</a:t>
+            </a:r>
+            <a:r>
+              <a:rPr kumimoji="1" lang="en-US" altLang="zh-CN" sz="1000" dirty="0" smtClean="0"/>
+              <a:t>)</a:t>
+            </a:r>
+            <a:endParaRPr kumimoji="1" lang="en-US" altLang="zh-CN" sz="1000" dirty="0" smtClean="0"/>
+          </a:p>
+          <a:p>
+            <a:r>
+              <a:rPr kumimoji="1" lang="en-US" altLang="zh-CN" sz="1000" dirty="0" smtClean="0"/>
+              <a:t>Priority</a:t>
+            </a:r>
+            <a:r>
+              <a:rPr kumimoji="1" lang="en-US" altLang="zh-CN" sz="1000" dirty="0" smtClean="0"/>
+              <a:t> ID (</a:t>
+            </a:r>
+            <a:r>
+              <a:rPr kumimoji="1" lang="en-US" altLang="zh-CN" sz="1000" dirty="0" err="1" smtClean="0"/>
+              <a:t>int</a:t>
+            </a:r>
+            <a:r>
+              <a:rPr kumimoji="1" lang="en-US" altLang="zh-CN" sz="1000" dirty="0" smtClean="0"/>
+              <a:t>)</a:t>
+            </a:r>
+          </a:p>
+        </p:txBody>
+      </p:sp>
+      <p:sp>
+        <p:nvSpPr>
+          <p:cNvPr id="48" name="矩形 13">
+            <a:extLst>
+              <a:ext uri="{FF2B5EF4-FFF2-40B4-BE49-F238E27FC236}">
+                <a16:creationId xmlns:a16="http://schemas.microsoft.com/office/drawing/2014/main" xmlns="" id="{FABDA0BF-4421-E54D-BD36-0A1CA3B40E75}"/>
+              </a:ext>
+            </a:extLst>
+          </p:cNvPr>
+          <p:cNvSpPr/>
+          <p:nvPr/>
+        </p:nvSpPr>
+        <p:spPr>
+          <a:xfrm>
+            <a:off x="2667000" y="4572000"/>
+            <a:ext cx="1447800" cy="2133600"/>
+          </a:xfrm>
+          <a:prstGeom prst="rect">
+            <a:avLst/>
+          </a:prstGeom>
+          <a:solidFill>
+            <a:schemeClr val="tx2">
+              <a:lumMod val="40000"/>
+              <a:lumOff val="60000"/>
+            </a:schemeClr>
+          </a:solidFill>
+          <a:ln>
+            <a:solidFill>
+              <a:schemeClr val="bg1">
+                <a:lumMod val="50000"/>
+              </a:schemeClr>
+            </a:solidFill>
+          </a:ln>
+        </p:spPr>
+        <p:style>
+          <a:lnRef idx="2">
+            <a:schemeClr val="dk1"/>
+          </a:lnRef>
+          <a:fillRef idx="1">
+            <a:schemeClr val="lt1"/>
+          </a:fillRef>
+          <a:effectRef idx="0">
+            <a:schemeClr val="dk1"/>
+          </a:effectRef>
+          <a:fontRef idx="minor">
+            <a:schemeClr val="dk1"/>
+          </a:fontRef>
+        </p:style>
+        <p:txBody>
+          <a:bodyPr rtlCol="0" anchor="ctr"/>
+          <a:lstStyle/>
+          <a:p>
+            <a:pPr algn="ctr"/>
+            <a:r>
+              <a:rPr kumimoji="1" lang="en-US" altLang="zh-CN" sz="1400" dirty="0" smtClean="0"/>
+              <a:t>Executors</a:t>
+            </a:r>
+            <a:endParaRPr kumimoji="1" lang="en-US" altLang="zh-CN" sz="2400" dirty="0" smtClean="0"/>
+          </a:p>
+          <a:p>
+            <a:r>
+              <a:rPr kumimoji="1" lang="en-US" altLang="zh-CN" sz="1000" dirty="0" smtClean="0"/>
+              <a:t>Executor </a:t>
+            </a:r>
+            <a:r>
+              <a:rPr kumimoji="1" lang="en-US" altLang="zh-CN" sz="1000" dirty="0" smtClean="0"/>
+              <a:t>ID(</a:t>
+            </a:r>
+            <a:r>
+              <a:rPr kumimoji="1" lang="en-US" altLang="zh-CN" sz="1000" dirty="0" err="1" smtClean="0"/>
+              <a:t>int</a:t>
+            </a:r>
+            <a:r>
+              <a:rPr kumimoji="1" lang="en-US" altLang="zh-CN" sz="1000" dirty="0" smtClean="0"/>
+              <a:t>) </a:t>
+            </a:r>
+            <a:endParaRPr kumimoji="1" lang="en-US" altLang="zh-CN" sz="1000" dirty="0" smtClean="0"/>
+          </a:p>
+          <a:p>
+            <a:r>
+              <a:rPr kumimoji="1" lang="en-US" altLang="zh-CN" sz="1000" dirty="0" smtClean="0"/>
+              <a:t>Request ID (</a:t>
+            </a:r>
+            <a:r>
+              <a:rPr kumimoji="1" lang="en-US" altLang="zh-CN" sz="1000" dirty="0" err="1" smtClean="0"/>
+              <a:t>int</a:t>
+            </a:r>
+            <a:r>
+              <a:rPr kumimoji="1" lang="en-US" altLang="zh-CN" sz="1000" dirty="0" smtClean="0"/>
+              <a:t>)</a:t>
+            </a:r>
+          </a:p>
+          <a:p>
+            <a:r>
+              <a:rPr kumimoji="1" lang="en-US" altLang="zh-CN" sz="1000" dirty="0" smtClean="0"/>
+              <a:t>//Pro ID (</a:t>
+            </a:r>
+            <a:r>
+              <a:rPr kumimoji="1" lang="en-US" altLang="zh-CN" sz="1000" dirty="0" err="1" smtClean="0"/>
+              <a:t>int</a:t>
+            </a:r>
+            <a:r>
+              <a:rPr kumimoji="1" lang="en-US" altLang="zh-CN" sz="1000" dirty="0" smtClean="0"/>
+              <a:t>)</a:t>
+            </a:r>
+          </a:p>
+          <a:p>
+            <a:r>
+              <a:rPr kumimoji="1" lang="en-US" altLang="zh-CN" sz="1000" dirty="0" err="1" smtClean="0"/>
+              <a:t>Subpro</a:t>
+            </a:r>
+            <a:r>
+              <a:rPr kumimoji="1" lang="en-US" altLang="zh-CN" sz="1000" dirty="0" smtClean="0"/>
+              <a:t> </a:t>
+            </a:r>
+            <a:r>
+              <a:rPr kumimoji="1" lang="en-US" altLang="zh-CN" sz="1000" dirty="0" smtClean="0"/>
+              <a:t>ID(</a:t>
+            </a:r>
+            <a:r>
+              <a:rPr kumimoji="1" lang="en-US" altLang="zh-CN" sz="1000" dirty="0" err="1" smtClean="0"/>
+              <a:t>int</a:t>
+            </a:r>
+            <a:r>
+              <a:rPr kumimoji="1" lang="en-US" altLang="zh-CN" sz="1000" dirty="0" smtClean="0"/>
+              <a:t>)</a:t>
+            </a:r>
+          </a:p>
+          <a:p>
+            <a:r>
+              <a:rPr kumimoji="1" lang="en-US" altLang="zh-CN" sz="1000" dirty="0" smtClean="0"/>
+              <a:t>Recipe ID(</a:t>
+            </a:r>
+            <a:r>
+              <a:rPr kumimoji="1" lang="en-US" altLang="zh-CN" sz="1000" dirty="0" err="1" smtClean="0"/>
+              <a:t>int</a:t>
+            </a:r>
+            <a:r>
+              <a:rPr kumimoji="1" lang="en-US" altLang="zh-CN" sz="1000" dirty="0" smtClean="0"/>
+              <a:t>)</a:t>
+            </a:r>
+          </a:p>
+          <a:p>
+            <a:r>
+              <a:rPr kumimoji="1" lang="en-US" altLang="zh-CN" sz="1000" dirty="0" smtClean="0"/>
+              <a:t>Battery </a:t>
+            </a:r>
+            <a:r>
+              <a:rPr kumimoji="1" lang="en-US" altLang="zh-CN" sz="1000" dirty="0" smtClean="0"/>
+              <a:t>ID (</a:t>
+            </a:r>
+            <a:r>
+              <a:rPr kumimoji="1" lang="en-US" altLang="zh-CN" sz="1000" dirty="0" err="1" smtClean="0"/>
+              <a:t>int</a:t>
+            </a:r>
+            <a:r>
+              <a:rPr kumimoji="1" lang="en-US" altLang="zh-CN" sz="1000" dirty="0" smtClean="0"/>
+              <a:t>)</a:t>
+            </a:r>
+          </a:p>
+          <a:p>
+            <a:r>
+              <a:rPr kumimoji="1" lang="en-US" altLang="zh-CN" sz="1000" dirty="0" smtClean="0"/>
+              <a:t>Tester Channel </a:t>
+            </a:r>
+            <a:r>
+              <a:rPr kumimoji="1" lang="en-US" altLang="zh-CN" sz="1000" dirty="0" smtClean="0"/>
+              <a:t>ID (</a:t>
+            </a:r>
+            <a:r>
+              <a:rPr kumimoji="1" lang="en-US" altLang="zh-CN" sz="1000" dirty="0" err="1" smtClean="0"/>
+              <a:t>int</a:t>
+            </a:r>
+            <a:r>
+              <a:rPr kumimoji="1" lang="en-US" altLang="zh-CN" sz="1000" dirty="0" smtClean="0"/>
+              <a:t>)</a:t>
+            </a:r>
+          </a:p>
+          <a:p>
+            <a:r>
+              <a:rPr kumimoji="1" lang="en-US" altLang="zh-CN" sz="1000" dirty="0" smtClean="0"/>
+              <a:t>Chamber </a:t>
+            </a:r>
+            <a:r>
+              <a:rPr kumimoji="1" lang="en-US" altLang="zh-CN" sz="1000" dirty="0" smtClean="0"/>
+              <a:t>ID (</a:t>
+            </a:r>
+            <a:r>
+              <a:rPr kumimoji="1" lang="en-US" altLang="zh-CN" sz="1000" dirty="0" err="1" smtClean="0"/>
+              <a:t>int</a:t>
+            </a:r>
+            <a:r>
+              <a:rPr kumimoji="1" lang="en-US" altLang="zh-CN" sz="1000" dirty="0" smtClean="0"/>
+              <a:t>)</a:t>
+            </a:r>
+          </a:p>
+          <a:p>
+            <a:r>
+              <a:rPr kumimoji="1" lang="en-US" altLang="zh-CN" sz="1000" dirty="0" smtClean="0"/>
+              <a:t>Status (string)</a:t>
+            </a:r>
+          </a:p>
+          <a:p>
+            <a:r>
+              <a:rPr kumimoji="1" lang="en-US" altLang="zh-CN" sz="1000" dirty="0" err="1" smtClean="0"/>
+              <a:t>StartTime</a:t>
+            </a:r>
+            <a:endParaRPr kumimoji="1" lang="en-US" altLang="zh-CN" sz="1000" dirty="0" smtClean="0"/>
+          </a:p>
+          <a:p>
+            <a:r>
+              <a:rPr kumimoji="1" lang="en-US" altLang="zh-CN" sz="1000" dirty="0" err="1" smtClean="0"/>
+              <a:t>EndTime</a:t>
+            </a:r>
+            <a:endParaRPr kumimoji="1" lang="en-US" altLang="zh-CN" sz="1000" dirty="0" smtClean="0"/>
+          </a:p>
+          <a:p>
+            <a:r>
+              <a:rPr kumimoji="1" lang="en-US" altLang="zh-CN" sz="1000" dirty="0" smtClean="0"/>
+              <a:t>Description</a:t>
+            </a:r>
+            <a:endParaRPr kumimoji="1" lang="en-US" altLang="zh-CN" sz="1000" dirty="0" smtClean="0"/>
+          </a:p>
+          <a:p>
+            <a:endParaRPr kumimoji="1" lang="en-US" altLang="zh-CN" sz="1000" dirty="0" smtClean="0"/>
+          </a:p>
+        </p:txBody>
+      </p:sp>
+      <p:cxnSp>
+        <p:nvCxnSpPr>
+          <p:cNvPr id="51" name="Straight Connector 50"/>
+          <p:cNvCxnSpPr/>
+          <p:nvPr/>
+        </p:nvCxnSpPr>
+        <p:spPr>
+          <a:xfrm>
+            <a:off x="2514600" y="3962400"/>
+            <a:ext cx="0" cy="2895600"/>
+          </a:xfrm>
+          <a:prstGeom prst="line">
+            <a:avLst/>
+          </a:prstGeom>
+        </p:spPr>
+        <p:style>
+          <a:lnRef idx="1">
+            <a:schemeClr val="accent1"/>
+          </a:lnRef>
+          <a:fillRef idx="0">
+            <a:schemeClr val="accent1"/>
+          </a:fillRef>
+          <a:effectRef idx="0">
+            <a:schemeClr val="accent1"/>
+          </a:effectRef>
+          <a:fontRef idx="minor">
+            <a:schemeClr val="tx1"/>
+          </a:fontRef>
+        </p:style>
+      </p:cxnSp>
+      <p:cxnSp>
+        <p:nvCxnSpPr>
+          <p:cNvPr id="55" name="Straight Connector 54"/>
+          <p:cNvCxnSpPr/>
+          <p:nvPr/>
+        </p:nvCxnSpPr>
+        <p:spPr>
+          <a:xfrm>
+            <a:off x="4267200" y="3962400"/>
+            <a:ext cx="0" cy="2895600"/>
+          </a:xfrm>
+          <a:prstGeom prst="line">
+            <a:avLst/>
+          </a:prstGeom>
+        </p:spPr>
+        <p:style>
+          <a:lnRef idx="1">
+            <a:schemeClr val="accent1"/>
+          </a:lnRef>
+          <a:fillRef idx="0">
+            <a:schemeClr val="accent1"/>
+          </a:fillRef>
+          <a:effectRef idx="0">
+            <a:schemeClr val="accent1"/>
+          </a:effectRef>
+          <a:fontRef idx="minor">
+            <a:schemeClr val="tx1"/>
+          </a:fontRef>
+        </p:style>
+      </p:cxnSp>
+      <p:sp>
+        <p:nvSpPr>
+          <p:cNvPr id="56" name="TextBox 55"/>
+          <p:cNvSpPr txBox="1"/>
+          <p:nvPr/>
+        </p:nvSpPr>
+        <p:spPr>
+          <a:xfrm>
+            <a:off x="2895600" y="4038600"/>
+            <a:ext cx="1087670" cy="369332"/>
+          </a:xfrm>
+          <a:prstGeom prst="rect">
+            <a:avLst/>
+          </a:prstGeom>
+          <a:noFill/>
+        </p:spPr>
+        <p:txBody>
+          <a:bodyPr wrap="none" rtlCol="0">
+            <a:spAutoFit/>
+          </a:bodyPr>
+          <a:lstStyle/>
+          <a:p>
+            <a:r>
+              <a:rPr lang="en-US" dirty="0" smtClean="0"/>
+              <a:t>Executors</a:t>
+            </a:r>
+          </a:p>
+        </p:txBody>
+      </p:sp>
+      <p:sp>
+        <p:nvSpPr>
+          <p:cNvPr id="57" name="TextBox 56"/>
+          <p:cNvSpPr txBox="1"/>
+          <p:nvPr/>
+        </p:nvSpPr>
+        <p:spPr>
+          <a:xfrm>
+            <a:off x="4876800" y="4114800"/>
+            <a:ext cx="1072601" cy="369332"/>
+          </a:xfrm>
+          <a:prstGeom prst="rect">
+            <a:avLst/>
+          </a:prstGeom>
+          <a:noFill/>
+        </p:spPr>
+        <p:txBody>
+          <a:bodyPr wrap="none" rtlCol="0">
+            <a:spAutoFit/>
+          </a:bodyPr>
+          <a:lstStyle/>
+          <a:p>
+            <a:r>
+              <a:rPr lang="en-US" dirty="0" smtClean="0"/>
+              <a:t>Raw Data</a:t>
+            </a:r>
+          </a:p>
+        </p:txBody>
+      </p:sp>
+      <p:sp>
+        <p:nvSpPr>
+          <p:cNvPr id="35" name="矩形 13">
+            <a:extLst>
+              <a:ext uri="{FF2B5EF4-FFF2-40B4-BE49-F238E27FC236}">
+                <a16:creationId xmlns:a16="http://schemas.microsoft.com/office/drawing/2014/main" xmlns="" id="{FABDA0BF-4421-E54D-BD36-0A1CA3B40E75}"/>
+              </a:ext>
+            </a:extLst>
+          </p:cNvPr>
+          <p:cNvSpPr/>
+          <p:nvPr/>
+        </p:nvSpPr>
+        <p:spPr>
+          <a:xfrm>
+            <a:off x="914400" y="3581400"/>
+            <a:ext cx="1447800" cy="1066800"/>
+          </a:xfrm>
+          <a:prstGeom prst="rect">
+            <a:avLst/>
+          </a:prstGeom>
+          <a:solidFill>
+            <a:schemeClr val="tx2">
+              <a:lumMod val="40000"/>
+              <a:lumOff val="60000"/>
+            </a:schemeClr>
+          </a:solidFill>
+          <a:ln>
+            <a:solidFill>
+              <a:schemeClr val="bg1">
+                <a:lumMod val="50000"/>
+              </a:schemeClr>
+            </a:solidFill>
+          </a:ln>
+        </p:spPr>
+        <p:style>
+          <a:lnRef idx="2">
+            <a:schemeClr val="dk1"/>
+          </a:lnRef>
+          <a:fillRef idx="1">
+            <a:schemeClr val="lt1"/>
+          </a:fillRef>
+          <a:effectRef idx="0">
+            <a:schemeClr val="dk1"/>
+          </a:effectRef>
+          <a:fontRef idx="minor">
+            <a:schemeClr val="dk1"/>
+          </a:fontRef>
+        </p:style>
+        <p:txBody>
+          <a:bodyPr rtlCol="0" anchor="ctr"/>
+          <a:lstStyle/>
+          <a:p>
+            <a:pPr algn="ctr"/>
+            <a:r>
+              <a:rPr kumimoji="1" lang="en-US" altLang="zh-CN" sz="1400" dirty="0" err="1" smtClean="0"/>
+              <a:t>Pro_Subpro</a:t>
+            </a:r>
+            <a:endParaRPr kumimoji="1" lang="en-US" altLang="zh-CN" sz="1400" dirty="0"/>
+          </a:p>
+          <a:p>
+            <a:r>
+              <a:rPr kumimoji="1" lang="en-US" altLang="zh-CN" sz="1000" dirty="0" smtClean="0"/>
+              <a:t>Pro ID (</a:t>
+            </a:r>
+            <a:r>
+              <a:rPr kumimoji="1" lang="en-US" altLang="zh-CN" sz="1000" dirty="0" err="1" smtClean="0"/>
+              <a:t>int</a:t>
+            </a:r>
+            <a:r>
+              <a:rPr kumimoji="1" lang="en-US" altLang="zh-CN" sz="1000" dirty="0" smtClean="0"/>
+              <a:t>)</a:t>
+            </a:r>
+          </a:p>
+          <a:p>
+            <a:r>
+              <a:rPr kumimoji="1" lang="en-US" altLang="zh-CN" sz="1000" dirty="0" err="1" smtClean="0"/>
+              <a:t>Subpro</a:t>
+            </a:r>
+            <a:r>
+              <a:rPr kumimoji="1" lang="en-US" altLang="zh-CN" sz="1000" dirty="0" smtClean="0"/>
+              <a:t> ID (</a:t>
+            </a:r>
+            <a:r>
+              <a:rPr kumimoji="1" lang="en-US" altLang="zh-CN" sz="1000" dirty="0" err="1" smtClean="0"/>
+              <a:t>int</a:t>
+            </a:r>
+            <a:r>
+              <a:rPr kumimoji="1" lang="en-US" altLang="zh-CN" sz="1000" dirty="0" smtClean="0"/>
+              <a:t>)</a:t>
+            </a:r>
+            <a:endParaRPr kumimoji="1" lang="en-US" altLang="zh-CN" sz="1000" dirty="0" smtClean="0"/>
+          </a:p>
+        </p:txBody>
+      </p:sp>
+      <p:cxnSp>
+        <p:nvCxnSpPr>
+          <p:cNvPr id="37" name="Straight Connector 36"/>
+          <p:cNvCxnSpPr/>
+          <p:nvPr/>
+        </p:nvCxnSpPr>
+        <p:spPr>
+          <a:xfrm>
+            <a:off x="0" y="4876800"/>
+            <a:ext cx="2514600" cy="0"/>
+          </a:xfrm>
+          <a:prstGeom prst="line">
+            <a:avLst/>
+          </a:prstGeom>
+        </p:spPr>
+        <p:style>
+          <a:lnRef idx="1">
+            <a:schemeClr val="accent1"/>
+          </a:lnRef>
+          <a:fillRef idx="0">
+            <a:schemeClr val="accent1"/>
+          </a:fillRef>
+          <a:effectRef idx="0">
+            <a:schemeClr val="accent1"/>
+          </a:effectRef>
+          <a:fontRef idx="minor">
+            <a:schemeClr val="tx1"/>
+          </a:fontRef>
+        </p:style>
+      </p:cxnSp>
+      <p:cxnSp>
+        <p:nvCxnSpPr>
+          <p:cNvPr id="41" name="Straight Connector 40"/>
+          <p:cNvCxnSpPr/>
+          <p:nvPr/>
+        </p:nvCxnSpPr>
+        <p:spPr>
+          <a:xfrm>
+            <a:off x="6477000" y="3962400"/>
+            <a:ext cx="0" cy="2895600"/>
+          </a:xfrm>
+          <a:prstGeom prst="line">
+            <a:avLst/>
+          </a:prstGeom>
+        </p:spPr>
+        <p:style>
+          <a:lnRef idx="1">
+            <a:schemeClr val="accent1"/>
+          </a:lnRef>
+          <a:fillRef idx="0">
+            <a:schemeClr val="accent1"/>
+          </a:fillRef>
+          <a:effectRef idx="0">
+            <a:schemeClr val="accent1"/>
+          </a:effectRef>
+          <a:fontRef idx="minor">
+            <a:schemeClr val="tx1"/>
+          </a:fontRef>
+        </p:style>
+      </p:cxnSp>
+      <p:sp>
+        <p:nvSpPr>
+          <p:cNvPr id="42" name="矩形 13">
+            <a:extLst>
+              <a:ext uri="{FF2B5EF4-FFF2-40B4-BE49-F238E27FC236}">
+                <a16:creationId xmlns:a16="http://schemas.microsoft.com/office/drawing/2014/main" xmlns="" id="{FABDA0BF-4421-E54D-BD36-0A1CA3B40E75}"/>
+              </a:ext>
+            </a:extLst>
+          </p:cNvPr>
+          <p:cNvSpPr/>
+          <p:nvPr/>
+        </p:nvSpPr>
+        <p:spPr>
+          <a:xfrm>
+            <a:off x="6781800" y="4572000"/>
+            <a:ext cx="1905000" cy="1752600"/>
+          </a:xfrm>
+          <a:prstGeom prst="rect">
+            <a:avLst/>
+          </a:prstGeom>
+          <a:solidFill>
+            <a:schemeClr val="tx2">
+              <a:lumMod val="40000"/>
+              <a:lumOff val="60000"/>
+            </a:schemeClr>
+          </a:solidFill>
+          <a:ln>
+            <a:solidFill>
+              <a:schemeClr val="bg1">
+                <a:lumMod val="50000"/>
+              </a:schemeClr>
+            </a:solidFill>
+          </a:ln>
+        </p:spPr>
+        <p:style>
+          <a:lnRef idx="2">
+            <a:schemeClr val="dk1"/>
+          </a:lnRef>
+          <a:fillRef idx="1">
+            <a:schemeClr val="lt1"/>
+          </a:fillRef>
+          <a:effectRef idx="0">
+            <a:schemeClr val="dk1"/>
+          </a:effectRef>
+          <a:fontRef idx="minor">
+            <a:schemeClr val="dk1"/>
+          </a:fontRef>
+        </p:style>
+        <p:txBody>
+          <a:bodyPr rtlCol="0" anchor="ctr"/>
+          <a:lstStyle/>
+          <a:p>
+            <a:pPr algn="ctr"/>
+            <a:r>
+              <a:rPr kumimoji="1" lang="en-US" altLang="zh-CN" sz="1400" dirty="0" err="1" smtClean="0"/>
+              <a:t>AssetUsage</a:t>
+            </a:r>
+            <a:endParaRPr kumimoji="1" lang="en-US" altLang="zh-CN" sz="1400" dirty="0" smtClean="0"/>
+          </a:p>
+          <a:p>
+            <a:r>
+              <a:rPr kumimoji="1" lang="en-US" altLang="zh-CN" sz="1000" dirty="0" smtClean="0"/>
+              <a:t>Log</a:t>
+            </a:r>
+            <a:r>
+              <a:rPr kumimoji="1" lang="en-US" altLang="zh-CN" sz="1000" dirty="0" smtClean="0"/>
+              <a:t> ID </a:t>
+            </a:r>
+            <a:r>
+              <a:rPr kumimoji="1" lang="en-US" altLang="zh-CN" sz="1000" dirty="0" smtClean="0"/>
+              <a:t>(</a:t>
+            </a:r>
+            <a:r>
+              <a:rPr kumimoji="1" lang="en-US" altLang="zh-CN" sz="1000" dirty="0" err="1" smtClean="0"/>
+              <a:t>int</a:t>
+            </a:r>
+            <a:r>
+              <a:rPr kumimoji="1" lang="en-US" altLang="zh-CN" sz="1000" dirty="0" smtClean="0"/>
+              <a:t> PK)</a:t>
+            </a:r>
+          </a:p>
+          <a:p>
+            <a:r>
+              <a:rPr kumimoji="1" lang="en-US" altLang="zh-CN" sz="1000" dirty="0" smtClean="0"/>
+              <a:t>Asset ID (</a:t>
+            </a:r>
+            <a:r>
+              <a:rPr kumimoji="1" lang="en-US" altLang="zh-CN" sz="1000" dirty="0" err="1" smtClean="0"/>
+              <a:t>int</a:t>
+            </a:r>
+            <a:r>
+              <a:rPr kumimoji="1" lang="en-US" altLang="zh-CN" sz="1000" dirty="0" smtClean="0"/>
+              <a:t>)</a:t>
+            </a:r>
+            <a:endParaRPr kumimoji="1" lang="en-US" altLang="zh-CN" sz="1000" dirty="0" smtClean="0"/>
+          </a:p>
+          <a:p>
+            <a:r>
+              <a:rPr kumimoji="1" lang="en-US" altLang="zh-CN" sz="1000" dirty="0" smtClean="0"/>
+              <a:t>Status (string)</a:t>
+            </a:r>
+          </a:p>
+          <a:p>
+            <a:r>
+              <a:rPr kumimoji="1" lang="en-US" altLang="zh-CN" sz="1000" dirty="0" err="1" smtClean="0"/>
+              <a:t>TimeStamp</a:t>
+            </a:r>
+            <a:endParaRPr kumimoji="1" lang="en-US" altLang="zh-CN" sz="1000" dirty="0"/>
+          </a:p>
+        </p:txBody>
+      </p:sp>
+      <p:sp>
+        <p:nvSpPr>
+          <p:cNvPr id="49" name="TextBox 48"/>
+          <p:cNvSpPr txBox="1"/>
+          <p:nvPr/>
+        </p:nvSpPr>
+        <p:spPr>
+          <a:xfrm>
+            <a:off x="7239000" y="4114800"/>
+            <a:ext cx="1311641" cy="369332"/>
+          </a:xfrm>
+          <a:prstGeom prst="rect">
+            <a:avLst/>
+          </a:prstGeom>
+          <a:noFill/>
+        </p:spPr>
+        <p:txBody>
+          <a:bodyPr wrap="none" rtlCol="0">
+            <a:spAutoFit/>
+          </a:bodyPr>
+          <a:lstStyle/>
+          <a:p>
+            <a:r>
+              <a:rPr lang="en-US" dirty="0" smtClean="0"/>
+              <a:t>Asset Usage</a:t>
+            </a:r>
+            <a:endParaRPr lang="en-US" dirty="0" smtClean="0"/>
           </a:p>
         </p:txBody>
       </p:sp>

</xml_diff>